<commit_message>
Updates with new instructions for CuffDiff & IGV
</commit_message>
<xml_diff>
--- a/BU_MolBio_RNAseq_in_GP_workshop/slides/2019-04-04_05_GPWorkshopIGV.pptx
+++ b/BU_MolBio_RNAseq_in_GP_workshop/slides/2019-04-04_05_GPWorkshopIGV.pptx
@@ -5,7 +5,7 @@
     <p:sldMasterId id="2147483759" r:id="rId1"/>
   </p:sldMasterIdLst>
   <p:notesMasterIdLst>
-    <p:notesMasterId r:id="rId32"/>
+    <p:notesMasterId r:id="rId33"/>
   </p:notesMasterIdLst>
   <p:sldIdLst>
     <p:sldId id="512" r:id="rId2"/>
@@ -32,31 +32,32 @@
     <p:sldId id="466" r:id="rId23"/>
     <p:sldId id="467" r:id="rId24"/>
     <p:sldId id="468" r:id="rId25"/>
-    <p:sldId id="573" r:id="rId26"/>
-    <p:sldId id="469" r:id="rId27"/>
-    <p:sldId id="470" r:id="rId28"/>
-    <p:sldId id="471" r:id="rId29"/>
-    <p:sldId id="473" r:id="rId30"/>
-    <p:sldId id="474" r:id="rId31"/>
+    <p:sldId id="575" r:id="rId26"/>
+    <p:sldId id="573" r:id="rId27"/>
+    <p:sldId id="469" r:id="rId28"/>
+    <p:sldId id="470" r:id="rId29"/>
+    <p:sldId id="471" r:id="rId30"/>
+    <p:sldId id="473" r:id="rId31"/>
+    <p:sldId id="474" r:id="rId32"/>
   </p:sldIdLst>
   <p:sldSz cx="9144000" cy="6858000" type="screen4x3"/>
   <p:notesSz cx="6858000" cy="9144000"/>
   <p:embeddedFontLst>
     <p:embeddedFont>
-      <p:font typeface="Tahoma" panose="020B0604030504040204" pitchFamily="34" charset="0"/>
-      <p:regular r:id="rId33"/>
-      <p:bold r:id="rId34"/>
-    </p:embeddedFont>
-    <p:embeddedFont>
       <p:font typeface="Calibri" panose="020F0502020204030204" pitchFamily="34" charset="0"/>
-      <p:regular r:id="rId35"/>
-      <p:bold r:id="rId36"/>
-      <p:italic r:id="rId37"/>
-      <p:boldItalic r:id="rId38"/>
+      <p:regular r:id="rId34"/>
+      <p:bold r:id="rId35"/>
+      <p:italic r:id="rId36"/>
+      <p:boldItalic r:id="rId37"/>
     </p:embeddedFont>
     <p:embeddedFont>
       <p:font typeface="ＭＳ Ｐゴシック" panose="020B0600070205080204" pitchFamily="34" charset="-128"/>
+      <p:regular r:id="rId38"/>
+    </p:embeddedFont>
+    <p:embeddedFont>
+      <p:font typeface="Tahoma" panose="020B0604030504040204" pitchFamily="34" charset="0"/>
       <p:regular r:id="rId39"/>
+      <p:bold r:id="rId40"/>
     </p:embeddedFont>
   </p:embeddedFontLst>
   <p:defaultTextStyle>
@@ -299,6 +300,7 @@
             <p14:sldId id="466"/>
             <p14:sldId id="467"/>
             <p14:sldId id="468"/>
+            <p14:sldId id="575"/>
             <p14:sldId id="573"/>
             <p14:sldId id="469"/>
             <p14:sldId id="470"/>
@@ -1717,14 +1719,14 @@
           <a:noFill/>
           <a:extLst>
             <a:ext uri="{909E8E84-426E-40dd-AFC4-6F175D3DCCD1}">
-              <a14:hiddenFill xmlns="" xmlns:a14="http://schemas.microsoft.com/office/drawing/2010/main">
+              <a14:hiddenFill xmlns:a14="http://schemas.microsoft.com/office/drawing/2010/main" xmlns="">
                 <a:solidFill>
                   <a:srgbClr val="FFFFFF"/>
                 </a:solidFill>
               </a14:hiddenFill>
             </a:ext>
             <a:ext uri="{91240B29-F687-4f45-9708-019B960494DF}">
-              <a14:hiddenLine xmlns="" xmlns:a14="http://schemas.microsoft.com/office/drawing/2010/main" w="9525">
+              <a14:hiddenLine xmlns:a14="http://schemas.microsoft.com/office/drawing/2010/main" xmlns="" w="9525">
                 <a:solidFill>
                   <a:srgbClr val="000000"/>
                 </a:solidFill>
@@ -1882,14 +1884,14 @@
           </a:ln>
           <a:extLst>
             <a:ext uri="{909E8E84-426E-40dd-AFC4-6F175D3DCCD1}">
-              <a14:hiddenFill xmlns="" xmlns:a14="http://schemas.microsoft.com/office/drawing/2010/main">
+              <a14:hiddenFill xmlns:a14="http://schemas.microsoft.com/office/drawing/2010/main" xmlns="">
                 <a:solidFill>
                   <a:srgbClr val="FFFFFF"/>
                 </a:solidFill>
               </a14:hiddenFill>
             </a:ext>
             <a:ext uri="{FAA26D3D-D897-4be2-8F04-BA451C77F1D7}">
-              <ma14:placeholderFlag xmlns="" xmlns:ma14="http://schemas.microsoft.com/office/mac/drawingml/2011/main" val="1"/>
+              <ma14:placeholderFlag xmlns:ma14="http://schemas.microsoft.com/office/mac/drawingml/2011/main" xmlns="" val="1"/>
             </a:ext>
           </a:extLst>
         </p:spPr>
@@ -1908,14 +1910,14 @@
           <a:noFill/>
           <a:extLst>
             <a:ext uri="{909E8E84-426E-40dd-AFC4-6F175D3DCCD1}">
-              <a14:hiddenFill xmlns="" xmlns:a14="http://schemas.microsoft.com/office/drawing/2010/main">
+              <a14:hiddenFill xmlns:a14="http://schemas.microsoft.com/office/drawing/2010/main" xmlns="">
                 <a:solidFill>
                   <a:srgbClr val="FFFFFF"/>
                 </a:solidFill>
               </a14:hiddenFill>
             </a:ext>
             <a:ext uri="{91240B29-F687-4f45-9708-019B960494DF}">
-              <a14:hiddenLine xmlns="" xmlns:a14="http://schemas.microsoft.com/office/drawing/2010/main" w="9525">
+              <a14:hiddenLine xmlns:a14="http://schemas.microsoft.com/office/drawing/2010/main" xmlns="" w="9525">
                 <a:solidFill>
                   <a:srgbClr val="000000"/>
                 </a:solidFill>
@@ -1925,7 +1927,7 @@
               </a14:hiddenLine>
             </a:ext>
             <a:ext uri="{FAA26D3D-D897-4be2-8F04-BA451C77F1D7}">
-              <ma14:placeholderFlag xmlns="" xmlns:ma14="http://schemas.microsoft.com/office/mac/drawingml/2011/main" val="1"/>
+              <ma14:placeholderFlag xmlns:ma14="http://schemas.microsoft.com/office/mac/drawingml/2011/main" xmlns="" val="1"/>
             </a:ext>
           </a:extLst>
         </p:spPr>
@@ -1980,14 +1982,14 @@
           <a:noFill/>
           <a:extLst>
             <a:ext uri="{909E8E84-426E-40dd-AFC4-6F175D3DCCD1}">
-              <a14:hiddenFill xmlns="" xmlns:a14="http://schemas.microsoft.com/office/drawing/2010/main">
+              <a14:hiddenFill xmlns:a14="http://schemas.microsoft.com/office/drawing/2010/main" xmlns="">
                 <a:solidFill>
                   <a:srgbClr val="FFFFFF"/>
                 </a:solidFill>
               </a14:hiddenFill>
             </a:ext>
             <a:ext uri="{91240B29-F687-4f45-9708-019B960494DF}">
-              <a14:hiddenLine xmlns="" xmlns:a14="http://schemas.microsoft.com/office/drawing/2010/main" w="9525">
+              <a14:hiddenLine xmlns:a14="http://schemas.microsoft.com/office/drawing/2010/main" xmlns="" w="9525">
                 <a:solidFill>
                   <a:srgbClr val="000000"/>
                 </a:solidFill>
@@ -2145,14 +2147,14 @@
           </a:ln>
           <a:extLst>
             <a:ext uri="{909E8E84-426E-40dd-AFC4-6F175D3DCCD1}">
-              <a14:hiddenFill xmlns="" xmlns:a14="http://schemas.microsoft.com/office/drawing/2010/main">
+              <a14:hiddenFill xmlns:a14="http://schemas.microsoft.com/office/drawing/2010/main" xmlns="">
                 <a:solidFill>
                   <a:srgbClr val="FFFFFF"/>
                 </a:solidFill>
               </a14:hiddenFill>
             </a:ext>
             <a:ext uri="{FAA26D3D-D897-4be2-8F04-BA451C77F1D7}">
-              <ma14:placeholderFlag xmlns="" xmlns:ma14="http://schemas.microsoft.com/office/mac/drawingml/2011/main" val="1"/>
+              <ma14:placeholderFlag xmlns:ma14="http://schemas.microsoft.com/office/mac/drawingml/2011/main" xmlns="" val="1"/>
             </a:ext>
           </a:extLst>
         </p:spPr>
@@ -2171,14 +2173,14 @@
           <a:noFill/>
           <a:extLst>
             <a:ext uri="{909E8E84-426E-40dd-AFC4-6F175D3DCCD1}">
-              <a14:hiddenFill xmlns="" xmlns:a14="http://schemas.microsoft.com/office/drawing/2010/main">
+              <a14:hiddenFill xmlns:a14="http://schemas.microsoft.com/office/drawing/2010/main" xmlns="">
                 <a:solidFill>
                   <a:srgbClr val="FFFFFF"/>
                 </a:solidFill>
               </a14:hiddenFill>
             </a:ext>
             <a:ext uri="{91240B29-F687-4f45-9708-019B960494DF}">
-              <a14:hiddenLine xmlns="" xmlns:a14="http://schemas.microsoft.com/office/drawing/2010/main" w="9525">
+              <a14:hiddenLine xmlns:a14="http://schemas.microsoft.com/office/drawing/2010/main" xmlns="" w="9525">
                 <a:solidFill>
                   <a:srgbClr val="000000"/>
                 </a:solidFill>
@@ -2188,7 +2190,7 @@
               </a14:hiddenLine>
             </a:ext>
             <a:ext uri="{FAA26D3D-D897-4be2-8F04-BA451C77F1D7}">
-              <ma14:placeholderFlag xmlns="" xmlns:ma14="http://schemas.microsoft.com/office/mac/drawingml/2011/main" val="1"/>
+              <ma14:placeholderFlag xmlns:ma14="http://schemas.microsoft.com/office/mac/drawingml/2011/main" xmlns="" val="1"/>
             </a:ext>
           </a:extLst>
         </p:spPr>
@@ -2372,14 +2374,14 @@
           <a:noFill/>
           <a:extLst>
             <a:ext uri="{909E8E84-426E-40dd-AFC4-6F175D3DCCD1}">
-              <a14:hiddenFill xmlns="" xmlns:a14="http://schemas.microsoft.com/office/drawing/2010/main">
+              <a14:hiddenFill xmlns:a14="http://schemas.microsoft.com/office/drawing/2010/main" xmlns="">
                 <a:solidFill>
                   <a:srgbClr val="FFFFFF"/>
                 </a:solidFill>
               </a14:hiddenFill>
             </a:ext>
             <a:ext uri="{91240B29-F687-4f45-9708-019B960494DF}">
-              <a14:hiddenLine xmlns="" xmlns:a14="http://schemas.microsoft.com/office/drawing/2010/main" w="9525">
+              <a14:hiddenLine xmlns:a14="http://schemas.microsoft.com/office/drawing/2010/main" xmlns="" w="9525">
                 <a:solidFill>
                   <a:srgbClr val="000000"/>
                 </a:solidFill>
@@ -2537,14 +2539,14 @@
           </a:ln>
           <a:extLst>
             <a:ext uri="{909E8E84-426E-40dd-AFC4-6F175D3DCCD1}">
-              <a14:hiddenFill xmlns="" xmlns:a14="http://schemas.microsoft.com/office/drawing/2010/main">
+              <a14:hiddenFill xmlns:a14="http://schemas.microsoft.com/office/drawing/2010/main" xmlns="">
                 <a:solidFill>
                   <a:srgbClr val="FFFFFF"/>
                 </a:solidFill>
               </a14:hiddenFill>
             </a:ext>
             <a:ext uri="{FAA26D3D-D897-4be2-8F04-BA451C77F1D7}">
-              <ma14:placeholderFlag xmlns="" xmlns:ma14="http://schemas.microsoft.com/office/mac/drawingml/2011/main" val="1"/>
+              <ma14:placeholderFlag xmlns:ma14="http://schemas.microsoft.com/office/mac/drawingml/2011/main" xmlns="" val="1"/>
             </a:ext>
           </a:extLst>
         </p:spPr>
@@ -2563,14 +2565,14 @@
           <a:noFill/>
           <a:extLst>
             <a:ext uri="{909E8E84-426E-40dd-AFC4-6F175D3DCCD1}">
-              <a14:hiddenFill xmlns="" xmlns:a14="http://schemas.microsoft.com/office/drawing/2010/main">
+              <a14:hiddenFill xmlns:a14="http://schemas.microsoft.com/office/drawing/2010/main" xmlns="">
                 <a:solidFill>
                   <a:srgbClr val="FFFFFF"/>
                 </a:solidFill>
               </a14:hiddenFill>
             </a:ext>
             <a:ext uri="{91240B29-F687-4f45-9708-019B960494DF}">
-              <a14:hiddenLine xmlns="" xmlns:a14="http://schemas.microsoft.com/office/drawing/2010/main" w="9525">
+              <a14:hiddenLine xmlns:a14="http://schemas.microsoft.com/office/drawing/2010/main" xmlns="" w="9525">
                 <a:solidFill>
                   <a:srgbClr val="000000"/>
                 </a:solidFill>
@@ -2580,7 +2582,7 @@
               </a14:hiddenLine>
             </a:ext>
             <a:ext uri="{FAA26D3D-D897-4be2-8F04-BA451C77F1D7}">
-              <ma14:placeholderFlag xmlns="" xmlns:ma14="http://schemas.microsoft.com/office/mac/drawingml/2011/main" val="1"/>
+              <ma14:placeholderFlag xmlns:ma14="http://schemas.microsoft.com/office/mac/drawingml/2011/main" xmlns="" val="1"/>
             </a:ext>
           </a:extLst>
         </p:spPr>
@@ -2656,14 +2658,14 @@
           <a:noFill/>
           <a:extLst>
             <a:ext uri="{909E8E84-426E-40dd-AFC4-6F175D3DCCD1}">
-              <a14:hiddenFill xmlns="" xmlns:a14="http://schemas.microsoft.com/office/drawing/2010/main">
+              <a14:hiddenFill xmlns:a14="http://schemas.microsoft.com/office/drawing/2010/main" xmlns="">
                 <a:solidFill>
                   <a:srgbClr val="FFFFFF"/>
                 </a:solidFill>
               </a14:hiddenFill>
             </a:ext>
             <a:ext uri="{91240B29-F687-4f45-9708-019B960494DF}">
-              <a14:hiddenLine xmlns="" xmlns:a14="http://schemas.microsoft.com/office/drawing/2010/main" w="9525">
+              <a14:hiddenLine xmlns:a14="http://schemas.microsoft.com/office/drawing/2010/main" xmlns="" w="9525">
                 <a:solidFill>
                   <a:srgbClr val="000000"/>
                 </a:solidFill>
@@ -2821,14 +2823,14 @@
           </a:ln>
           <a:extLst>
             <a:ext uri="{909E8E84-426E-40dd-AFC4-6F175D3DCCD1}">
-              <a14:hiddenFill xmlns="" xmlns:a14="http://schemas.microsoft.com/office/drawing/2010/main">
+              <a14:hiddenFill xmlns:a14="http://schemas.microsoft.com/office/drawing/2010/main" xmlns="">
                 <a:solidFill>
                   <a:srgbClr val="FFFFFF"/>
                 </a:solidFill>
               </a14:hiddenFill>
             </a:ext>
             <a:ext uri="{FAA26D3D-D897-4be2-8F04-BA451C77F1D7}">
-              <ma14:placeholderFlag xmlns="" xmlns:ma14="http://schemas.microsoft.com/office/mac/drawingml/2011/main" val="1"/>
+              <ma14:placeholderFlag xmlns:ma14="http://schemas.microsoft.com/office/mac/drawingml/2011/main" xmlns="" val="1"/>
             </a:ext>
           </a:extLst>
         </p:spPr>
@@ -2847,14 +2849,14 @@
           <a:noFill/>
           <a:extLst>
             <a:ext uri="{909E8E84-426E-40dd-AFC4-6F175D3DCCD1}">
-              <a14:hiddenFill xmlns="" xmlns:a14="http://schemas.microsoft.com/office/drawing/2010/main">
+              <a14:hiddenFill xmlns:a14="http://schemas.microsoft.com/office/drawing/2010/main" xmlns="">
                 <a:solidFill>
                   <a:srgbClr val="FFFFFF"/>
                 </a:solidFill>
               </a14:hiddenFill>
             </a:ext>
             <a:ext uri="{91240B29-F687-4f45-9708-019B960494DF}">
-              <a14:hiddenLine xmlns="" xmlns:a14="http://schemas.microsoft.com/office/drawing/2010/main" w="9525">
+              <a14:hiddenLine xmlns:a14="http://schemas.microsoft.com/office/drawing/2010/main" xmlns="" w="9525">
                 <a:solidFill>
                   <a:srgbClr val="000000"/>
                 </a:solidFill>
@@ -2864,7 +2866,7 @@
               </a14:hiddenLine>
             </a:ext>
             <a:ext uri="{FAA26D3D-D897-4be2-8F04-BA451C77F1D7}">
-              <ma14:placeholderFlag xmlns="" xmlns:ma14="http://schemas.microsoft.com/office/mac/drawingml/2011/main" val="1"/>
+              <ma14:placeholderFlag xmlns:ma14="http://schemas.microsoft.com/office/mac/drawingml/2011/main" xmlns="" val="1"/>
             </a:ext>
           </a:extLst>
         </p:spPr>
@@ -2967,14 +2969,14 @@
           <a:noFill/>
           <a:extLst>
             <a:ext uri="{909E8E84-426E-40dd-AFC4-6F175D3DCCD1}">
-              <a14:hiddenFill xmlns="" xmlns:a14="http://schemas.microsoft.com/office/drawing/2010/main">
+              <a14:hiddenFill xmlns:a14="http://schemas.microsoft.com/office/drawing/2010/main" xmlns="">
                 <a:solidFill>
                   <a:srgbClr val="FFFFFF"/>
                 </a:solidFill>
               </a14:hiddenFill>
             </a:ext>
             <a:ext uri="{91240B29-F687-4f45-9708-019B960494DF}">
-              <a14:hiddenLine xmlns="" xmlns:a14="http://schemas.microsoft.com/office/drawing/2010/main" w="9525">
+              <a14:hiddenLine xmlns:a14="http://schemas.microsoft.com/office/drawing/2010/main" xmlns="" w="9525">
                 <a:solidFill>
                   <a:srgbClr val="000000"/>
                 </a:solidFill>
@@ -3132,14 +3134,14 @@
           </a:ln>
           <a:extLst>
             <a:ext uri="{909E8E84-426E-40dd-AFC4-6F175D3DCCD1}">
-              <a14:hiddenFill xmlns="" xmlns:a14="http://schemas.microsoft.com/office/drawing/2010/main">
+              <a14:hiddenFill xmlns:a14="http://schemas.microsoft.com/office/drawing/2010/main" xmlns="">
                 <a:solidFill>
                   <a:srgbClr val="FFFFFF"/>
                 </a:solidFill>
               </a14:hiddenFill>
             </a:ext>
             <a:ext uri="{FAA26D3D-D897-4be2-8F04-BA451C77F1D7}">
-              <ma14:placeholderFlag xmlns="" xmlns:ma14="http://schemas.microsoft.com/office/mac/drawingml/2011/main" val="1"/>
+              <ma14:placeholderFlag xmlns:ma14="http://schemas.microsoft.com/office/mac/drawingml/2011/main" xmlns="" val="1"/>
             </a:ext>
           </a:extLst>
         </p:spPr>
@@ -3158,14 +3160,14 @@
           <a:noFill/>
           <a:extLst>
             <a:ext uri="{909E8E84-426E-40dd-AFC4-6F175D3DCCD1}">
-              <a14:hiddenFill xmlns="" xmlns:a14="http://schemas.microsoft.com/office/drawing/2010/main">
+              <a14:hiddenFill xmlns:a14="http://schemas.microsoft.com/office/drawing/2010/main" xmlns="">
                 <a:solidFill>
                   <a:srgbClr val="FFFFFF"/>
                 </a:solidFill>
               </a14:hiddenFill>
             </a:ext>
             <a:ext uri="{91240B29-F687-4f45-9708-019B960494DF}">
-              <a14:hiddenLine xmlns="" xmlns:a14="http://schemas.microsoft.com/office/drawing/2010/main" w="9525">
+              <a14:hiddenLine xmlns:a14="http://schemas.microsoft.com/office/drawing/2010/main" xmlns="" w="9525">
                 <a:solidFill>
                   <a:srgbClr val="000000"/>
                 </a:solidFill>
@@ -3175,7 +3177,7 @@
               </a14:hiddenLine>
             </a:ext>
             <a:ext uri="{FAA26D3D-D897-4be2-8F04-BA451C77F1D7}">
-              <ma14:placeholderFlag xmlns="" xmlns:ma14="http://schemas.microsoft.com/office/mac/drawingml/2011/main" val="1"/>
+              <ma14:placeholderFlag xmlns:ma14="http://schemas.microsoft.com/office/mac/drawingml/2011/main" xmlns="" val="1"/>
             </a:ext>
           </a:extLst>
         </p:spPr>
@@ -3251,14 +3253,14 @@
           <a:noFill/>
           <a:extLst>
             <a:ext uri="{909E8E84-426E-40dd-AFC4-6F175D3DCCD1}">
-              <a14:hiddenFill xmlns="" xmlns:a14="http://schemas.microsoft.com/office/drawing/2010/main">
+              <a14:hiddenFill xmlns:a14="http://schemas.microsoft.com/office/drawing/2010/main" xmlns="">
                 <a:solidFill>
                   <a:srgbClr val="FFFFFF"/>
                 </a:solidFill>
               </a14:hiddenFill>
             </a:ext>
             <a:ext uri="{91240B29-F687-4f45-9708-019B960494DF}">
-              <a14:hiddenLine xmlns="" xmlns:a14="http://schemas.microsoft.com/office/drawing/2010/main" w="9525">
+              <a14:hiddenLine xmlns:a14="http://schemas.microsoft.com/office/drawing/2010/main" xmlns="" w="9525">
                 <a:solidFill>
                   <a:srgbClr val="000000"/>
                 </a:solidFill>
@@ -3416,14 +3418,14 @@
           </a:ln>
           <a:extLst>
             <a:ext uri="{909E8E84-426E-40dd-AFC4-6F175D3DCCD1}">
-              <a14:hiddenFill xmlns="" xmlns:a14="http://schemas.microsoft.com/office/drawing/2010/main">
+              <a14:hiddenFill xmlns:a14="http://schemas.microsoft.com/office/drawing/2010/main" xmlns="">
                 <a:solidFill>
                   <a:srgbClr val="FFFFFF"/>
                 </a:solidFill>
               </a14:hiddenFill>
             </a:ext>
             <a:ext uri="{FAA26D3D-D897-4be2-8F04-BA451C77F1D7}">
-              <ma14:placeholderFlag xmlns="" xmlns:ma14="http://schemas.microsoft.com/office/mac/drawingml/2011/main" val="1"/>
+              <ma14:placeholderFlag xmlns:ma14="http://schemas.microsoft.com/office/mac/drawingml/2011/main" xmlns="" val="1"/>
             </a:ext>
           </a:extLst>
         </p:spPr>
@@ -3442,14 +3444,14 @@
           <a:noFill/>
           <a:extLst>
             <a:ext uri="{909E8E84-426E-40dd-AFC4-6F175D3DCCD1}">
-              <a14:hiddenFill xmlns="" xmlns:a14="http://schemas.microsoft.com/office/drawing/2010/main">
+              <a14:hiddenFill xmlns:a14="http://schemas.microsoft.com/office/drawing/2010/main" xmlns="">
                 <a:solidFill>
                   <a:srgbClr val="FFFFFF"/>
                 </a:solidFill>
               </a14:hiddenFill>
             </a:ext>
             <a:ext uri="{91240B29-F687-4f45-9708-019B960494DF}">
-              <a14:hiddenLine xmlns="" xmlns:a14="http://schemas.microsoft.com/office/drawing/2010/main" w="9525">
+              <a14:hiddenLine xmlns:a14="http://schemas.microsoft.com/office/drawing/2010/main" xmlns="" w="9525">
                 <a:solidFill>
                   <a:srgbClr val="000000"/>
                 </a:solidFill>
@@ -3459,7 +3461,7 @@
               </a14:hiddenLine>
             </a:ext>
             <a:ext uri="{FAA26D3D-D897-4be2-8F04-BA451C77F1D7}">
-              <ma14:placeholderFlag xmlns="" xmlns:ma14="http://schemas.microsoft.com/office/mac/drawingml/2011/main" val="1"/>
+              <ma14:placeholderFlag xmlns:ma14="http://schemas.microsoft.com/office/mac/drawingml/2011/main" xmlns="" val="1"/>
             </a:ext>
           </a:extLst>
         </p:spPr>
@@ -3602,14 +3604,14 @@
           <a:noFill/>
           <a:extLst>
             <a:ext uri="{909E8E84-426E-40dd-AFC4-6F175D3DCCD1}">
-              <a14:hiddenFill xmlns="" xmlns:a14="http://schemas.microsoft.com/office/drawing/2010/main">
+              <a14:hiddenFill xmlns:a14="http://schemas.microsoft.com/office/drawing/2010/main" xmlns="">
                 <a:solidFill>
                   <a:srgbClr val="FFFFFF"/>
                 </a:solidFill>
               </a14:hiddenFill>
             </a:ext>
             <a:ext uri="{91240B29-F687-4f45-9708-019B960494DF}">
-              <a14:hiddenLine xmlns="" xmlns:a14="http://schemas.microsoft.com/office/drawing/2010/main" w="9525">
+              <a14:hiddenLine xmlns:a14="http://schemas.microsoft.com/office/drawing/2010/main" xmlns="" w="9525">
                 <a:solidFill>
                   <a:srgbClr val="000000"/>
                 </a:solidFill>
@@ -3767,14 +3769,14 @@
           </a:ln>
           <a:extLst>
             <a:ext uri="{909E8E84-426E-40dd-AFC4-6F175D3DCCD1}">
-              <a14:hiddenFill xmlns="" xmlns:a14="http://schemas.microsoft.com/office/drawing/2010/main">
+              <a14:hiddenFill xmlns:a14="http://schemas.microsoft.com/office/drawing/2010/main" xmlns="">
                 <a:solidFill>
                   <a:srgbClr val="FFFFFF"/>
                 </a:solidFill>
               </a14:hiddenFill>
             </a:ext>
             <a:ext uri="{FAA26D3D-D897-4be2-8F04-BA451C77F1D7}">
-              <ma14:placeholderFlag xmlns="" xmlns:ma14="http://schemas.microsoft.com/office/mac/drawingml/2011/main" val="1"/>
+              <ma14:placeholderFlag xmlns:ma14="http://schemas.microsoft.com/office/mac/drawingml/2011/main" xmlns="" val="1"/>
             </a:ext>
           </a:extLst>
         </p:spPr>
@@ -4480,7 +4482,7 @@
     </p:spTree>
     <p:extLst>
       <p:ext uri="{BB962C8B-B14F-4D97-AF65-F5344CB8AC3E}">
-        <p14:creationId xmlns:p14="http://schemas.microsoft.com/office/powerpoint/2010/main" val="241190468"/>
+        <p14:creationId xmlns:p14="http://schemas.microsoft.com/office/powerpoint/2010/main" val="3132380762"/>
       </p:ext>
     </p:extLst>
   </p:cSld>
@@ -4536,14 +4538,6 @@
           </a:bodyPr>
           <a:lstStyle/>
           <a:p>
-            <a:r>
-              <a:rPr lang="en-US" dirty="0" smtClean="0"/>
-              <a:t>When visualizing</a:t>
-            </a:r>
-            <a:r>
-              <a:rPr lang="en-US" baseline="0" dirty="0" smtClean="0"/>
-              <a:t> in IGV, scale matters – for this kind of data be sure to set the scale correctly – which means you need to know a little bit about how your data.</a:t>
-            </a:r>
             <a:endParaRPr lang="en-US" dirty="0"/>
           </a:p>
         </p:txBody>
@@ -4580,7 +4574,7 @@
     </p:spTree>
     <p:extLst>
       <p:ext uri="{BB962C8B-B14F-4D97-AF65-F5344CB8AC3E}">
-        <p14:creationId xmlns:p14="http://schemas.microsoft.com/office/powerpoint/2010/main" val="1917521525"/>
+        <p14:creationId xmlns:p14="http://schemas.microsoft.com/office/powerpoint/2010/main" val="241190468"/>
       </p:ext>
     </p:extLst>
   </p:cSld>
@@ -4636,6 +4630,14 @@
           </a:bodyPr>
           <a:lstStyle/>
           <a:p>
+            <a:r>
+              <a:rPr lang="en-US" dirty="0" smtClean="0"/>
+              <a:t>When visualizing</a:t>
+            </a:r>
+            <a:r>
+              <a:rPr lang="en-US" baseline="0" dirty="0" smtClean="0"/>
+              <a:t> in IGV, scale matters – for this kind of data be sure to set the scale correctly – which means you need to know a little bit about how your data.</a:t>
+            </a:r>
             <a:endParaRPr lang="en-US" dirty="0"/>
           </a:p>
         </p:txBody>
@@ -4728,14 +4730,6 @@
           </a:bodyPr>
           <a:lstStyle/>
           <a:p>
-            <a:r>
-              <a:rPr lang="en-US" dirty="0" smtClean="0"/>
-              <a:t>NOTE: type in C7 in search bar. Mention that the reads</a:t>
-            </a:r>
-            <a:r>
-              <a:rPr lang="en-US" baseline="0" dirty="0" smtClean="0"/>
-              <a:t> are at the gene level, also mention that you have to zoom out to see some other genes.</a:t>
-            </a:r>
             <a:endParaRPr lang="en-US" dirty="0"/>
           </a:p>
         </p:txBody>
@@ -4830,27 +4824,11 @@
           <a:p>
             <a:r>
               <a:rPr lang="en-US" dirty="0" smtClean="0"/>
-              <a:t>We won’t do this now – but this is something you can try later – the data</a:t>
+              <a:t>NOTE: type in C7 in search bar. Mention that the reads</a:t>
             </a:r>
             <a:r>
               <a:rPr lang="en-US" baseline="0" dirty="0" smtClean="0"/>
-              <a:t> referred to is publicly available from </a:t>
-            </a:r>
-            <a:r>
-              <a:rPr lang="en-US" baseline="0" dirty="0" err="1" smtClean="0"/>
-              <a:t>GenomeSpace</a:t>
-            </a:r>
-            <a:r>
-              <a:rPr lang="en-US" baseline="0" dirty="0" smtClean="0"/>
-              <a:t>&gt; Load File from </a:t>
-            </a:r>
-            <a:r>
-              <a:rPr lang="en-US" baseline="0" dirty="0" err="1" smtClean="0"/>
-              <a:t>GenomeSpace</a:t>
-            </a:r>
-            <a:r>
-              <a:rPr lang="en-US" baseline="0" dirty="0" smtClean="0"/>
-              <a:t>.</a:t>
+              <a:t> are at the gene level, also mention that you have to zoom out to see some other genes.</a:t>
             </a:r>
             <a:endParaRPr lang="en-US" dirty="0"/>
           </a:p>
@@ -4929,14 +4907,14 @@
           <a:noFill/>
           <a:extLst>
             <a:ext uri="{909E8E84-426E-40dd-AFC4-6F175D3DCCD1}">
-              <a14:hiddenFill xmlns="" xmlns:a14="http://schemas.microsoft.com/office/drawing/2010/main">
+              <a14:hiddenFill xmlns:a14="http://schemas.microsoft.com/office/drawing/2010/main" xmlns="">
                 <a:solidFill>
                   <a:srgbClr val="FFFFFF"/>
                 </a:solidFill>
               </a14:hiddenFill>
             </a:ext>
             <a:ext uri="{91240B29-F687-4f45-9708-019B960494DF}">
-              <a14:hiddenLine xmlns="" xmlns:a14="http://schemas.microsoft.com/office/drawing/2010/main" w="9525">
+              <a14:hiddenLine xmlns:a14="http://schemas.microsoft.com/office/drawing/2010/main" xmlns="" w="9525">
                 <a:solidFill>
                   <a:srgbClr val="000000"/>
                 </a:solidFill>
@@ -5094,14 +5072,14 @@
           </a:ln>
           <a:extLst>
             <a:ext uri="{909E8E84-426E-40dd-AFC4-6F175D3DCCD1}">
-              <a14:hiddenFill xmlns="" xmlns:a14="http://schemas.microsoft.com/office/drawing/2010/main">
+              <a14:hiddenFill xmlns:a14="http://schemas.microsoft.com/office/drawing/2010/main" xmlns="">
                 <a:solidFill>
                   <a:srgbClr val="FFFFFF"/>
                 </a:solidFill>
               </a14:hiddenFill>
             </a:ext>
             <a:ext uri="{FAA26D3D-D897-4be2-8F04-BA451C77F1D7}">
-              <ma14:placeholderFlag xmlns="" xmlns:ma14="http://schemas.microsoft.com/office/mac/drawingml/2011/main" val="1"/>
+              <ma14:placeholderFlag xmlns:ma14="http://schemas.microsoft.com/office/mac/drawingml/2011/main" xmlns="" val="1"/>
             </a:ext>
           </a:extLst>
         </p:spPr>
@@ -5120,14 +5098,14 @@
           <a:noFill/>
           <a:extLst>
             <a:ext uri="{909E8E84-426E-40dd-AFC4-6F175D3DCCD1}">
-              <a14:hiddenFill xmlns="" xmlns:a14="http://schemas.microsoft.com/office/drawing/2010/main">
+              <a14:hiddenFill xmlns:a14="http://schemas.microsoft.com/office/drawing/2010/main" xmlns="">
                 <a:solidFill>
                   <a:srgbClr val="FFFFFF"/>
                 </a:solidFill>
               </a14:hiddenFill>
             </a:ext>
             <a:ext uri="{91240B29-F687-4f45-9708-019B960494DF}">
-              <a14:hiddenLine xmlns="" xmlns:a14="http://schemas.microsoft.com/office/drawing/2010/main" w="9525">
+              <a14:hiddenLine xmlns:a14="http://schemas.microsoft.com/office/drawing/2010/main" xmlns="" w="9525">
                 <a:solidFill>
                   <a:srgbClr val="000000"/>
                 </a:solidFill>
@@ -5286,6 +5264,30 @@
           </a:bodyPr>
           <a:lstStyle/>
           <a:p>
+            <a:r>
+              <a:rPr lang="en-US" dirty="0" smtClean="0"/>
+              <a:t>We won’t do this now – but this is something you can try later – the data</a:t>
+            </a:r>
+            <a:r>
+              <a:rPr lang="en-US" baseline="0" dirty="0" smtClean="0"/>
+              <a:t> referred to is publicly available from </a:t>
+            </a:r>
+            <a:r>
+              <a:rPr lang="en-US" baseline="0" dirty="0" err="1" smtClean="0"/>
+              <a:t>GenomeSpace</a:t>
+            </a:r>
+            <a:r>
+              <a:rPr lang="en-US" baseline="0" dirty="0" smtClean="0"/>
+              <a:t>&gt; Load File from </a:t>
+            </a:r>
+            <a:r>
+              <a:rPr lang="en-US" baseline="0" dirty="0" err="1" smtClean="0"/>
+              <a:t>GenomeSpace</a:t>
+            </a:r>
+            <a:r>
+              <a:rPr lang="en-US" baseline="0" dirty="0" smtClean="0"/>
+              <a:t>.</a:t>
+            </a:r>
             <a:endParaRPr lang="en-US" dirty="0"/>
           </a:p>
         </p:txBody>
@@ -5314,6 +5316,98 @@
                 <a:defRPr/>
               </a:pPr>
               <a:t>30</a:t>
+            </a:fld>
+            <a:endParaRPr lang="en-US"/>
+          </a:p>
+        </p:txBody>
+      </p:sp>
+    </p:spTree>
+    <p:extLst>
+      <p:ext uri="{BB962C8B-B14F-4D97-AF65-F5344CB8AC3E}">
+        <p14:creationId xmlns:p14="http://schemas.microsoft.com/office/powerpoint/2010/main" val="1917521525"/>
+      </p:ext>
+    </p:extLst>
+  </p:cSld>
+  <p:clrMapOvr>
+    <a:masterClrMapping/>
+  </p:clrMapOvr>
+</p:notes>
+</file>
+
+<file path=ppt/notesSlides/notesSlide31.xml><?xml version="1.0" encoding="utf-8"?>
+<p:notes xmlns:a="http://schemas.openxmlformats.org/drawingml/2006/main" xmlns:r="http://schemas.openxmlformats.org/officeDocument/2006/relationships" xmlns:p="http://schemas.openxmlformats.org/presentationml/2006/main">
+  <p:cSld>
+    <p:spTree>
+      <p:nvGrpSpPr>
+        <p:cNvPr id="1" name=""/>
+        <p:cNvGrpSpPr/>
+        <p:nvPr/>
+      </p:nvGrpSpPr>
+      <p:grpSpPr>
+        <a:xfrm>
+          <a:off x="0" y="0"/>
+          <a:ext cx="0" cy="0"/>
+          <a:chOff x="0" y="0"/>
+          <a:chExt cx="0" cy="0"/>
+        </a:xfrm>
+      </p:grpSpPr>
+      <p:sp>
+        <p:nvSpPr>
+          <p:cNvPr id="2" name="Slide Image Placeholder 1"/>
+          <p:cNvSpPr>
+            <a:spLocks noGrp="1" noRot="1" noChangeAspect="1"/>
+          </p:cNvSpPr>
+          <p:nvPr>
+            <p:ph type="sldImg"/>
+          </p:nvPr>
+        </p:nvSpPr>
+        <p:spPr/>
+      </p:sp>
+      <p:sp>
+        <p:nvSpPr>
+          <p:cNvPr id="3" name="Notes Placeholder 2"/>
+          <p:cNvSpPr>
+            <a:spLocks noGrp="1"/>
+          </p:cNvSpPr>
+          <p:nvPr>
+            <p:ph type="body" idx="1"/>
+          </p:nvPr>
+        </p:nvSpPr>
+        <p:spPr/>
+        <p:txBody>
+          <a:bodyPr>
+            <a:normAutofit/>
+          </a:bodyPr>
+          <a:lstStyle/>
+          <a:p>
+            <a:endParaRPr lang="en-US" dirty="0"/>
+          </a:p>
+        </p:txBody>
+      </p:sp>
+      <p:sp>
+        <p:nvSpPr>
+          <p:cNvPr id="4" name="Slide Number Placeholder 3"/>
+          <p:cNvSpPr>
+            <a:spLocks noGrp="1"/>
+          </p:cNvSpPr>
+          <p:nvPr>
+            <p:ph type="sldNum" sz="quarter" idx="10"/>
+          </p:nvPr>
+        </p:nvSpPr>
+        <p:spPr/>
+        <p:txBody>
+          <a:bodyPr/>
+          <a:lstStyle/>
+          <a:p>
+            <a:pPr>
+              <a:defRPr/>
+            </a:pPr>
+            <a:fld id="{820C2458-D089-4042-B745-EB148F3F831A}" type="slidenum">
+              <a:rPr lang="en-US" smtClean="0"/>
+              <a:pPr>
+                <a:defRPr/>
+              </a:pPr>
+              <a:t>31</a:t>
             </a:fld>
             <a:endParaRPr lang="en-US"/>
           </a:p>
@@ -5363,14 +5457,14 @@
           <a:noFill/>
           <a:extLst>
             <a:ext uri="{909E8E84-426E-40dd-AFC4-6F175D3DCCD1}">
-              <a14:hiddenFill xmlns="" xmlns:a14="http://schemas.microsoft.com/office/drawing/2010/main">
+              <a14:hiddenFill xmlns:a14="http://schemas.microsoft.com/office/drawing/2010/main" xmlns="">
                 <a:solidFill>
                   <a:srgbClr val="FFFFFF"/>
                 </a:solidFill>
               </a14:hiddenFill>
             </a:ext>
             <a:ext uri="{91240B29-F687-4f45-9708-019B960494DF}">
-              <a14:hiddenLine xmlns="" xmlns:a14="http://schemas.microsoft.com/office/drawing/2010/main" w="9525">
+              <a14:hiddenLine xmlns:a14="http://schemas.microsoft.com/office/drawing/2010/main" xmlns="" w="9525">
                 <a:solidFill>
                   <a:srgbClr val="000000"/>
                 </a:solidFill>
@@ -5528,14 +5622,14 @@
           </a:ln>
           <a:extLst>
             <a:ext uri="{909E8E84-426E-40dd-AFC4-6F175D3DCCD1}">
-              <a14:hiddenFill xmlns="" xmlns:a14="http://schemas.microsoft.com/office/drawing/2010/main">
+              <a14:hiddenFill xmlns:a14="http://schemas.microsoft.com/office/drawing/2010/main" xmlns="">
                 <a:solidFill>
                   <a:srgbClr val="FFFFFF"/>
                 </a:solidFill>
               </a14:hiddenFill>
             </a:ext>
             <a:ext uri="{FAA26D3D-D897-4be2-8F04-BA451C77F1D7}">
-              <ma14:placeholderFlag xmlns="" xmlns:ma14="http://schemas.microsoft.com/office/mac/drawingml/2011/main" val="1"/>
+              <ma14:placeholderFlag xmlns:ma14="http://schemas.microsoft.com/office/mac/drawingml/2011/main" xmlns="" val="1"/>
             </a:ext>
           </a:extLst>
         </p:spPr>
@@ -5554,14 +5648,14 @@
           <a:noFill/>
           <a:extLst>
             <a:ext uri="{909E8E84-426E-40dd-AFC4-6F175D3DCCD1}">
-              <a14:hiddenFill xmlns="" xmlns:a14="http://schemas.microsoft.com/office/drawing/2010/main">
+              <a14:hiddenFill xmlns:a14="http://schemas.microsoft.com/office/drawing/2010/main" xmlns="">
                 <a:solidFill>
                   <a:srgbClr val="FFFFFF"/>
                 </a:solidFill>
               </a14:hiddenFill>
             </a:ext>
             <a:ext uri="{91240B29-F687-4f45-9708-019B960494DF}">
-              <a14:hiddenLine xmlns="" xmlns:a14="http://schemas.microsoft.com/office/drawing/2010/main" w="9525">
+              <a14:hiddenLine xmlns:a14="http://schemas.microsoft.com/office/drawing/2010/main" xmlns="" w="9525">
                 <a:solidFill>
                   <a:srgbClr val="000000"/>
                 </a:solidFill>
@@ -5659,14 +5753,14 @@
           <a:noFill/>
           <a:extLst>
             <a:ext uri="{909E8E84-426E-40dd-AFC4-6F175D3DCCD1}">
-              <a14:hiddenFill xmlns="" xmlns:a14="http://schemas.microsoft.com/office/drawing/2010/main">
+              <a14:hiddenFill xmlns:a14="http://schemas.microsoft.com/office/drawing/2010/main" xmlns="">
                 <a:solidFill>
                   <a:srgbClr val="FFFFFF"/>
                 </a:solidFill>
               </a14:hiddenFill>
             </a:ext>
             <a:ext uri="{91240B29-F687-4f45-9708-019B960494DF}">
-              <a14:hiddenLine xmlns="" xmlns:a14="http://schemas.microsoft.com/office/drawing/2010/main" w="9525">
+              <a14:hiddenLine xmlns:a14="http://schemas.microsoft.com/office/drawing/2010/main" xmlns="" w="9525">
                 <a:solidFill>
                   <a:srgbClr val="000000"/>
                 </a:solidFill>
@@ -5824,14 +5918,14 @@
           </a:ln>
           <a:extLst>
             <a:ext uri="{909E8E84-426E-40dd-AFC4-6F175D3DCCD1}">
-              <a14:hiddenFill xmlns="" xmlns:a14="http://schemas.microsoft.com/office/drawing/2010/main">
+              <a14:hiddenFill xmlns:a14="http://schemas.microsoft.com/office/drawing/2010/main" xmlns="">
                 <a:solidFill>
                   <a:srgbClr val="FFFFFF"/>
                 </a:solidFill>
               </a14:hiddenFill>
             </a:ext>
             <a:ext uri="{FAA26D3D-D897-4be2-8F04-BA451C77F1D7}">
-              <ma14:placeholderFlag xmlns="" xmlns:ma14="http://schemas.microsoft.com/office/mac/drawingml/2011/main" val="1"/>
+              <ma14:placeholderFlag xmlns:ma14="http://schemas.microsoft.com/office/mac/drawingml/2011/main" xmlns="" val="1"/>
             </a:ext>
           </a:extLst>
         </p:spPr>
@@ -5850,14 +5944,14 @@
           <a:noFill/>
           <a:extLst>
             <a:ext uri="{909E8E84-426E-40dd-AFC4-6F175D3DCCD1}">
-              <a14:hiddenFill xmlns="" xmlns:a14="http://schemas.microsoft.com/office/drawing/2010/main">
+              <a14:hiddenFill xmlns:a14="http://schemas.microsoft.com/office/drawing/2010/main" xmlns="">
                 <a:solidFill>
                   <a:srgbClr val="FFFFFF"/>
                 </a:solidFill>
               </a14:hiddenFill>
             </a:ext>
             <a:ext uri="{91240B29-F687-4f45-9708-019B960494DF}">
-              <a14:hiddenLine xmlns="" xmlns:a14="http://schemas.microsoft.com/office/drawing/2010/main" w="9525">
+              <a14:hiddenLine xmlns:a14="http://schemas.microsoft.com/office/drawing/2010/main" xmlns="" w="9525">
                 <a:solidFill>
                   <a:srgbClr val="000000"/>
                 </a:solidFill>
@@ -5867,7 +5961,7 @@
               </a14:hiddenLine>
             </a:ext>
             <a:ext uri="{FAA26D3D-D897-4be2-8F04-BA451C77F1D7}">
-              <ma14:placeholderFlag xmlns="" xmlns:ma14="http://schemas.microsoft.com/office/mac/drawingml/2011/main" val="1"/>
+              <ma14:placeholderFlag xmlns:ma14="http://schemas.microsoft.com/office/mac/drawingml/2011/main" xmlns="" val="1"/>
             </a:ext>
           </a:extLst>
         </p:spPr>
@@ -7153,14 +7247,14 @@
           </a:ln>
           <a:extLst>
             <a:ext uri="{909E8E84-426E-40dd-AFC4-6F175D3DCCD1}">
-              <a14:hiddenFill xmlns="" xmlns:a14="http://schemas.microsoft.com/office/drawing/2010/main">
+              <a14:hiddenFill xmlns:a14="http://schemas.microsoft.com/office/drawing/2010/main" xmlns="">
                 <a:solidFill>
                   <a:srgbClr val="FFFFFF"/>
                 </a:solidFill>
               </a14:hiddenFill>
             </a:ext>
             <a:ext uri="{91240B29-F687-4f45-9708-019B960494DF}">
-              <a14:hiddenLine xmlns="" xmlns:a14="http://schemas.microsoft.com/office/drawing/2010/main" w="9525">
+              <a14:hiddenLine xmlns:a14="http://schemas.microsoft.com/office/drawing/2010/main" xmlns="" w="9525">
                 <a:solidFill>
                   <a:srgbClr val="000000"/>
                 </a:solidFill>
@@ -7294,14 +7388,14 @@
           </a:ln>
           <a:extLst>
             <a:ext uri="{909E8E84-426E-40dd-AFC4-6F175D3DCCD1}">
-              <a14:hiddenFill xmlns="" xmlns:a14="http://schemas.microsoft.com/office/drawing/2010/main">
+              <a14:hiddenFill xmlns:a14="http://schemas.microsoft.com/office/drawing/2010/main" xmlns="">
                 <a:solidFill>
                   <a:srgbClr val="FFFFFF"/>
                 </a:solidFill>
               </a14:hiddenFill>
             </a:ext>
             <a:ext uri="{91240B29-F687-4f45-9708-019B960494DF}">
-              <a14:hiddenLine xmlns="" xmlns:a14="http://schemas.microsoft.com/office/drawing/2010/main" w="9525">
+              <a14:hiddenLine xmlns:a14="http://schemas.microsoft.com/office/drawing/2010/main" xmlns="" w="9525">
                 <a:solidFill>
                   <a:srgbClr val="000000"/>
                 </a:solidFill>
@@ -7435,14 +7529,14 @@
           </a:ln>
           <a:extLst>
             <a:ext uri="{909E8E84-426E-40dd-AFC4-6F175D3DCCD1}">
-              <a14:hiddenFill xmlns="" xmlns:a14="http://schemas.microsoft.com/office/drawing/2010/main">
+              <a14:hiddenFill xmlns:a14="http://schemas.microsoft.com/office/drawing/2010/main" xmlns="">
                 <a:solidFill>
                   <a:srgbClr val="FFFFFF"/>
                 </a:solidFill>
               </a14:hiddenFill>
             </a:ext>
             <a:ext uri="{91240B29-F687-4f45-9708-019B960494DF}">
-              <a14:hiddenLine xmlns="" xmlns:a14="http://schemas.microsoft.com/office/drawing/2010/main" w="9525">
+              <a14:hiddenLine xmlns:a14="http://schemas.microsoft.com/office/drawing/2010/main" xmlns="" w="9525">
                 <a:solidFill>
                   <a:srgbClr val="000000"/>
                 </a:solidFill>
@@ -7526,7 +7620,7 @@
           </a:ln>
           <a:extLst>
             <a:ext uri="{909E8E84-426E-40dd-AFC4-6F175D3DCCD1}">
-              <a14:hiddenFill xmlns="" xmlns:a14="http://schemas.microsoft.com/office/drawing/2010/main">
+              <a14:hiddenFill xmlns:a14="http://schemas.microsoft.com/office/drawing/2010/main" xmlns="">
                 <a:noFill/>
               </a14:hiddenFill>
             </a:ext>
@@ -7568,14 +7662,14 @@
           </a:ln>
           <a:extLst>
             <a:ext uri="{909E8E84-426E-40dd-AFC4-6F175D3DCCD1}">
-              <a14:hiddenFill xmlns="" xmlns:a14="http://schemas.microsoft.com/office/drawing/2010/main">
+              <a14:hiddenFill xmlns:a14="http://schemas.microsoft.com/office/drawing/2010/main" xmlns="">
                 <a:solidFill>
                   <a:srgbClr val="FFFFFF"/>
                 </a:solidFill>
               </a14:hiddenFill>
             </a:ext>
             <a:ext uri="{91240B29-F687-4f45-9708-019B960494DF}">
-              <a14:hiddenLine xmlns="" xmlns:a14="http://schemas.microsoft.com/office/drawing/2010/main" w="9525">
+              <a14:hiddenLine xmlns:a14="http://schemas.microsoft.com/office/drawing/2010/main" xmlns="" w="9525">
                 <a:solidFill>
                   <a:srgbClr val="000000"/>
                 </a:solidFill>
@@ -7736,14 +7830,14 @@
           </a:ln>
           <a:extLst>
             <a:ext uri="{909E8E84-426E-40dd-AFC4-6F175D3DCCD1}">
-              <a14:hiddenFill xmlns="" xmlns:a14="http://schemas.microsoft.com/office/drawing/2010/main">
+              <a14:hiddenFill xmlns:a14="http://schemas.microsoft.com/office/drawing/2010/main" xmlns="">
                 <a:solidFill>
                   <a:srgbClr val="FFFFFF"/>
                 </a:solidFill>
               </a14:hiddenFill>
             </a:ext>
             <a:ext uri="{91240B29-F687-4f45-9708-019B960494DF}">
-              <a14:hiddenLine xmlns="" xmlns:a14="http://schemas.microsoft.com/office/drawing/2010/main" w="9525">
+              <a14:hiddenLine xmlns:a14="http://schemas.microsoft.com/office/drawing/2010/main" xmlns="" w="9525">
                 <a:solidFill>
                   <a:srgbClr val="000000"/>
                 </a:solidFill>
@@ -7877,14 +7971,14 @@
           </a:ln>
           <a:extLst>
             <a:ext uri="{909E8E84-426E-40dd-AFC4-6F175D3DCCD1}">
-              <a14:hiddenFill xmlns="" xmlns:a14="http://schemas.microsoft.com/office/drawing/2010/main">
+              <a14:hiddenFill xmlns:a14="http://schemas.microsoft.com/office/drawing/2010/main" xmlns="">
                 <a:solidFill>
                   <a:srgbClr val="FFFFFF"/>
                 </a:solidFill>
               </a14:hiddenFill>
             </a:ext>
             <a:ext uri="{91240B29-F687-4f45-9708-019B960494DF}">
-              <a14:hiddenLine xmlns="" xmlns:a14="http://schemas.microsoft.com/office/drawing/2010/main" w="9525">
+              <a14:hiddenLine xmlns:a14="http://schemas.microsoft.com/office/drawing/2010/main" xmlns="" w="9525">
                 <a:solidFill>
                   <a:srgbClr val="000000"/>
                 </a:solidFill>
@@ -8018,14 +8112,14 @@
           </a:ln>
           <a:extLst>
             <a:ext uri="{909E8E84-426E-40dd-AFC4-6F175D3DCCD1}">
-              <a14:hiddenFill xmlns="" xmlns:a14="http://schemas.microsoft.com/office/drawing/2010/main">
+              <a14:hiddenFill xmlns:a14="http://schemas.microsoft.com/office/drawing/2010/main" xmlns="">
                 <a:solidFill>
                   <a:srgbClr val="FFFFFF"/>
                 </a:solidFill>
               </a14:hiddenFill>
             </a:ext>
             <a:ext uri="{91240B29-F687-4f45-9708-019B960494DF}">
-              <a14:hiddenLine xmlns="" xmlns:a14="http://schemas.microsoft.com/office/drawing/2010/main" w="9525">
+              <a14:hiddenLine xmlns:a14="http://schemas.microsoft.com/office/drawing/2010/main" xmlns="" w="9525">
                 <a:solidFill>
                   <a:srgbClr val="000000"/>
                 </a:solidFill>
@@ -8109,7 +8203,7 @@
           </a:ln>
           <a:extLst>
             <a:ext uri="{909E8E84-426E-40dd-AFC4-6F175D3DCCD1}">
-              <a14:hiddenFill xmlns="" xmlns:a14="http://schemas.microsoft.com/office/drawing/2010/main">
+              <a14:hiddenFill xmlns:a14="http://schemas.microsoft.com/office/drawing/2010/main" xmlns="">
                 <a:noFill/>
               </a14:hiddenFill>
             </a:ext>
@@ -8151,14 +8245,14 @@
           </a:ln>
           <a:extLst>
             <a:ext uri="{909E8E84-426E-40dd-AFC4-6F175D3DCCD1}">
-              <a14:hiddenFill xmlns="" xmlns:a14="http://schemas.microsoft.com/office/drawing/2010/main">
+              <a14:hiddenFill xmlns:a14="http://schemas.microsoft.com/office/drawing/2010/main" xmlns="">
                 <a:solidFill>
                   <a:srgbClr val="FFFFFF"/>
                 </a:solidFill>
               </a14:hiddenFill>
             </a:ext>
             <a:ext uri="{91240B29-F687-4f45-9708-019B960494DF}">
-              <a14:hiddenLine xmlns="" xmlns:a14="http://schemas.microsoft.com/office/drawing/2010/main" w="9525">
+              <a14:hiddenLine xmlns:a14="http://schemas.microsoft.com/office/drawing/2010/main" xmlns="" w="9525">
                 <a:solidFill>
                   <a:srgbClr val="000000"/>
                 </a:solidFill>
@@ -8319,14 +8413,14 @@
           </a:ln>
           <a:extLst>
             <a:ext uri="{909E8E84-426E-40dd-AFC4-6F175D3DCCD1}">
-              <a14:hiddenFill xmlns="" xmlns:a14="http://schemas.microsoft.com/office/drawing/2010/main">
+              <a14:hiddenFill xmlns:a14="http://schemas.microsoft.com/office/drawing/2010/main" xmlns="">
                 <a:solidFill>
                   <a:srgbClr val="FFFFFF"/>
                 </a:solidFill>
               </a14:hiddenFill>
             </a:ext>
             <a:ext uri="{91240B29-F687-4f45-9708-019B960494DF}">
-              <a14:hiddenLine xmlns="" xmlns:a14="http://schemas.microsoft.com/office/drawing/2010/main" w="9525">
+              <a14:hiddenLine xmlns:a14="http://schemas.microsoft.com/office/drawing/2010/main" xmlns="" w="9525">
                 <a:solidFill>
                   <a:srgbClr val="000000"/>
                 </a:solidFill>
@@ -8460,14 +8554,14 @@
           </a:ln>
           <a:extLst>
             <a:ext uri="{909E8E84-426E-40dd-AFC4-6F175D3DCCD1}">
-              <a14:hiddenFill xmlns="" xmlns:a14="http://schemas.microsoft.com/office/drawing/2010/main">
+              <a14:hiddenFill xmlns:a14="http://schemas.microsoft.com/office/drawing/2010/main" xmlns="">
                 <a:solidFill>
                   <a:srgbClr val="FFFFFF"/>
                 </a:solidFill>
               </a14:hiddenFill>
             </a:ext>
             <a:ext uri="{91240B29-F687-4f45-9708-019B960494DF}">
-              <a14:hiddenLine xmlns="" xmlns:a14="http://schemas.microsoft.com/office/drawing/2010/main" w="9525">
+              <a14:hiddenLine xmlns:a14="http://schemas.microsoft.com/office/drawing/2010/main" xmlns="" w="9525">
                 <a:solidFill>
                   <a:srgbClr val="000000"/>
                 </a:solidFill>
@@ -8601,14 +8695,14 @@
           </a:ln>
           <a:extLst>
             <a:ext uri="{909E8E84-426E-40dd-AFC4-6F175D3DCCD1}">
-              <a14:hiddenFill xmlns="" xmlns:a14="http://schemas.microsoft.com/office/drawing/2010/main">
+              <a14:hiddenFill xmlns:a14="http://schemas.microsoft.com/office/drawing/2010/main" xmlns="">
                 <a:solidFill>
                   <a:srgbClr val="FFFFFF"/>
                 </a:solidFill>
               </a14:hiddenFill>
             </a:ext>
             <a:ext uri="{91240B29-F687-4f45-9708-019B960494DF}">
-              <a14:hiddenLine xmlns="" xmlns:a14="http://schemas.microsoft.com/office/drawing/2010/main" w="9525">
+              <a14:hiddenLine xmlns:a14="http://schemas.microsoft.com/office/drawing/2010/main" xmlns="" w="9525">
                 <a:solidFill>
                   <a:srgbClr val="000000"/>
                 </a:solidFill>
@@ -8692,7 +8786,7 @@
           </a:ln>
           <a:extLst>
             <a:ext uri="{909E8E84-426E-40dd-AFC4-6F175D3DCCD1}">
-              <a14:hiddenFill xmlns="" xmlns:a14="http://schemas.microsoft.com/office/drawing/2010/main">
+              <a14:hiddenFill xmlns:a14="http://schemas.microsoft.com/office/drawing/2010/main" xmlns="">
                 <a:noFill/>
               </a14:hiddenFill>
             </a:ext>
@@ -8734,14 +8828,14 @@
           </a:ln>
           <a:extLst>
             <a:ext uri="{909E8E84-426E-40dd-AFC4-6F175D3DCCD1}">
-              <a14:hiddenFill xmlns="" xmlns:a14="http://schemas.microsoft.com/office/drawing/2010/main">
+              <a14:hiddenFill xmlns:a14="http://schemas.microsoft.com/office/drawing/2010/main" xmlns="">
                 <a:solidFill>
                   <a:srgbClr val="FFFFFF"/>
                 </a:solidFill>
               </a14:hiddenFill>
             </a:ext>
             <a:ext uri="{91240B29-F687-4f45-9708-019B960494DF}">
-              <a14:hiddenLine xmlns="" xmlns:a14="http://schemas.microsoft.com/office/drawing/2010/main" w="9525">
+              <a14:hiddenLine xmlns:a14="http://schemas.microsoft.com/office/drawing/2010/main" xmlns="" w="9525">
                 <a:solidFill>
                   <a:srgbClr val="000000"/>
                 </a:solidFill>
@@ -8902,14 +8996,14 @@
           </a:ln>
           <a:extLst>
             <a:ext uri="{909E8E84-426E-40dd-AFC4-6F175D3DCCD1}">
-              <a14:hiddenFill xmlns="" xmlns:a14="http://schemas.microsoft.com/office/drawing/2010/main">
+              <a14:hiddenFill xmlns:a14="http://schemas.microsoft.com/office/drawing/2010/main" xmlns="">
                 <a:solidFill>
                   <a:srgbClr val="FFFFFF"/>
                 </a:solidFill>
               </a14:hiddenFill>
             </a:ext>
             <a:ext uri="{91240B29-F687-4f45-9708-019B960494DF}">
-              <a14:hiddenLine xmlns="" xmlns:a14="http://schemas.microsoft.com/office/drawing/2010/main" w="9525">
+              <a14:hiddenLine xmlns:a14="http://schemas.microsoft.com/office/drawing/2010/main" xmlns="" w="9525">
                 <a:solidFill>
                   <a:srgbClr val="000000"/>
                 </a:solidFill>
@@ -9043,14 +9137,14 @@
           </a:ln>
           <a:extLst>
             <a:ext uri="{909E8E84-426E-40dd-AFC4-6F175D3DCCD1}">
-              <a14:hiddenFill xmlns="" xmlns:a14="http://schemas.microsoft.com/office/drawing/2010/main">
+              <a14:hiddenFill xmlns:a14="http://schemas.microsoft.com/office/drawing/2010/main" xmlns="">
                 <a:solidFill>
                   <a:srgbClr val="FFFFFF"/>
                 </a:solidFill>
               </a14:hiddenFill>
             </a:ext>
             <a:ext uri="{91240B29-F687-4f45-9708-019B960494DF}">
-              <a14:hiddenLine xmlns="" xmlns:a14="http://schemas.microsoft.com/office/drawing/2010/main" w="9525">
+              <a14:hiddenLine xmlns:a14="http://schemas.microsoft.com/office/drawing/2010/main" xmlns="" w="9525">
                 <a:solidFill>
                   <a:srgbClr val="000000"/>
                 </a:solidFill>
@@ -9184,14 +9278,14 @@
           </a:ln>
           <a:extLst>
             <a:ext uri="{909E8E84-426E-40dd-AFC4-6F175D3DCCD1}">
-              <a14:hiddenFill xmlns="" xmlns:a14="http://schemas.microsoft.com/office/drawing/2010/main">
+              <a14:hiddenFill xmlns:a14="http://schemas.microsoft.com/office/drawing/2010/main" xmlns="">
                 <a:solidFill>
                   <a:srgbClr val="FFFFFF"/>
                 </a:solidFill>
               </a14:hiddenFill>
             </a:ext>
             <a:ext uri="{91240B29-F687-4f45-9708-019B960494DF}">
-              <a14:hiddenLine xmlns="" xmlns:a14="http://schemas.microsoft.com/office/drawing/2010/main" w="9525">
+              <a14:hiddenLine xmlns:a14="http://schemas.microsoft.com/office/drawing/2010/main" xmlns="" w="9525">
                 <a:solidFill>
                   <a:srgbClr val="000000"/>
                 </a:solidFill>
@@ -9275,7 +9369,7 @@
           </a:ln>
           <a:extLst>
             <a:ext uri="{909E8E84-426E-40dd-AFC4-6F175D3DCCD1}">
-              <a14:hiddenFill xmlns="" xmlns:a14="http://schemas.microsoft.com/office/drawing/2010/main">
+              <a14:hiddenFill xmlns:a14="http://schemas.microsoft.com/office/drawing/2010/main" xmlns="">
                 <a:noFill/>
               </a14:hiddenFill>
             </a:ext>
@@ -9317,14 +9411,14 @@
           </a:ln>
           <a:extLst>
             <a:ext uri="{909E8E84-426E-40dd-AFC4-6F175D3DCCD1}">
-              <a14:hiddenFill xmlns="" xmlns:a14="http://schemas.microsoft.com/office/drawing/2010/main">
+              <a14:hiddenFill xmlns:a14="http://schemas.microsoft.com/office/drawing/2010/main" xmlns="">
                 <a:solidFill>
                   <a:srgbClr val="FFFFFF"/>
                 </a:solidFill>
               </a14:hiddenFill>
             </a:ext>
             <a:ext uri="{91240B29-F687-4f45-9708-019B960494DF}">
-              <a14:hiddenLine xmlns="" xmlns:a14="http://schemas.microsoft.com/office/drawing/2010/main" w="9525">
+              <a14:hiddenLine xmlns:a14="http://schemas.microsoft.com/office/drawing/2010/main" xmlns="" w="9525">
                 <a:solidFill>
                   <a:srgbClr val="000000"/>
                 </a:solidFill>
@@ -9485,14 +9579,14 @@
           </a:ln>
           <a:extLst>
             <a:ext uri="{909E8E84-426E-40dd-AFC4-6F175D3DCCD1}">
-              <a14:hiddenFill xmlns="" xmlns:a14="http://schemas.microsoft.com/office/drawing/2010/main">
+              <a14:hiddenFill xmlns:a14="http://schemas.microsoft.com/office/drawing/2010/main" xmlns="">
                 <a:solidFill>
                   <a:srgbClr val="FFFFFF"/>
                 </a:solidFill>
               </a14:hiddenFill>
             </a:ext>
             <a:ext uri="{91240B29-F687-4f45-9708-019B960494DF}">
-              <a14:hiddenLine xmlns="" xmlns:a14="http://schemas.microsoft.com/office/drawing/2010/main" w="9525">
+              <a14:hiddenLine xmlns:a14="http://schemas.microsoft.com/office/drawing/2010/main" xmlns="" w="9525">
                 <a:solidFill>
                   <a:srgbClr val="000000"/>
                 </a:solidFill>
@@ -9626,14 +9720,14 @@
           </a:ln>
           <a:extLst>
             <a:ext uri="{909E8E84-426E-40dd-AFC4-6F175D3DCCD1}">
-              <a14:hiddenFill xmlns="" xmlns:a14="http://schemas.microsoft.com/office/drawing/2010/main">
+              <a14:hiddenFill xmlns:a14="http://schemas.microsoft.com/office/drawing/2010/main" xmlns="">
                 <a:solidFill>
                   <a:srgbClr val="FFFFFF"/>
                 </a:solidFill>
               </a14:hiddenFill>
             </a:ext>
             <a:ext uri="{91240B29-F687-4f45-9708-019B960494DF}">
-              <a14:hiddenLine xmlns="" xmlns:a14="http://schemas.microsoft.com/office/drawing/2010/main" w="9525">
+              <a14:hiddenLine xmlns:a14="http://schemas.microsoft.com/office/drawing/2010/main" xmlns="" w="9525">
                 <a:solidFill>
                   <a:srgbClr val="000000"/>
                 </a:solidFill>
@@ -9767,14 +9861,14 @@
           </a:ln>
           <a:extLst>
             <a:ext uri="{909E8E84-426E-40dd-AFC4-6F175D3DCCD1}">
-              <a14:hiddenFill xmlns="" xmlns:a14="http://schemas.microsoft.com/office/drawing/2010/main">
+              <a14:hiddenFill xmlns:a14="http://schemas.microsoft.com/office/drawing/2010/main" xmlns="">
                 <a:solidFill>
                   <a:srgbClr val="FFFFFF"/>
                 </a:solidFill>
               </a14:hiddenFill>
             </a:ext>
             <a:ext uri="{91240B29-F687-4f45-9708-019B960494DF}">
-              <a14:hiddenLine xmlns="" xmlns:a14="http://schemas.microsoft.com/office/drawing/2010/main" w="9525">
+              <a14:hiddenLine xmlns:a14="http://schemas.microsoft.com/office/drawing/2010/main" xmlns="" w="9525">
                 <a:solidFill>
                   <a:srgbClr val="000000"/>
                 </a:solidFill>
@@ -9858,7 +9952,7 @@
           </a:ln>
           <a:extLst>
             <a:ext uri="{909E8E84-426E-40dd-AFC4-6F175D3DCCD1}">
-              <a14:hiddenFill xmlns="" xmlns:a14="http://schemas.microsoft.com/office/drawing/2010/main">
+              <a14:hiddenFill xmlns:a14="http://schemas.microsoft.com/office/drawing/2010/main" xmlns="">
                 <a:noFill/>
               </a14:hiddenFill>
             </a:ext>
@@ -9900,14 +9994,14 @@
           </a:ln>
           <a:extLst>
             <a:ext uri="{909E8E84-426E-40dd-AFC4-6F175D3DCCD1}">
-              <a14:hiddenFill xmlns="" xmlns:a14="http://schemas.microsoft.com/office/drawing/2010/main">
+              <a14:hiddenFill xmlns:a14="http://schemas.microsoft.com/office/drawing/2010/main" xmlns="">
                 <a:solidFill>
                   <a:srgbClr val="FFFFFF"/>
                 </a:solidFill>
               </a14:hiddenFill>
             </a:ext>
             <a:ext uri="{91240B29-F687-4f45-9708-019B960494DF}">
-              <a14:hiddenLine xmlns="" xmlns:a14="http://schemas.microsoft.com/office/drawing/2010/main" w="9525">
+              <a14:hiddenLine xmlns:a14="http://schemas.microsoft.com/office/drawing/2010/main" xmlns="" w="9525">
                 <a:solidFill>
                   <a:srgbClr val="000000"/>
                 </a:solidFill>
@@ -10068,14 +10162,14 @@
           </a:ln>
           <a:extLst>
             <a:ext uri="{909E8E84-426E-40dd-AFC4-6F175D3DCCD1}">
-              <a14:hiddenFill xmlns="" xmlns:a14="http://schemas.microsoft.com/office/drawing/2010/main">
+              <a14:hiddenFill xmlns:a14="http://schemas.microsoft.com/office/drawing/2010/main" xmlns="">
                 <a:solidFill>
                   <a:srgbClr val="FFFFFF"/>
                 </a:solidFill>
               </a14:hiddenFill>
             </a:ext>
             <a:ext uri="{91240B29-F687-4f45-9708-019B960494DF}">
-              <a14:hiddenLine xmlns="" xmlns:a14="http://schemas.microsoft.com/office/drawing/2010/main" w="9525">
+              <a14:hiddenLine xmlns:a14="http://schemas.microsoft.com/office/drawing/2010/main" xmlns="" w="9525">
                 <a:solidFill>
                   <a:srgbClr val="000000"/>
                 </a:solidFill>
@@ -10209,14 +10303,14 @@
           </a:ln>
           <a:extLst>
             <a:ext uri="{909E8E84-426E-40dd-AFC4-6F175D3DCCD1}">
-              <a14:hiddenFill xmlns="" xmlns:a14="http://schemas.microsoft.com/office/drawing/2010/main">
+              <a14:hiddenFill xmlns:a14="http://schemas.microsoft.com/office/drawing/2010/main" xmlns="">
                 <a:solidFill>
                   <a:srgbClr val="FFFFFF"/>
                 </a:solidFill>
               </a14:hiddenFill>
             </a:ext>
             <a:ext uri="{91240B29-F687-4f45-9708-019B960494DF}">
-              <a14:hiddenLine xmlns="" xmlns:a14="http://schemas.microsoft.com/office/drawing/2010/main" w="9525">
+              <a14:hiddenLine xmlns:a14="http://schemas.microsoft.com/office/drawing/2010/main" xmlns="" w="9525">
                 <a:solidFill>
                   <a:srgbClr val="000000"/>
                 </a:solidFill>
@@ -10350,14 +10444,14 @@
           </a:ln>
           <a:extLst>
             <a:ext uri="{909E8E84-426E-40dd-AFC4-6F175D3DCCD1}">
-              <a14:hiddenFill xmlns="" xmlns:a14="http://schemas.microsoft.com/office/drawing/2010/main">
+              <a14:hiddenFill xmlns:a14="http://schemas.microsoft.com/office/drawing/2010/main" xmlns="">
                 <a:solidFill>
                   <a:srgbClr val="FFFFFF"/>
                 </a:solidFill>
               </a14:hiddenFill>
             </a:ext>
             <a:ext uri="{91240B29-F687-4f45-9708-019B960494DF}">
-              <a14:hiddenLine xmlns="" xmlns:a14="http://schemas.microsoft.com/office/drawing/2010/main" w="9525">
+              <a14:hiddenLine xmlns:a14="http://schemas.microsoft.com/office/drawing/2010/main" xmlns="" w="9525">
                 <a:solidFill>
                   <a:srgbClr val="000000"/>
                 </a:solidFill>
@@ -10441,7 +10535,7 @@
           </a:ln>
           <a:extLst>
             <a:ext uri="{909E8E84-426E-40dd-AFC4-6F175D3DCCD1}">
-              <a14:hiddenFill xmlns="" xmlns:a14="http://schemas.microsoft.com/office/drawing/2010/main">
+              <a14:hiddenFill xmlns:a14="http://schemas.microsoft.com/office/drawing/2010/main" xmlns="">
                 <a:noFill/>
               </a14:hiddenFill>
             </a:ext>
@@ -10483,14 +10577,14 @@
           </a:ln>
           <a:extLst>
             <a:ext uri="{909E8E84-426E-40dd-AFC4-6F175D3DCCD1}">
-              <a14:hiddenFill xmlns="" xmlns:a14="http://schemas.microsoft.com/office/drawing/2010/main">
+              <a14:hiddenFill xmlns:a14="http://schemas.microsoft.com/office/drawing/2010/main" xmlns="">
                 <a:solidFill>
                   <a:srgbClr val="FFFFFF"/>
                 </a:solidFill>
               </a14:hiddenFill>
             </a:ext>
             <a:ext uri="{91240B29-F687-4f45-9708-019B960494DF}">
-              <a14:hiddenLine xmlns="" xmlns:a14="http://schemas.microsoft.com/office/drawing/2010/main" w="9525">
+              <a14:hiddenLine xmlns:a14="http://schemas.microsoft.com/office/drawing/2010/main" xmlns="" w="9525">
                 <a:solidFill>
                   <a:srgbClr val="000000"/>
                 </a:solidFill>
@@ -10651,14 +10745,14 @@
           </a:ln>
           <a:extLst>
             <a:ext uri="{909E8E84-426E-40dd-AFC4-6F175D3DCCD1}">
-              <a14:hiddenFill xmlns="" xmlns:a14="http://schemas.microsoft.com/office/drawing/2010/main">
+              <a14:hiddenFill xmlns:a14="http://schemas.microsoft.com/office/drawing/2010/main" xmlns="">
                 <a:solidFill>
                   <a:srgbClr val="FFFFFF"/>
                 </a:solidFill>
               </a14:hiddenFill>
             </a:ext>
             <a:ext uri="{91240B29-F687-4f45-9708-019B960494DF}">
-              <a14:hiddenLine xmlns="" xmlns:a14="http://schemas.microsoft.com/office/drawing/2010/main" w="9525">
+              <a14:hiddenLine xmlns:a14="http://schemas.microsoft.com/office/drawing/2010/main" xmlns="" w="9525">
                 <a:solidFill>
                   <a:srgbClr val="000000"/>
                 </a:solidFill>
@@ -10792,14 +10886,14 @@
           </a:ln>
           <a:extLst>
             <a:ext uri="{909E8E84-426E-40dd-AFC4-6F175D3DCCD1}">
-              <a14:hiddenFill xmlns="" xmlns:a14="http://schemas.microsoft.com/office/drawing/2010/main">
+              <a14:hiddenFill xmlns:a14="http://schemas.microsoft.com/office/drawing/2010/main" xmlns="">
                 <a:solidFill>
                   <a:srgbClr val="FFFFFF"/>
                 </a:solidFill>
               </a14:hiddenFill>
             </a:ext>
             <a:ext uri="{91240B29-F687-4f45-9708-019B960494DF}">
-              <a14:hiddenLine xmlns="" xmlns:a14="http://schemas.microsoft.com/office/drawing/2010/main" w="9525">
+              <a14:hiddenLine xmlns:a14="http://schemas.microsoft.com/office/drawing/2010/main" xmlns="" w="9525">
                 <a:solidFill>
                   <a:srgbClr val="000000"/>
                 </a:solidFill>
@@ -10933,14 +11027,14 @@
           </a:ln>
           <a:extLst>
             <a:ext uri="{909E8E84-426E-40dd-AFC4-6F175D3DCCD1}">
-              <a14:hiddenFill xmlns="" xmlns:a14="http://schemas.microsoft.com/office/drawing/2010/main">
+              <a14:hiddenFill xmlns:a14="http://schemas.microsoft.com/office/drawing/2010/main" xmlns="">
                 <a:solidFill>
                   <a:srgbClr val="FFFFFF"/>
                 </a:solidFill>
               </a14:hiddenFill>
             </a:ext>
             <a:ext uri="{91240B29-F687-4f45-9708-019B960494DF}">
-              <a14:hiddenLine xmlns="" xmlns:a14="http://schemas.microsoft.com/office/drawing/2010/main" w="9525">
+              <a14:hiddenLine xmlns:a14="http://schemas.microsoft.com/office/drawing/2010/main" xmlns="" w="9525">
                 <a:solidFill>
                   <a:srgbClr val="000000"/>
                 </a:solidFill>
@@ -11024,7 +11118,7 @@
           </a:ln>
           <a:extLst>
             <a:ext uri="{909E8E84-426E-40dd-AFC4-6F175D3DCCD1}">
-              <a14:hiddenFill xmlns="" xmlns:a14="http://schemas.microsoft.com/office/drawing/2010/main">
+              <a14:hiddenFill xmlns:a14="http://schemas.microsoft.com/office/drawing/2010/main" xmlns="">
                 <a:noFill/>
               </a14:hiddenFill>
             </a:ext>
@@ -11066,14 +11160,14 @@
           </a:ln>
           <a:extLst>
             <a:ext uri="{909E8E84-426E-40dd-AFC4-6F175D3DCCD1}">
-              <a14:hiddenFill xmlns="" xmlns:a14="http://schemas.microsoft.com/office/drawing/2010/main">
+              <a14:hiddenFill xmlns:a14="http://schemas.microsoft.com/office/drawing/2010/main" xmlns="">
                 <a:solidFill>
                   <a:srgbClr val="FFFFFF"/>
                 </a:solidFill>
               </a14:hiddenFill>
             </a:ext>
             <a:ext uri="{91240B29-F687-4f45-9708-019B960494DF}">
-              <a14:hiddenLine xmlns="" xmlns:a14="http://schemas.microsoft.com/office/drawing/2010/main" w="9525">
+              <a14:hiddenLine xmlns:a14="http://schemas.microsoft.com/office/drawing/2010/main" xmlns="" w="9525">
                 <a:solidFill>
                   <a:srgbClr val="000000"/>
                 </a:solidFill>
@@ -11234,14 +11328,14 @@
           </a:ln>
           <a:extLst>
             <a:ext uri="{909E8E84-426E-40dd-AFC4-6F175D3DCCD1}">
-              <a14:hiddenFill xmlns="" xmlns:a14="http://schemas.microsoft.com/office/drawing/2010/main">
+              <a14:hiddenFill xmlns:a14="http://schemas.microsoft.com/office/drawing/2010/main" xmlns="">
                 <a:solidFill>
                   <a:srgbClr val="FFFFFF"/>
                 </a:solidFill>
               </a14:hiddenFill>
             </a:ext>
             <a:ext uri="{91240B29-F687-4f45-9708-019B960494DF}">
-              <a14:hiddenLine xmlns="" xmlns:a14="http://schemas.microsoft.com/office/drawing/2010/main" w="9525">
+              <a14:hiddenLine xmlns:a14="http://schemas.microsoft.com/office/drawing/2010/main" xmlns="" w="9525">
                 <a:solidFill>
                   <a:srgbClr val="000000"/>
                 </a:solidFill>
@@ -11375,14 +11469,14 @@
           </a:ln>
           <a:extLst>
             <a:ext uri="{909E8E84-426E-40dd-AFC4-6F175D3DCCD1}">
-              <a14:hiddenFill xmlns="" xmlns:a14="http://schemas.microsoft.com/office/drawing/2010/main">
+              <a14:hiddenFill xmlns:a14="http://schemas.microsoft.com/office/drawing/2010/main" xmlns="">
                 <a:solidFill>
                   <a:srgbClr val="FFFFFF"/>
                 </a:solidFill>
               </a14:hiddenFill>
             </a:ext>
             <a:ext uri="{91240B29-F687-4f45-9708-019B960494DF}">
-              <a14:hiddenLine xmlns="" xmlns:a14="http://schemas.microsoft.com/office/drawing/2010/main" w="9525">
+              <a14:hiddenLine xmlns:a14="http://schemas.microsoft.com/office/drawing/2010/main" xmlns="" w="9525">
                 <a:solidFill>
                   <a:srgbClr val="000000"/>
                 </a:solidFill>
@@ -11516,14 +11610,14 @@
           </a:ln>
           <a:extLst>
             <a:ext uri="{909E8E84-426E-40dd-AFC4-6F175D3DCCD1}">
-              <a14:hiddenFill xmlns="" xmlns:a14="http://schemas.microsoft.com/office/drawing/2010/main">
+              <a14:hiddenFill xmlns:a14="http://schemas.microsoft.com/office/drawing/2010/main" xmlns="">
                 <a:solidFill>
                   <a:srgbClr val="FFFFFF"/>
                 </a:solidFill>
               </a14:hiddenFill>
             </a:ext>
             <a:ext uri="{91240B29-F687-4f45-9708-019B960494DF}">
-              <a14:hiddenLine xmlns="" xmlns:a14="http://schemas.microsoft.com/office/drawing/2010/main" w="9525">
+              <a14:hiddenLine xmlns:a14="http://schemas.microsoft.com/office/drawing/2010/main" xmlns="" w="9525">
                 <a:solidFill>
                   <a:srgbClr val="000000"/>
                 </a:solidFill>
@@ -11607,7 +11701,7 @@
           </a:ln>
           <a:extLst>
             <a:ext uri="{909E8E84-426E-40dd-AFC4-6F175D3DCCD1}">
-              <a14:hiddenFill xmlns="" xmlns:a14="http://schemas.microsoft.com/office/drawing/2010/main">
+              <a14:hiddenFill xmlns:a14="http://schemas.microsoft.com/office/drawing/2010/main" xmlns="">
                 <a:noFill/>
               </a14:hiddenFill>
             </a:ext>
@@ -11649,14 +11743,14 @@
           </a:ln>
           <a:extLst>
             <a:ext uri="{909E8E84-426E-40dd-AFC4-6F175D3DCCD1}">
-              <a14:hiddenFill xmlns="" xmlns:a14="http://schemas.microsoft.com/office/drawing/2010/main">
+              <a14:hiddenFill xmlns:a14="http://schemas.microsoft.com/office/drawing/2010/main" xmlns="">
                 <a:solidFill>
                   <a:srgbClr val="FFFFFF"/>
                 </a:solidFill>
               </a14:hiddenFill>
             </a:ext>
             <a:ext uri="{91240B29-F687-4f45-9708-019B960494DF}">
-              <a14:hiddenLine xmlns="" xmlns:a14="http://schemas.microsoft.com/office/drawing/2010/main" w="9525">
+              <a14:hiddenLine xmlns:a14="http://schemas.microsoft.com/office/drawing/2010/main" xmlns="" w="9525">
                 <a:solidFill>
                   <a:srgbClr val="000000"/>
                 </a:solidFill>
@@ -11817,14 +11911,14 @@
           </a:ln>
           <a:extLst>
             <a:ext uri="{909E8E84-426E-40dd-AFC4-6F175D3DCCD1}">
-              <a14:hiddenFill xmlns="" xmlns:a14="http://schemas.microsoft.com/office/drawing/2010/main">
+              <a14:hiddenFill xmlns:a14="http://schemas.microsoft.com/office/drawing/2010/main" xmlns="">
                 <a:solidFill>
                   <a:srgbClr val="FFFFFF"/>
                 </a:solidFill>
               </a14:hiddenFill>
             </a:ext>
             <a:ext uri="{91240B29-F687-4f45-9708-019B960494DF}">
-              <a14:hiddenLine xmlns="" xmlns:a14="http://schemas.microsoft.com/office/drawing/2010/main" w="9525">
+              <a14:hiddenLine xmlns:a14="http://schemas.microsoft.com/office/drawing/2010/main" xmlns="" w="9525">
                 <a:solidFill>
                   <a:srgbClr val="000000"/>
                 </a:solidFill>
@@ -11958,14 +12052,14 @@
           </a:ln>
           <a:extLst>
             <a:ext uri="{909E8E84-426E-40dd-AFC4-6F175D3DCCD1}">
-              <a14:hiddenFill xmlns="" xmlns:a14="http://schemas.microsoft.com/office/drawing/2010/main">
+              <a14:hiddenFill xmlns:a14="http://schemas.microsoft.com/office/drawing/2010/main" xmlns="">
                 <a:solidFill>
                   <a:srgbClr val="FFFFFF"/>
                 </a:solidFill>
               </a14:hiddenFill>
             </a:ext>
             <a:ext uri="{91240B29-F687-4f45-9708-019B960494DF}">
-              <a14:hiddenLine xmlns="" xmlns:a14="http://schemas.microsoft.com/office/drawing/2010/main" w="9525">
+              <a14:hiddenLine xmlns:a14="http://schemas.microsoft.com/office/drawing/2010/main" xmlns="" w="9525">
                 <a:solidFill>
                   <a:srgbClr val="000000"/>
                 </a:solidFill>
@@ -12099,14 +12193,14 @@
           </a:ln>
           <a:extLst>
             <a:ext uri="{909E8E84-426E-40dd-AFC4-6F175D3DCCD1}">
-              <a14:hiddenFill xmlns="" xmlns:a14="http://schemas.microsoft.com/office/drawing/2010/main">
+              <a14:hiddenFill xmlns:a14="http://schemas.microsoft.com/office/drawing/2010/main" xmlns="">
                 <a:solidFill>
                   <a:srgbClr val="FFFFFF"/>
                 </a:solidFill>
               </a14:hiddenFill>
             </a:ext>
             <a:ext uri="{91240B29-F687-4f45-9708-019B960494DF}">
-              <a14:hiddenLine xmlns="" xmlns:a14="http://schemas.microsoft.com/office/drawing/2010/main" w="9525">
+              <a14:hiddenLine xmlns:a14="http://schemas.microsoft.com/office/drawing/2010/main" xmlns="" w="9525">
                 <a:solidFill>
                   <a:srgbClr val="000000"/>
                 </a:solidFill>
@@ -12190,7 +12284,7 @@
           </a:ln>
           <a:extLst>
             <a:ext uri="{909E8E84-426E-40dd-AFC4-6F175D3DCCD1}">
-              <a14:hiddenFill xmlns="" xmlns:a14="http://schemas.microsoft.com/office/drawing/2010/main">
+              <a14:hiddenFill xmlns:a14="http://schemas.microsoft.com/office/drawing/2010/main" xmlns="">
                 <a:noFill/>
               </a14:hiddenFill>
             </a:ext>
@@ -12232,14 +12326,14 @@
           </a:ln>
           <a:extLst>
             <a:ext uri="{909E8E84-426E-40dd-AFC4-6F175D3DCCD1}">
-              <a14:hiddenFill xmlns="" xmlns:a14="http://schemas.microsoft.com/office/drawing/2010/main">
+              <a14:hiddenFill xmlns:a14="http://schemas.microsoft.com/office/drawing/2010/main" xmlns="">
                 <a:solidFill>
                   <a:srgbClr val="FFFFFF"/>
                 </a:solidFill>
               </a14:hiddenFill>
             </a:ext>
             <a:ext uri="{91240B29-F687-4f45-9708-019B960494DF}">
-              <a14:hiddenLine xmlns="" xmlns:a14="http://schemas.microsoft.com/office/drawing/2010/main" w="9525">
+              <a14:hiddenLine xmlns:a14="http://schemas.microsoft.com/office/drawing/2010/main" xmlns="" w="9525">
                 <a:solidFill>
                   <a:srgbClr val="000000"/>
                 </a:solidFill>
@@ -12400,14 +12494,14 @@
           </a:ln>
           <a:extLst>
             <a:ext uri="{909E8E84-426E-40dd-AFC4-6F175D3DCCD1}">
-              <a14:hiddenFill xmlns="" xmlns:a14="http://schemas.microsoft.com/office/drawing/2010/main">
+              <a14:hiddenFill xmlns:a14="http://schemas.microsoft.com/office/drawing/2010/main" xmlns="">
                 <a:solidFill>
                   <a:srgbClr val="FFFFFF"/>
                 </a:solidFill>
               </a14:hiddenFill>
             </a:ext>
             <a:ext uri="{91240B29-F687-4f45-9708-019B960494DF}">
-              <a14:hiddenLine xmlns="" xmlns:a14="http://schemas.microsoft.com/office/drawing/2010/main" w="9525">
+              <a14:hiddenLine xmlns:a14="http://schemas.microsoft.com/office/drawing/2010/main" xmlns="" w="9525">
                 <a:solidFill>
                   <a:srgbClr val="000000"/>
                 </a:solidFill>
@@ -12541,14 +12635,14 @@
           </a:ln>
           <a:extLst>
             <a:ext uri="{909E8E84-426E-40dd-AFC4-6F175D3DCCD1}">
-              <a14:hiddenFill xmlns="" xmlns:a14="http://schemas.microsoft.com/office/drawing/2010/main">
+              <a14:hiddenFill xmlns:a14="http://schemas.microsoft.com/office/drawing/2010/main" xmlns="">
                 <a:solidFill>
                   <a:srgbClr val="FFFFFF"/>
                 </a:solidFill>
               </a14:hiddenFill>
             </a:ext>
             <a:ext uri="{91240B29-F687-4f45-9708-019B960494DF}">
-              <a14:hiddenLine xmlns="" xmlns:a14="http://schemas.microsoft.com/office/drawing/2010/main" w="9525">
+              <a14:hiddenLine xmlns:a14="http://schemas.microsoft.com/office/drawing/2010/main" xmlns="" w="9525">
                 <a:solidFill>
                   <a:srgbClr val="000000"/>
                 </a:solidFill>
@@ -12682,14 +12776,14 @@
           </a:ln>
           <a:extLst>
             <a:ext uri="{909E8E84-426E-40dd-AFC4-6F175D3DCCD1}">
-              <a14:hiddenFill xmlns="" xmlns:a14="http://schemas.microsoft.com/office/drawing/2010/main">
+              <a14:hiddenFill xmlns:a14="http://schemas.microsoft.com/office/drawing/2010/main" xmlns="">
                 <a:solidFill>
                   <a:srgbClr val="FFFFFF"/>
                 </a:solidFill>
               </a14:hiddenFill>
             </a:ext>
             <a:ext uri="{91240B29-F687-4f45-9708-019B960494DF}">
-              <a14:hiddenLine xmlns="" xmlns:a14="http://schemas.microsoft.com/office/drawing/2010/main" w="9525">
+              <a14:hiddenLine xmlns:a14="http://schemas.microsoft.com/office/drawing/2010/main" xmlns="" w="9525">
                 <a:solidFill>
                   <a:srgbClr val="000000"/>
                 </a:solidFill>
@@ -12773,7 +12867,7 @@
           </a:ln>
           <a:extLst>
             <a:ext uri="{909E8E84-426E-40dd-AFC4-6F175D3DCCD1}">
-              <a14:hiddenFill xmlns="" xmlns:a14="http://schemas.microsoft.com/office/drawing/2010/main">
+              <a14:hiddenFill xmlns:a14="http://schemas.microsoft.com/office/drawing/2010/main" xmlns="">
                 <a:noFill/>
               </a14:hiddenFill>
             </a:ext>
@@ -12815,14 +12909,14 @@
           </a:ln>
           <a:extLst>
             <a:ext uri="{909E8E84-426E-40dd-AFC4-6F175D3DCCD1}">
-              <a14:hiddenFill xmlns="" xmlns:a14="http://schemas.microsoft.com/office/drawing/2010/main">
+              <a14:hiddenFill xmlns:a14="http://schemas.microsoft.com/office/drawing/2010/main" xmlns="">
                 <a:solidFill>
                   <a:srgbClr val="FFFFFF"/>
                 </a:solidFill>
               </a14:hiddenFill>
             </a:ext>
             <a:ext uri="{91240B29-F687-4f45-9708-019B960494DF}">
-              <a14:hiddenLine xmlns="" xmlns:a14="http://schemas.microsoft.com/office/drawing/2010/main" w="9525">
+              <a14:hiddenLine xmlns:a14="http://schemas.microsoft.com/office/drawing/2010/main" xmlns="" w="9525">
                 <a:solidFill>
                   <a:srgbClr val="000000"/>
                 </a:solidFill>
@@ -13598,14 +13692,14 @@
           </a:ln>
           <a:extLst>
             <a:ext uri="{909E8E84-426E-40dd-AFC4-6F175D3DCCD1}">
-              <a14:hiddenFill xmlns="" xmlns:a14="http://schemas.microsoft.com/office/drawing/2010/main">
+              <a14:hiddenFill xmlns:a14="http://schemas.microsoft.com/office/drawing/2010/main" xmlns="">
                 <a:solidFill>
                   <a:srgbClr val="FFFFFF"/>
                 </a:solidFill>
               </a14:hiddenFill>
             </a:ext>
             <a:ext uri="{91240B29-F687-4f45-9708-019B960494DF}">
-              <a14:hiddenLine xmlns="" xmlns:a14="http://schemas.microsoft.com/office/drawing/2010/main" w="9525">
+              <a14:hiddenLine xmlns:a14="http://schemas.microsoft.com/office/drawing/2010/main" xmlns="" w="9525">
                 <a:solidFill>
                   <a:srgbClr val="000000"/>
                 </a:solidFill>
@@ -13739,14 +13833,14 @@
           </a:ln>
           <a:extLst>
             <a:ext uri="{909E8E84-426E-40dd-AFC4-6F175D3DCCD1}">
-              <a14:hiddenFill xmlns="" xmlns:a14="http://schemas.microsoft.com/office/drawing/2010/main">
+              <a14:hiddenFill xmlns:a14="http://schemas.microsoft.com/office/drawing/2010/main" xmlns="">
                 <a:solidFill>
                   <a:srgbClr val="FFFFFF"/>
                 </a:solidFill>
               </a14:hiddenFill>
             </a:ext>
             <a:ext uri="{91240B29-F687-4f45-9708-019B960494DF}">
-              <a14:hiddenLine xmlns="" xmlns:a14="http://schemas.microsoft.com/office/drawing/2010/main" w="9525">
+              <a14:hiddenLine xmlns:a14="http://schemas.microsoft.com/office/drawing/2010/main" xmlns="" w="9525">
                 <a:solidFill>
                   <a:srgbClr val="000000"/>
                 </a:solidFill>
@@ -13880,14 +13974,14 @@
           </a:ln>
           <a:extLst>
             <a:ext uri="{909E8E84-426E-40dd-AFC4-6F175D3DCCD1}">
-              <a14:hiddenFill xmlns="" xmlns:a14="http://schemas.microsoft.com/office/drawing/2010/main">
+              <a14:hiddenFill xmlns:a14="http://schemas.microsoft.com/office/drawing/2010/main" xmlns="">
                 <a:solidFill>
                   <a:srgbClr val="FFFFFF"/>
                 </a:solidFill>
               </a14:hiddenFill>
             </a:ext>
             <a:ext uri="{91240B29-F687-4f45-9708-019B960494DF}">
-              <a14:hiddenLine xmlns="" xmlns:a14="http://schemas.microsoft.com/office/drawing/2010/main" w="9525">
+              <a14:hiddenLine xmlns:a14="http://schemas.microsoft.com/office/drawing/2010/main" xmlns="" w="9525">
                 <a:solidFill>
                   <a:srgbClr val="000000"/>
                 </a:solidFill>
@@ -13971,7 +14065,7 @@
           </a:ln>
           <a:extLst>
             <a:ext uri="{909E8E84-426E-40dd-AFC4-6F175D3DCCD1}">
-              <a14:hiddenFill xmlns="" xmlns:a14="http://schemas.microsoft.com/office/drawing/2010/main">
+              <a14:hiddenFill xmlns:a14="http://schemas.microsoft.com/office/drawing/2010/main" xmlns="">
                 <a:noFill/>
               </a14:hiddenFill>
             </a:ext>
@@ -14013,14 +14107,14 @@
           </a:ln>
           <a:extLst>
             <a:ext uri="{909E8E84-426E-40dd-AFC4-6F175D3DCCD1}">
-              <a14:hiddenFill xmlns="" xmlns:a14="http://schemas.microsoft.com/office/drawing/2010/main">
+              <a14:hiddenFill xmlns:a14="http://schemas.microsoft.com/office/drawing/2010/main" xmlns="">
                 <a:solidFill>
                   <a:srgbClr val="FFFFFF"/>
                 </a:solidFill>
               </a14:hiddenFill>
             </a:ext>
             <a:ext uri="{91240B29-F687-4f45-9708-019B960494DF}">
-              <a14:hiddenLine xmlns="" xmlns:a14="http://schemas.microsoft.com/office/drawing/2010/main" w="9525">
+              <a14:hiddenLine xmlns:a14="http://schemas.microsoft.com/office/drawing/2010/main" xmlns="" w="9525">
                 <a:solidFill>
                   <a:srgbClr val="000000"/>
                 </a:solidFill>
@@ -14181,14 +14275,14 @@
           </a:ln>
           <a:extLst>
             <a:ext uri="{909E8E84-426E-40dd-AFC4-6F175D3DCCD1}">
-              <a14:hiddenFill xmlns="" xmlns:a14="http://schemas.microsoft.com/office/drawing/2010/main">
+              <a14:hiddenFill xmlns:a14="http://schemas.microsoft.com/office/drawing/2010/main" xmlns="">
                 <a:solidFill>
                   <a:srgbClr val="FFFFFF"/>
                 </a:solidFill>
               </a14:hiddenFill>
             </a:ext>
             <a:ext uri="{91240B29-F687-4f45-9708-019B960494DF}">
-              <a14:hiddenLine xmlns="" xmlns:a14="http://schemas.microsoft.com/office/drawing/2010/main" w="9525">
+              <a14:hiddenLine xmlns:a14="http://schemas.microsoft.com/office/drawing/2010/main" xmlns="" w="9525">
                 <a:solidFill>
                   <a:srgbClr val="000000"/>
                 </a:solidFill>
@@ -14322,14 +14416,14 @@
           </a:ln>
           <a:extLst>
             <a:ext uri="{909E8E84-426E-40dd-AFC4-6F175D3DCCD1}">
-              <a14:hiddenFill xmlns="" xmlns:a14="http://schemas.microsoft.com/office/drawing/2010/main">
+              <a14:hiddenFill xmlns:a14="http://schemas.microsoft.com/office/drawing/2010/main" xmlns="">
                 <a:solidFill>
                   <a:srgbClr val="FFFFFF"/>
                 </a:solidFill>
               </a14:hiddenFill>
             </a:ext>
             <a:ext uri="{91240B29-F687-4f45-9708-019B960494DF}">
-              <a14:hiddenLine xmlns="" xmlns:a14="http://schemas.microsoft.com/office/drawing/2010/main" w="9525">
+              <a14:hiddenLine xmlns:a14="http://schemas.microsoft.com/office/drawing/2010/main" xmlns="" w="9525">
                 <a:solidFill>
                   <a:srgbClr val="000000"/>
                 </a:solidFill>
@@ -14463,14 +14557,14 @@
           </a:ln>
           <a:extLst>
             <a:ext uri="{909E8E84-426E-40dd-AFC4-6F175D3DCCD1}">
-              <a14:hiddenFill xmlns="" xmlns:a14="http://schemas.microsoft.com/office/drawing/2010/main">
+              <a14:hiddenFill xmlns:a14="http://schemas.microsoft.com/office/drawing/2010/main" xmlns="">
                 <a:solidFill>
                   <a:srgbClr val="FFFFFF"/>
                 </a:solidFill>
               </a14:hiddenFill>
             </a:ext>
             <a:ext uri="{91240B29-F687-4f45-9708-019B960494DF}">
-              <a14:hiddenLine xmlns="" xmlns:a14="http://schemas.microsoft.com/office/drawing/2010/main" w="9525">
+              <a14:hiddenLine xmlns:a14="http://schemas.microsoft.com/office/drawing/2010/main" xmlns="" w="9525">
                 <a:solidFill>
                   <a:srgbClr val="000000"/>
                 </a:solidFill>
@@ -14554,7 +14648,7 @@
           </a:ln>
           <a:extLst>
             <a:ext uri="{909E8E84-426E-40dd-AFC4-6F175D3DCCD1}">
-              <a14:hiddenFill xmlns="" xmlns:a14="http://schemas.microsoft.com/office/drawing/2010/main">
+              <a14:hiddenFill xmlns:a14="http://schemas.microsoft.com/office/drawing/2010/main" xmlns="">
                 <a:noFill/>
               </a14:hiddenFill>
             </a:ext>
@@ -14596,14 +14690,14 @@
           </a:ln>
           <a:extLst>
             <a:ext uri="{909E8E84-426E-40dd-AFC4-6F175D3DCCD1}">
-              <a14:hiddenFill xmlns="" xmlns:a14="http://schemas.microsoft.com/office/drawing/2010/main">
+              <a14:hiddenFill xmlns:a14="http://schemas.microsoft.com/office/drawing/2010/main" xmlns="">
                 <a:solidFill>
                   <a:srgbClr val="FFFFFF"/>
                 </a:solidFill>
               </a14:hiddenFill>
             </a:ext>
             <a:ext uri="{91240B29-F687-4f45-9708-019B960494DF}">
-              <a14:hiddenLine xmlns="" xmlns:a14="http://schemas.microsoft.com/office/drawing/2010/main" w="9525">
+              <a14:hiddenLine xmlns:a14="http://schemas.microsoft.com/office/drawing/2010/main" xmlns="" w="9525">
                 <a:solidFill>
                   <a:srgbClr val="000000"/>
                 </a:solidFill>
@@ -16185,7 +16279,7 @@
           <a:p>
             <a:fld id="{92D2A1E4-02A2-4E01-AE24-7516B7B64CBC}" type="datetimeFigureOut">
               <a:rPr lang="en-US" smtClean="0"/>
-              <a:t>4/3/2019</a:t>
+              <a:t>4/24/2019</a:t>
             </a:fld>
             <a:endParaRPr lang="en-US"/>
           </a:p>
@@ -16340,14 +16434,14 @@
           </a:ln>
           <a:extLst>
             <a:ext uri="{909E8E84-426E-40dd-AFC4-6F175D3DCCD1}">
-              <a14:hiddenFill xmlns="" xmlns:a14="http://schemas.microsoft.com/office/drawing/2010/main">
+              <a14:hiddenFill xmlns:a14="http://schemas.microsoft.com/office/drawing/2010/main" xmlns="">
                 <a:solidFill>
                   <a:srgbClr val="FFFFFF"/>
                 </a:solidFill>
               </a14:hiddenFill>
             </a:ext>
             <a:ext uri="{91240B29-F687-4f45-9708-019B960494DF}">
-              <a14:hiddenLine xmlns="" xmlns:a14="http://schemas.microsoft.com/office/drawing/2010/main" w="9525">
+              <a14:hiddenLine xmlns:a14="http://schemas.microsoft.com/office/drawing/2010/main" xmlns="" w="9525">
                 <a:solidFill>
                   <a:srgbClr val="000000"/>
                 </a:solidFill>
@@ -16481,14 +16575,14 @@
           </a:ln>
           <a:extLst>
             <a:ext uri="{909E8E84-426E-40dd-AFC4-6F175D3DCCD1}">
-              <a14:hiddenFill xmlns="" xmlns:a14="http://schemas.microsoft.com/office/drawing/2010/main">
+              <a14:hiddenFill xmlns:a14="http://schemas.microsoft.com/office/drawing/2010/main" xmlns="">
                 <a:solidFill>
                   <a:srgbClr val="FFFFFF"/>
                 </a:solidFill>
               </a14:hiddenFill>
             </a:ext>
             <a:ext uri="{91240B29-F687-4f45-9708-019B960494DF}">
-              <a14:hiddenLine xmlns="" xmlns:a14="http://schemas.microsoft.com/office/drawing/2010/main" w="9525">
+              <a14:hiddenLine xmlns:a14="http://schemas.microsoft.com/office/drawing/2010/main" xmlns="" w="9525">
                 <a:solidFill>
                   <a:srgbClr val="000000"/>
                 </a:solidFill>
@@ -16622,14 +16716,14 @@
           </a:ln>
           <a:extLst>
             <a:ext uri="{909E8E84-426E-40dd-AFC4-6F175D3DCCD1}">
-              <a14:hiddenFill xmlns="" xmlns:a14="http://schemas.microsoft.com/office/drawing/2010/main">
+              <a14:hiddenFill xmlns:a14="http://schemas.microsoft.com/office/drawing/2010/main" xmlns="">
                 <a:solidFill>
                   <a:srgbClr val="FFFFFF"/>
                 </a:solidFill>
               </a14:hiddenFill>
             </a:ext>
             <a:ext uri="{91240B29-F687-4f45-9708-019B960494DF}">
-              <a14:hiddenLine xmlns="" xmlns:a14="http://schemas.microsoft.com/office/drawing/2010/main" w="9525">
+              <a14:hiddenLine xmlns:a14="http://schemas.microsoft.com/office/drawing/2010/main" xmlns="" w="9525">
                 <a:solidFill>
                   <a:srgbClr val="000000"/>
                 </a:solidFill>
@@ -16713,7 +16807,7 @@
           </a:ln>
           <a:extLst>
             <a:ext uri="{909E8E84-426E-40dd-AFC4-6F175D3DCCD1}">
-              <a14:hiddenFill xmlns="" xmlns:a14="http://schemas.microsoft.com/office/drawing/2010/main">
+              <a14:hiddenFill xmlns:a14="http://schemas.microsoft.com/office/drawing/2010/main" xmlns="">
                 <a:noFill/>
               </a14:hiddenFill>
             </a:ext>
@@ -16755,14 +16849,14 @@
           </a:ln>
           <a:extLst>
             <a:ext uri="{909E8E84-426E-40dd-AFC4-6F175D3DCCD1}">
-              <a14:hiddenFill xmlns="" xmlns:a14="http://schemas.microsoft.com/office/drawing/2010/main">
+              <a14:hiddenFill xmlns:a14="http://schemas.microsoft.com/office/drawing/2010/main" xmlns="">
                 <a:solidFill>
                   <a:srgbClr val="FFFFFF"/>
                 </a:solidFill>
               </a14:hiddenFill>
             </a:ext>
             <a:ext uri="{91240B29-F687-4f45-9708-019B960494DF}">
-              <a14:hiddenLine xmlns="" xmlns:a14="http://schemas.microsoft.com/office/drawing/2010/main" w="9525">
+              <a14:hiddenLine xmlns:a14="http://schemas.microsoft.com/office/drawing/2010/main" xmlns="" w="9525">
                 <a:solidFill>
                   <a:srgbClr val="000000"/>
                 </a:solidFill>
@@ -16923,14 +17017,14 @@
           </a:ln>
           <a:extLst>
             <a:ext uri="{909E8E84-426E-40dd-AFC4-6F175D3DCCD1}">
-              <a14:hiddenFill xmlns="" xmlns:a14="http://schemas.microsoft.com/office/drawing/2010/main">
+              <a14:hiddenFill xmlns:a14="http://schemas.microsoft.com/office/drawing/2010/main" xmlns="">
                 <a:solidFill>
                   <a:srgbClr val="FFFFFF"/>
                 </a:solidFill>
               </a14:hiddenFill>
             </a:ext>
             <a:ext uri="{91240B29-F687-4f45-9708-019B960494DF}">
-              <a14:hiddenLine xmlns="" xmlns:a14="http://schemas.microsoft.com/office/drawing/2010/main" w="9525">
+              <a14:hiddenLine xmlns:a14="http://schemas.microsoft.com/office/drawing/2010/main" xmlns="" w="9525">
                 <a:solidFill>
                   <a:srgbClr val="000000"/>
                 </a:solidFill>
@@ -17064,14 +17158,14 @@
           </a:ln>
           <a:extLst>
             <a:ext uri="{909E8E84-426E-40dd-AFC4-6F175D3DCCD1}">
-              <a14:hiddenFill xmlns="" xmlns:a14="http://schemas.microsoft.com/office/drawing/2010/main">
+              <a14:hiddenFill xmlns:a14="http://schemas.microsoft.com/office/drawing/2010/main" xmlns="">
                 <a:solidFill>
                   <a:srgbClr val="FFFFFF"/>
                 </a:solidFill>
               </a14:hiddenFill>
             </a:ext>
             <a:ext uri="{91240B29-F687-4f45-9708-019B960494DF}">
-              <a14:hiddenLine xmlns="" xmlns:a14="http://schemas.microsoft.com/office/drawing/2010/main" w="9525">
+              <a14:hiddenLine xmlns:a14="http://schemas.microsoft.com/office/drawing/2010/main" xmlns="" w="9525">
                 <a:solidFill>
                   <a:srgbClr val="000000"/>
                 </a:solidFill>
@@ -17205,14 +17299,14 @@
           </a:ln>
           <a:extLst>
             <a:ext uri="{909E8E84-426E-40dd-AFC4-6F175D3DCCD1}">
-              <a14:hiddenFill xmlns="" xmlns:a14="http://schemas.microsoft.com/office/drawing/2010/main">
+              <a14:hiddenFill xmlns:a14="http://schemas.microsoft.com/office/drawing/2010/main" xmlns="">
                 <a:solidFill>
                   <a:srgbClr val="FFFFFF"/>
                 </a:solidFill>
               </a14:hiddenFill>
             </a:ext>
             <a:ext uri="{91240B29-F687-4f45-9708-019B960494DF}">
-              <a14:hiddenLine xmlns="" xmlns:a14="http://schemas.microsoft.com/office/drawing/2010/main" w="9525">
+              <a14:hiddenLine xmlns:a14="http://schemas.microsoft.com/office/drawing/2010/main" xmlns="" w="9525">
                 <a:solidFill>
                   <a:srgbClr val="000000"/>
                 </a:solidFill>
@@ -17296,7 +17390,7 @@
           </a:ln>
           <a:extLst>
             <a:ext uri="{909E8E84-426E-40dd-AFC4-6F175D3DCCD1}">
-              <a14:hiddenFill xmlns="" xmlns:a14="http://schemas.microsoft.com/office/drawing/2010/main">
+              <a14:hiddenFill xmlns:a14="http://schemas.microsoft.com/office/drawing/2010/main" xmlns="">
                 <a:noFill/>
               </a14:hiddenFill>
             </a:ext>
@@ -17338,14 +17432,14 @@
           </a:ln>
           <a:extLst>
             <a:ext uri="{909E8E84-426E-40dd-AFC4-6F175D3DCCD1}">
-              <a14:hiddenFill xmlns="" xmlns:a14="http://schemas.microsoft.com/office/drawing/2010/main">
+              <a14:hiddenFill xmlns:a14="http://schemas.microsoft.com/office/drawing/2010/main" xmlns="">
                 <a:solidFill>
                   <a:srgbClr val="FFFFFF"/>
                 </a:solidFill>
               </a14:hiddenFill>
             </a:ext>
             <a:ext uri="{91240B29-F687-4f45-9708-019B960494DF}">
-              <a14:hiddenLine xmlns="" xmlns:a14="http://schemas.microsoft.com/office/drawing/2010/main" w="9525">
+              <a14:hiddenLine xmlns:a14="http://schemas.microsoft.com/office/drawing/2010/main" xmlns="" w="9525">
                 <a:solidFill>
                   <a:srgbClr val="000000"/>
                 </a:solidFill>
@@ -17506,14 +17600,14 @@
           </a:ln>
           <a:extLst>
             <a:ext uri="{909E8E84-426E-40dd-AFC4-6F175D3DCCD1}">
-              <a14:hiddenFill xmlns="" xmlns:a14="http://schemas.microsoft.com/office/drawing/2010/main">
+              <a14:hiddenFill xmlns:a14="http://schemas.microsoft.com/office/drawing/2010/main" xmlns="">
                 <a:solidFill>
                   <a:srgbClr val="FFFFFF"/>
                 </a:solidFill>
               </a14:hiddenFill>
             </a:ext>
             <a:ext uri="{91240B29-F687-4f45-9708-019B960494DF}">
-              <a14:hiddenLine xmlns="" xmlns:a14="http://schemas.microsoft.com/office/drawing/2010/main" w="9525">
+              <a14:hiddenLine xmlns:a14="http://schemas.microsoft.com/office/drawing/2010/main" xmlns="" w="9525">
                 <a:solidFill>
                   <a:srgbClr val="000000"/>
                 </a:solidFill>
@@ -17647,14 +17741,14 @@
           </a:ln>
           <a:extLst>
             <a:ext uri="{909E8E84-426E-40dd-AFC4-6F175D3DCCD1}">
-              <a14:hiddenFill xmlns="" xmlns:a14="http://schemas.microsoft.com/office/drawing/2010/main">
+              <a14:hiddenFill xmlns:a14="http://schemas.microsoft.com/office/drawing/2010/main" xmlns="">
                 <a:solidFill>
                   <a:srgbClr val="FFFFFF"/>
                 </a:solidFill>
               </a14:hiddenFill>
             </a:ext>
             <a:ext uri="{91240B29-F687-4f45-9708-019B960494DF}">
-              <a14:hiddenLine xmlns="" xmlns:a14="http://schemas.microsoft.com/office/drawing/2010/main" w="9525">
+              <a14:hiddenLine xmlns:a14="http://schemas.microsoft.com/office/drawing/2010/main" xmlns="" w="9525">
                 <a:solidFill>
                   <a:srgbClr val="000000"/>
                 </a:solidFill>
@@ -17788,14 +17882,14 @@
           </a:ln>
           <a:extLst>
             <a:ext uri="{909E8E84-426E-40dd-AFC4-6F175D3DCCD1}">
-              <a14:hiddenFill xmlns="" xmlns:a14="http://schemas.microsoft.com/office/drawing/2010/main">
+              <a14:hiddenFill xmlns:a14="http://schemas.microsoft.com/office/drawing/2010/main" xmlns="">
                 <a:solidFill>
                   <a:srgbClr val="FFFFFF"/>
                 </a:solidFill>
               </a14:hiddenFill>
             </a:ext>
             <a:ext uri="{91240B29-F687-4f45-9708-019B960494DF}">
-              <a14:hiddenLine xmlns="" xmlns:a14="http://schemas.microsoft.com/office/drawing/2010/main" w="9525">
+              <a14:hiddenLine xmlns:a14="http://schemas.microsoft.com/office/drawing/2010/main" xmlns="" w="9525">
                 <a:solidFill>
                   <a:srgbClr val="000000"/>
                 </a:solidFill>
@@ -17879,7 +17973,7 @@
           </a:ln>
           <a:extLst>
             <a:ext uri="{909E8E84-426E-40dd-AFC4-6F175D3DCCD1}">
-              <a14:hiddenFill xmlns="" xmlns:a14="http://schemas.microsoft.com/office/drawing/2010/main">
+              <a14:hiddenFill xmlns:a14="http://schemas.microsoft.com/office/drawing/2010/main" xmlns="">
                 <a:noFill/>
               </a14:hiddenFill>
             </a:ext>
@@ -17921,14 +18015,14 @@
           </a:ln>
           <a:extLst>
             <a:ext uri="{909E8E84-426E-40dd-AFC4-6F175D3DCCD1}">
-              <a14:hiddenFill xmlns="" xmlns:a14="http://schemas.microsoft.com/office/drawing/2010/main">
+              <a14:hiddenFill xmlns:a14="http://schemas.microsoft.com/office/drawing/2010/main" xmlns="">
                 <a:solidFill>
                   <a:srgbClr val="FFFFFF"/>
                 </a:solidFill>
               </a14:hiddenFill>
             </a:ext>
             <a:ext uri="{91240B29-F687-4f45-9708-019B960494DF}">
-              <a14:hiddenLine xmlns="" xmlns:a14="http://schemas.microsoft.com/office/drawing/2010/main" w="9525">
+              <a14:hiddenLine xmlns:a14="http://schemas.microsoft.com/office/drawing/2010/main" xmlns="" w="9525">
                 <a:solidFill>
                   <a:srgbClr val="000000"/>
                 </a:solidFill>
@@ -18089,14 +18183,14 @@
           </a:ln>
           <a:extLst>
             <a:ext uri="{909E8E84-426E-40dd-AFC4-6F175D3DCCD1}">
-              <a14:hiddenFill xmlns="" xmlns:a14="http://schemas.microsoft.com/office/drawing/2010/main">
+              <a14:hiddenFill xmlns:a14="http://schemas.microsoft.com/office/drawing/2010/main" xmlns="">
                 <a:solidFill>
                   <a:srgbClr val="FFFFFF"/>
                 </a:solidFill>
               </a14:hiddenFill>
             </a:ext>
             <a:ext uri="{91240B29-F687-4f45-9708-019B960494DF}">
-              <a14:hiddenLine xmlns="" xmlns:a14="http://schemas.microsoft.com/office/drawing/2010/main" w="9525">
+              <a14:hiddenLine xmlns:a14="http://schemas.microsoft.com/office/drawing/2010/main" xmlns="" w="9525">
                 <a:solidFill>
                   <a:srgbClr val="000000"/>
                 </a:solidFill>
@@ -18230,14 +18324,14 @@
           </a:ln>
           <a:extLst>
             <a:ext uri="{909E8E84-426E-40dd-AFC4-6F175D3DCCD1}">
-              <a14:hiddenFill xmlns="" xmlns:a14="http://schemas.microsoft.com/office/drawing/2010/main">
+              <a14:hiddenFill xmlns:a14="http://schemas.microsoft.com/office/drawing/2010/main" xmlns="">
                 <a:solidFill>
                   <a:srgbClr val="FFFFFF"/>
                 </a:solidFill>
               </a14:hiddenFill>
             </a:ext>
             <a:ext uri="{91240B29-F687-4f45-9708-019B960494DF}">
-              <a14:hiddenLine xmlns="" xmlns:a14="http://schemas.microsoft.com/office/drawing/2010/main" w="9525">
+              <a14:hiddenLine xmlns:a14="http://schemas.microsoft.com/office/drawing/2010/main" xmlns="" w="9525">
                 <a:solidFill>
                   <a:srgbClr val="000000"/>
                 </a:solidFill>
@@ -18371,14 +18465,14 @@
           </a:ln>
           <a:extLst>
             <a:ext uri="{909E8E84-426E-40dd-AFC4-6F175D3DCCD1}">
-              <a14:hiddenFill xmlns="" xmlns:a14="http://schemas.microsoft.com/office/drawing/2010/main">
+              <a14:hiddenFill xmlns:a14="http://schemas.microsoft.com/office/drawing/2010/main" xmlns="">
                 <a:solidFill>
                   <a:srgbClr val="FFFFFF"/>
                 </a:solidFill>
               </a14:hiddenFill>
             </a:ext>
             <a:ext uri="{91240B29-F687-4f45-9708-019B960494DF}">
-              <a14:hiddenLine xmlns="" xmlns:a14="http://schemas.microsoft.com/office/drawing/2010/main" w="9525">
+              <a14:hiddenLine xmlns:a14="http://schemas.microsoft.com/office/drawing/2010/main" xmlns="" w="9525">
                 <a:solidFill>
                   <a:srgbClr val="000000"/>
                 </a:solidFill>
@@ -18470,14 +18564,14 @@
           </a:ln>
           <a:extLst>
             <a:ext uri="{909E8E84-426E-40dd-AFC4-6F175D3DCCD1}">
-              <a14:hiddenFill xmlns="" xmlns:a14="http://schemas.microsoft.com/office/drawing/2010/main">
+              <a14:hiddenFill xmlns:a14="http://schemas.microsoft.com/office/drawing/2010/main" xmlns="">
                 <a:solidFill>
                   <a:srgbClr val="FFFFFF"/>
                 </a:solidFill>
               </a14:hiddenFill>
             </a:ext>
             <a:ext uri="{91240B29-F687-4f45-9708-019B960494DF}">
-              <a14:hiddenLine xmlns="" xmlns:a14="http://schemas.microsoft.com/office/drawing/2010/main" w="9525">
+              <a14:hiddenLine xmlns:a14="http://schemas.microsoft.com/office/drawing/2010/main" xmlns="" w="9525">
                 <a:solidFill>
                   <a:srgbClr val="000000"/>
                 </a:solidFill>
@@ -20066,7 +20160,7 @@
             </a:ln>
             <a:extLst>
               <a:ext uri="{909E8E84-426E-40dd-AFC4-6F175D3DCCD1}">
-                <a14:hiddenFill xmlns="" xmlns:a14="http://schemas.microsoft.com/office/drawing/2010/main">
+                <a14:hiddenFill xmlns:a14="http://schemas.microsoft.com/office/drawing/2010/main" xmlns="">
                   <a:solidFill>
                     <a:srgbClr val="FFFFFF"/>
                   </a:solidFill>
@@ -20249,7 +20343,7 @@
           </a:ln>
           <a:extLst>
             <a:ext uri="{909E8E84-426E-40dd-AFC4-6F175D3DCCD1}">
-              <a14:hiddenFill xmlns="" xmlns:a14="http://schemas.microsoft.com/office/drawing/2010/main">
+              <a14:hiddenFill xmlns:a14="http://schemas.microsoft.com/office/drawing/2010/main" xmlns="">
                 <a:solidFill>
                   <a:srgbClr val="FFFFFF"/>
                 </a:solidFill>
@@ -20316,14 +20410,14 @@
           </a:ln>
           <a:extLst>
             <a:ext uri="{909E8E84-426E-40dd-AFC4-6F175D3DCCD1}">
-              <a14:hiddenFill xmlns="" xmlns:a14="http://schemas.microsoft.com/office/drawing/2010/main">
+              <a14:hiddenFill xmlns:a14="http://schemas.microsoft.com/office/drawing/2010/main" xmlns="">
                 <a:solidFill>
                   <a:srgbClr val="FFFFFF"/>
                 </a:solidFill>
               </a14:hiddenFill>
             </a:ext>
             <a:ext uri="{91240B29-F687-4f45-9708-019B960494DF}">
-              <a14:hiddenLine xmlns="" xmlns:a14="http://schemas.microsoft.com/office/drawing/2010/main" w="9525">
+              <a14:hiddenLine xmlns:a14="http://schemas.microsoft.com/office/drawing/2010/main" xmlns="" w="9525">
                 <a:solidFill>
                   <a:srgbClr val="000000"/>
                 </a:solidFill>
@@ -20482,14 +20576,14 @@
           </a:ln>
           <a:extLst>
             <a:ext uri="{909E8E84-426E-40dd-AFC4-6F175D3DCCD1}">
-              <a14:hiddenFill xmlns="" xmlns:a14="http://schemas.microsoft.com/office/drawing/2010/main">
+              <a14:hiddenFill xmlns:a14="http://schemas.microsoft.com/office/drawing/2010/main" xmlns="">
                 <a:solidFill>
                   <a:srgbClr val="FFFFFF"/>
                 </a:solidFill>
               </a14:hiddenFill>
             </a:ext>
             <a:ext uri="{91240B29-F687-4f45-9708-019B960494DF}">
-              <a14:hiddenLine xmlns="" xmlns:a14="http://schemas.microsoft.com/office/drawing/2010/main" w="9525">
+              <a14:hiddenLine xmlns:a14="http://schemas.microsoft.com/office/drawing/2010/main" xmlns="" w="9525">
                 <a:solidFill>
                   <a:srgbClr val="000000"/>
                 </a:solidFill>
@@ -20673,7 +20767,7 @@
             </a:ln>
             <a:extLst>
               <a:ext uri="{909E8E84-426E-40dd-AFC4-6F175D3DCCD1}">
-                <a14:hiddenFill xmlns="" xmlns:a14="http://schemas.microsoft.com/office/drawing/2010/main">
+                <a14:hiddenFill xmlns:a14="http://schemas.microsoft.com/office/drawing/2010/main" xmlns="">
                   <a:solidFill>
                     <a:srgbClr val="FFFFFF"/>
                   </a:solidFill>
@@ -20864,7 +20958,7 @@
             </a:ln>
             <a:extLst>
               <a:ext uri="{909E8E84-426E-40dd-AFC4-6F175D3DCCD1}">
-                <a14:hiddenFill xmlns="" xmlns:a14="http://schemas.microsoft.com/office/drawing/2010/main">
+                <a14:hiddenFill xmlns:a14="http://schemas.microsoft.com/office/drawing/2010/main" xmlns="">
                   <a:solidFill>
                     <a:srgbClr val="FFFFFF"/>
                   </a:solidFill>
@@ -20982,7 +21076,7 @@
           </a:ln>
           <a:extLst>
             <a:ext uri="{909E8E84-426E-40dd-AFC4-6F175D3DCCD1}">
-              <a14:hiddenFill xmlns="" xmlns:a14="http://schemas.microsoft.com/office/drawing/2010/main">
+              <a14:hiddenFill xmlns:a14="http://schemas.microsoft.com/office/drawing/2010/main" xmlns="">
                 <a:solidFill>
                   <a:srgbClr val="FFFFFF"/>
                 </a:solidFill>
@@ -23067,14 +23161,14 @@
             </a:ln>
             <a:extLst>
               <a:ext uri="{909E8E84-426E-40dd-AFC4-6F175D3DCCD1}">
-                <a14:hiddenFill xmlns="" xmlns:a14="http://schemas.microsoft.com/office/drawing/2010/main">
+                <a14:hiddenFill xmlns:a14="http://schemas.microsoft.com/office/drawing/2010/main" xmlns="">
                   <a:solidFill>
                     <a:srgbClr val="FFFFFF"/>
                   </a:solidFill>
                 </a14:hiddenFill>
               </a:ext>
               <a:ext uri="{91240B29-F687-4f45-9708-019B960494DF}">
-                <a14:hiddenLine xmlns="" xmlns:a14="http://schemas.microsoft.com/office/drawing/2010/main" w="9525">
+                <a14:hiddenLine xmlns:a14="http://schemas.microsoft.com/office/drawing/2010/main" xmlns="" w="9525">
                   <a:solidFill>
                     <a:srgbClr val="000000"/>
                   </a:solidFill>
@@ -23133,14 +23227,14 @@
           </a:ln>
           <a:extLst>
             <a:ext uri="{909E8E84-426E-40dd-AFC4-6F175D3DCCD1}">
-              <a14:hiddenFill xmlns="" xmlns:a14="http://schemas.microsoft.com/office/drawing/2010/main">
+              <a14:hiddenFill xmlns:a14="http://schemas.microsoft.com/office/drawing/2010/main" xmlns="">
                 <a:solidFill>
                   <a:srgbClr val="FFFFFF"/>
                 </a:solidFill>
               </a14:hiddenFill>
             </a:ext>
             <a:ext uri="{91240B29-F687-4f45-9708-019B960494DF}">
-              <a14:hiddenLine xmlns="" xmlns:a14="http://schemas.microsoft.com/office/drawing/2010/main" w="9525">
+              <a14:hiddenLine xmlns:a14="http://schemas.microsoft.com/office/drawing/2010/main" xmlns="" w="9525">
                 <a:solidFill>
                   <a:srgbClr val="000000"/>
                 </a:solidFill>
@@ -23615,14 +23709,14 @@
           </a:ln>
           <a:extLst>
             <a:ext uri="{909E8E84-426E-40dd-AFC4-6F175D3DCCD1}">
-              <a14:hiddenFill xmlns="" xmlns:a14="http://schemas.microsoft.com/office/drawing/2010/main">
+              <a14:hiddenFill xmlns:a14="http://schemas.microsoft.com/office/drawing/2010/main" xmlns="">
                 <a:solidFill>
                   <a:srgbClr val="FFFFFF"/>
                 </a:solidFill>
               </a14:hiddenFill>
             </a:ext>
             <a:ext uri="{91240B29-F687-4f45-9708-019B960494DF}">
-              <a14:hiddenLine xmlns="" xmlns:a14="http://schemas.microsoft.com/office/drawing/2010/main" w="9525">
+              <a14:hiddenLine xmlns:a14="http://schemas.microsoft.com/office/drawing/2010/main" xmlns="" w="9525">
                 <a:solidFill>
                   <a:srgbClr val="000000"/>
                 </a:solidFill>
@@ -24502,14 +24596,14 @@
             </a:ln>
             <a:extLst>
               <a:ext uri="{909E8E84-426E-40dd-AFC4-6F175D3DCCD1}">
-                <a14:hiddenFill xmlns="" xmlns:a14="http://schemas.microsoft.com/office/drawing/2010/main">
+                <a14:hiddenFill xmlns:a14="http://schemas.microsoft.com/office/drawing/2010/main" xmlns="">
                   <a:solidFill>
                     <a:srgbClr val="FFFFFF"/>
                   </a:solidFill>
                 </a14:hiddenFill>
               </a:ext>
               <a:ext uri="{91240B29-F687-4f45-9708-019B960494DF}">
-                <a14:hiddenLine xmlns="" xmlns:a14="http://schemas.microsoft.com/office/drawing/2010/main" w="9525">
+                <a14:hiddenLine xmlns:a14="http://schemas.microsoft.com/office/drawing/2010/main" xmlns="" w="9525">
                   <a:solidFill>
                     <a:srgbClr val="000000"/>
                   </a:solidFill>
@@ -25472,7 +25566,7 @@
           <a:noFill/>
           <a:extLst>
             <a:ext uri="{909E8E84-426E-40dd-AFC4-6F175D3DCCD1}">
-              <a14:hiddenFill xmlns="" xmlns:a14="http://schemas.microsoft.com/office/drawing/2010/main">
+              <a14:hiddenFill xmlns:a14="http://schemas.microsoft.com/office/drawing/2010/main" xmlns="">
                 <a:solidFill>
                   <a:srgbClr val="FFFFFF"/>
                 </a:solidFill>
@@ -25757,14 +25851,14 @@
           </a:ln>
           <a:extLst>
             <a:ext uri="{909E8E84-426E-40dd-AFC4-6F175D3DCCD1}">
-              <a14:hiddenFill xmlns="" xmlns:a14="http://schemas.microsoft.com/office/drawing/2010/main">
+              <a14:hiddenFill xmlns:a14="http://schemas.microsoft.com/office/drawing/2010/main" xmlns="">
                 <a:solidFill>
                   <a:srgbClr val="FFFFFF"/>
                 </a:solidFill>
               </a14:hiddenFill>
             </a:ext>
             <a:ext uri="{91240B29-F687-4f45-9708-019B960494DF}">
-              <a14:hiddenLine xmlns="" xmlns:a14="http://schemas.microsoft.com/office/drawing/2010/main" w="9525">
+              <a14:hiddenLine xmlns:a14="http://schemas.microsoft.com/office/drawing/2010/main" xmlns="" w="9525">
                 <a:solidFill>
                   <a:srgbClr val="000000"/>
                 </a:solidFill>
@@ -26712,14 +26806,14 @@
           </a:ln>
           <a:extLst>
             <a:ext uri="{909E8E84-426E-40dd-AFC4-6F175D3DCCD1}">
-              <a14:hiddenFill xmlns="" xmlns:a14="http://schemas.microsoft.com/office/drawing/2010/main">
+              <a14:hiddenFill xmlns:a14="http://schemas.microsoft.com/office/drawing/2010/main" xmlns="">
                 <a:solidFill>
                   <a:schemeClr val="accent1"/>
                 </a:solidFill>
               </a14:hiddenFill>
             </a:ext>
             <a:ext uri="{91240B29-F687-4f45-9708-019B960494DF}">
-              <a14:hiddenLine xmlns="" xmlns:a14="http://schemas.microsoft.com/office/drawing/2010/main" w="9525">
+              <a14:hiddenLine xmlns:a14="http://schemas.microsoft.com/office/drawing/2010/main" xmlns="" w="9525">
                 <a:solidFill>
                   <a:schemeClr val="tx1"/>
                 </a:solidFill>
@@ -26769,17 +26863,7 @@
                 <a:latin typeface="Calibri" panose="020F0502020204030204" pitchFamily="34" charset="0"/>
                 <a:sym typeface="Wingdings"/>
               </a:rPr>
-              <a:t>executable IGV </a:t>
-            </a:r>
-            <a:r>
-              <a:rPr lang="en-US" sz="2400" b="1" i="1" dirty="0" smtClean="0">
-                <a:solidFill>
-                  <a:srgbClr val="C00000"/>
-                </a:solidFill>
-                <a:latin typeface="Calibri" panose="020F0502020204030204" pitchFamily="34" charset="0"/>
-                <a:sym typeface="Wingdings"/>
-              </a:rPr>
-              <a:t> </a:t>
+              <a:t>executable IGV  </a:t>
             </a:r>
             <a:r>
               <a:rPr lang="en-US" sz="2400" dirty="0">
@@ -26828,19 +26912,8 @@
                 <a:latin typeface="Calibri" panose="020F0502020204030204" pitchFamily="34" charset="0"/>
                 <a:sym typeface="Wingdings"/>
               </a:rPr>
-              <a:t>warning pops </a:t>
-            </a:r>
-            <a:r>
-              <a:rPr lang="en-US" sz="2400" dirty="0" smtClean="0">
-                <a:latin typeface="Calibri" panose="020F0502020204030204" pitchFamily="34" charset="0"/>
-                <a:sym typeface="Wingdings"/>
-              </a:rPr>
-              <a:t>up make sure to allow IGV access to the internet – it needs this to download genomes.</a:t>
-            </a:r>
-            <a:endParaRPr lang="en-US" sz="2400" dirty="0" smtClean="0">
-              <a:latin typeface="Calibri" panose="020F0502020204030204" pitchFamily="34" charset="0"/>
-              <a:sym typeface="Wingdings"/>
-            </a:endParaRPr>
+              <a:t>warning pops up make sure to allow IGV access to the internet – it needs this to download genomes.</a:t>
+            </a:r>
           </a:p>
         </p:txBody>
       </p:sp>
@@ -27562,13 +27635,7 @@
               <a:rPr lang="en-US" sz="2400" dirty="0" smtClean="0">
                 <a:latin typeface="Calibri" panose="020F0502020204030204" pitchFamily="34" charset="0"/>
               </a:rPr>
-              <a:t>And we would </a:t>
-            </a:r>
-            <a:r>
-              <a:rPr lang="en-US" sz="2400" dirty="0" smtClean="0">
-                <a:latin typeface="Calibri" panose="020F0502020204030204" pitchFamily="34" charset="0"/>
-              </a:rPr>
-              <a:t>right-click to copy the URL of </a:t>
+              <a:t>And we would right-click to copy the URL of </a:t>
             </a:r>
             <a:r>
               <a:rPr lang="en-US" sz="2400" b="1" dirty="0" err="1" smtClean="0">
@@ -27700,6 +27767,331 @@
 </file>
 
 <file path=ppt/slides/slide25.xml><?xml version="1.0" encoding="utf-8"?>
+<p:sld xmlns:a="http://schemas.openxmlformats.org/drawingml/2006/main" xmlns:r="http://schemas.openxmlformats.org/officeDocument/2006/relationships" xmlns:p="http://schemas.openxmlformats.org/presentationml/2006/main" showMasterSp="0">
+  <p:cSld>
+    <p:spTree>
+      <p:nvGrpSpPr>
+        <p:cNvPr id="1" name=""/>
+        <p:cNvGrpSpPr/>
+        <p:nvPr/>
+      </p:nvGrpSpPr>
+      <p:grpSpPr>
+        <a:xfrm>
+          <a:off x="0" y="0"/>
+          <a:ext cx="0" cy="0"/>
+          <a:chOff x="0" y="0"/>
+          <a:chExt cx="0" cy="0"/>
+        </a:xfrm>
+      </p:grpSpPr>
+      <p:graphicFrame>
+        <p:nvGraphicFramePr>
+          <p:cNvPr id="13" name="Table 12"/>
+          <p:cNvGraphicFramePr>
+            <a:graphicFrameLocks noGrp="1"/>
+          </p:cNvGraphicFramePr>
+          <p:nvPr>
+            <p:extLst>
+              <p:ext uri="{D42A27DB-BD31-4B8C-83A1-F6EECF244321}">
+                <p14:modId xmlns:p14="http://schemas.microsoft.com/office/powerpoint/2010/main" val="1891193571"/>
+              </p:ext>
+            </p:extLst>
+          </p:nvPr>
+        </p:nvGraphicFramePr>
+        <p:xfrm>
+          <a:off x="0" y="0"/>
+          <a:ext cx="9144000" cy="640080"/>
+        </p:xfrm>
+        <a:graphic>
+          <a:graphicData uri="http://schemas.openxmlformats.org/drawingml/2006/table">
+            <a:tbl>
+              <a:tblPr firstRow="1" bandRow="1">
+                <a:tableStyleId>{5C22544A-7EE6-4342-B048-85BDC9FD1C3A}</a:tableStyleId>
+              </a:tblPr>
+              <a:tblGrid>
+                <a:gridCol w="8229600">
+                  <a:extLst>
+                    <a:ext uri="{9D8B030D-6E8A-4147-A177-3AD203B41FA5}">
+                      <a16:colId xmlns:a16="http://schemas.microsoft.com/office/drawing/2014/main" val="20000"/>
+                    </a:ext>
+                  </a:extLst>
+                </a:gridCol>
+                <a:gridCol w="914400">
+                  <a:extLst>
+                    <a:ext uri="{9D8B030D-6E8A-4147-A177-3AD203B41FA5}">
+                      <a16:colId xmlns:a16="http://schemas.microsoft.com/office/drawing/2014/main" val="20001"/>
+                    </a:ext>
+                  </a:extLst>
+                </a:gridCol>
+              </a:tblGrid>
+              <a:tr h="640080">
+                <a:tc>
+                  <a:txBody>
+                    <a:bodyPr/>
+                    <a:lstStyle/>
+                    <a:p>
+                      <a:pPr algn="ctr"/>
+                      <a:r>
+                        <a:rPr lang="en-US" sz="3200" b="0" dirty="0" smtClean="0">
+                          <a:solidFill>
+                            <a:schemeClr val="tx1"/>
+                          </a:solidFill>
+                          <a:latin typeface="Calibri" panose="020F0502020204030204" pitchFamily="34" charset="0"/>
+                        </a:rPr>
+                        <a:t>Visualization</a:t>
+                      </a:r>
+                      <a:r>
+                        <a:rPr lang="en-US" sz="3200" b="0" baseline="0" dirty="0" smtClean="0">
+                          <a:solidFill>
+                            <a:schemeClr val="tx1"/>
+                          </a:solidFill>
+                          <a:latin typeface="Calibri" panose="020F0502020204030204" pitchFamily="34" charset="0"/>
+                        </a:rPr>
+                        <a:t> in </a:t>
+                      </a:r>
+                      <a:r>
+                        <a:rPr lang="en-US" sz="3200" b="1" i="1" baseline="0" dirty="0" smtClean="0">
+                          <a:solidFill>
+                            <a:schemeClr val="tx1"/>
+                          </a:solidFill>
+                          <a:latin typeface="Calibri" panose="020F0502020204030204" pitchFamily="34" charset="0"/>
+                        </a:rPr>
+                        <a:t>IGV</a:t>
+                      </a:r>
+                      <a:endParaRPr lang="en-US" sz="3200" b="1" i="1" dirty="0">
+                        <a:solidFill>
+                          <a:schemeClr val="tx1"/>
+                        </a:solidFill>
+                        <a:latin typeface="Calibri" panose="020F0502020204030204" pitchFamily="34" charset="0"/>
+                      </a:endParaRPr>
+                    </a:p>
+                  </a:txBody>
+                  <a:tcPr anchor="ctr">
+                    <a:lnL w="12700" cmpd="sng">
+                      <a:noFill/>
+                    </a:lnL>
+                    <a:lnR w="12700" cmpd="sng">
+                      <a:noFill/>
+                    </a:lnR>
+                    <a:lnT w="12700" cmpd="sng">
+                      <a:noFill/>
+                    </a:lnT>
+                    <a:lnB w="38100" cmpd="sng">
+                      <a:noFill/>
+                    </a:lnB>
+                    <a:lnTlToBr w="12700" cmpd="sng">
+                      <a:noFill/>
+                      <a:prstDash val="solid"/>
+                    </a:lnTlToBr>
+                    <a:lnBlToTr w="12700" cmpd="sng">
+                      <a:noFill/>
+                      <a:prstDash val="solid"/>
+                    </a:lnBlToTr>
+                    <a:noFill/>
+                  </a:tcPr>
+                </a:tc>
+                <a:tc>
+                  <a:txBody>
+                    <a:bodyPr/>
+                    <a:lstStyle/>
+                    <a:p>
+                      <a:pPr algn="r"/>
+                      <a:endParaRPr lang="en-US" sz="3200" b="1" dirty="0">
+                        <a:solidFill>
+                          <a:srgbClr val="DA0000"/>
+                        </a:solidFill>
+                        <a:latin typeface="Calibri" panose="020F0502020204030204" pitchFamily="34" charset="0"/>
+                      </a:endParaRPr>
+                    </a:p>
+                  </a:txBody>
+                  <a:tcPr anchor="ctr">
+                    <a:lnL w="12700" cmpd="sng">
+                      <a:noFill/>
+                    </a:lnL>
+                    <a:lnR w="12700" cmpd="sng">
+                      <a:noFill/>
+                    </a:lnR>
+                    <a:lnT w="12700" cmpd="sng">
+                      <a:noFill/>
+                    </a:lnT>
+                    <a:lnB w="38100" cmpd="sng">
+                      <a:noFill/>
+                    </a:lnB>
+                    <a:lnTlToBr w="12700" cmpd="sng">
+                      <a:noFill/>
+                      <a:prstDash val="solid"/>
+                    </a:lnTlToBr>
+                    <a:lnBlToTr w="12700" cmpd="sng">
+                      <a:noFill/>
+                      <a:prstDash val="solid"/>
+                    </a:lnBlToTr>
+                    <a:noFill/>
+                  </a:tcPr>
+                </a:tc>
+                <a:extLst>
+                  <a:ext uri="{0D108BD9-81ED-4DB2-BD59-A6C34878D82A}">
+                    <a16:rowId xmlns:a16="http://schemas.microsoft.com/office/drawing/2014/main" val="10000"/>
+                  </a:ext>
+                </a:extLst>
+              </a:tr>
+            </a:tbl>
+          </a:graphicData>
+        </a:graphic>
+      </p:graphicFrame>
+      <p:sp>
+        <p:nvSpPr>
+          <p:cNvPr id="3" name="TextBox 2"/>
+          <p:cNvSpPr txBox="1"/>
+          <p:nvPr/>
+        </p:nvSpPr>
+        <p:spPr>
+          <a:xfrm>
+            <a:off x="269508" y="640080"/>
+            <a:ext cx="8778240" cy="830997"/>
+          </a:xfrm>
+          <a:prstGeom prst="rect">
+            <a:avLst/>
+          </a:prstGeom>
+          <a:noFill/>
+        </p:spPr>
+        <p:txBody>
+          <a:bodyPr wrap="square" rtlCol="0">
+            <a:spAutoFit/>
+          </a:bodyPr>
+          <a:lstStyle/>
+          <a:p>
+            <a:r>
+              <a:rPr lang="en-US" sz="2400" dirty="0" smtClean="0">
+                <a:latin typeface="Calibri" panose="020F0502020204030204" pitchFamily="34" charset="0"/>
+              </a:rPr>
+              <a:t>Since it did not, go to the notebook for this class, and copy </a:t>
+            </a:r>
+            <a:r>
+              <a:rPr lang="en-US" sz="2400" dirty="0" smtClean="0">
+                <a:latin typeface="Calibri" panose="020F0502020204030204" pitchFamily="34" charset="0"/>
+              </a:rPr>
+              <a:t>the URL of </a:t>
+            </a:r>
+            <a:r>
+              <a:rPr lang="en-US" sz="2400" dirty="0" smtClean="0">
+                <a:latin typeface="Calibri" panose="020F0502020204030204" pitchFamily="34" charset="0"/>
+              </a:rPr>
+              <a:t>the </a:t>
+            </a:r>
+            <a:r>
+              <a:rPr lang="en-US" sz="2400" b="1" dirty="0" err="1" smtClean="0">
+                <a:latin typeface="Calibri" panose="020F0502020204030204" pitchFamily="34" charset="0"/>
+              </a:rPr>
+              <a:t>genes.fpkm.tracking</a:t>
+            </a:r>
+            <a:r>
+              <a:rPr lang="en-US" sz="2400" b="1" dirty="0" smtClean="0">
+                <a:latin typeface="Calibri" panose="020F0502020204030204" pitchFamily="34" charset="0"/>
+              </a:rPr>
+              <a:t> </a:t>
+            </a:r>
+            <a:r>
+              <a:rPr lang="en-US" sz="2400" dirty="0" smtClean="0">
+                <a:latin typeface="Calibri" panose="020F0502020204030204" pitchFamily="34" charset="0"/>
+              </a:rPr>
+              <a:t>file found in the last cell of the notebook.</a:t>
+            </a:r>
+            <a:endParaRPr lang="en-US" sz="2400" dirty="0" smtClean="0">
+              <a:latin typeface="Calibri" panose="020F0502020204030204" pitchFamily="34" charset="0"/>
+            </a:endParaRPr>
+          </a:p>
+        </p:txBody>
+      </p:sp>
+      <p:pic>
+        <p:nvPicPr>
+          <p:cNvPr id="4" name="Picture 3"/>
+          <p:cNvPicPr>
+            <a:picLocks noChangeAspect="1"/>
+          </p:cNvPicPr>
+          <p:nvPr/>
+        </p:nvPicPr>
+        <p:blipFill>
+          <a:blip r:embed="rId3"/>
+          <a:stretch>
+            <a:fillRect/>
+          </a:stretch>
+        </p:blipFill>
+        <p:spPr>
+          <a:xfrm>
+            <a:off x="838751" y="1471077"/>
+            <a:ext cx="7466497" cy="5250111"/>
+          </a:xfrm>
+          <a:prstGeom prst="rect">
+            <a:avLst/>
+          </a:prstGeom>
+        </p:spPr>
+      </p:pic>
+      <p:sp>
+        <p:nvSpPr>
+          <p:cNvPr id="14" name="Rounded Rectangle 13"/>
+          <p:cNvSpPr/>
+          <p:nvPr/>
+        </p:nvSpPr>
+        <p:spPr>
+          <a:xfrm>
+            <a:off x="838751" y="2820202"/>
+            <a:ext cx="1249932" cy="185348"/>
+          </a:xfrm>
+          <a:prstGeom prst="roundRect">
+            <a:avLst/>
+          </a:prstGeom>
+          <a:noFill/>
+          <a:ln w="38100">
+            <a:solidFill>
+              <a:schemeClr val="accent2"/>
+            </a:solidFill>
+          </a:ln>
+        </p:spPr>
+        <p:style>
+          <a:lnRef idx="2">
+            <a:schemeClr val="accent1">
+              <a:shade val="50000"/>
+            </a:schemeClr>
+          </a:lnRef>
+          <a:fillRef idx="1">
+            <a:schemeClr val="accent1"/>
+          </a:fillRef>
+          <a:effectRef idx="0">
+            <a:schemeClr val="accent1"/>
+          </a:effectRef>
+          <a:fontRef idx="minor">
+            <a:schemeClr val="lt1"/>
+          </a:fontRef>
+        </p:style>
+        <p:txBody>
+          <a:bodyPr rtlCol="0" anchor="ctr"/>
+          <a:lstStyle/>
+          <a:p>
+            <a:pPr algn="ctr"/>
+            <a:endParaRPr lang="en-US"/>
+          </a:p>
+        </p:txBody>
+      </p:sp>
+    </p:spTree>
+    <p:extLst>
+      <p:ext uri="{BB962C8B-B14F-4D97-AF65-F5344CB8AC3E}">
+        <p14:creationId xmlns:p14="http://schemas.microsoft.com/office/powerpoint/2010/main" val="1269419190"/>
+      </p:ext>
+    </p:extLst>
+  </p:cSld>
+  <p:clrMapOvr>
+    <a:masterClrMapping/>
+  </p:clrMapOvr>
+  <p:timing>
+    <p:tnLst>
+      <p:par>
+        <p:cTn id="1" dur="indefinite" restart="never" nodeType="tmRoot"/>
+      </p:par>
+    </p:tnLst>
+  </p:timing>
+</p:sld>
+</file>
+
+<file path=ppt/slides/slide26.xml><?xml version="1.0" encoding="utf-8"?>
 <p:sld xmlns:a="http://schemas.openxmlformats.org/drawingml/2006/main" xmlns:r="http://schemas.openxmlformats.org/officeDocument/2006/relationships" xmlns:p="http://schemas.openxmlformats.org/presentationml/2006/main">
   <p:cSld>
     <p:spTree>
@@ -27909,19 +28301,7 @@
               <a:rPr lang="en-US" sz="2400" dirty="0" smtClean="0">
                 <a:latin typeface="Calibri" panose="020F0502020204030204" pitchFamily="34" charset="0"/>
               </a:rPr>
-              <a:t>menu, </a:t>
-            </a:r>
-            <a:r>
-              <a:rPr lang="en-US" sz="2400" dirty="0" smtClean="0">
-                <a:latin typeface="Calibri" panose="020F0502020204030204" pitchFamily="34" charset="0"/>
-              </a:rPr>
-              <a:t>you would then paste </a:t>
-            </a:r>
-            <a:r>
-              <a:rPr lang="en-US" sz="2400" dirty="0" smtClean="0">
-                <a:latin typeface="Calibri" panose="020F0502020204030204" pitchFamily="34" charset="0"/>
-              </a:rPr>
-              <a:t>in the </a:t>
+              <a:t>menu, you would then paste in the </a:t>
             </a:r>
             <a:r>
               <a:rPr lang="en-US" sz="2400" b="1" dirty="0" err="1" smtClean="0">
@@ -28205,7 +28585,7 @@
 </p:sld>
 </file>
 
-<file path=ppt/slides/slide26.xml><?xml version="1.0" encoding="utf-8"?>
+<file path=ppt/slides/slide27.xml><?xml version="1.0" encoding="utf-8"?>
 <p:sld xmlns:a="http://schemas.openxmlformats.org/drawingml/2006/main" xmlns:r="http://schemas.openxmlformats.org/officeDocument/2006/relationships" xmlns:p="http://schemas.openxmlformats.org/presentationml/2006/main" showMasterSp="0">
   <p:cSld>
     <p:spTree>
@@ -28390,14 +28770,14 @@
             </a:ln>
             <a:extLst>
               <a:ext uri="{909E8E84-426E-40dd-AFC4-6F175D3DCCD1}">
-                <a14:hiddenFill xmlns="" xmlns:a14="http://schemas.microsoft.com/office/drawing/2010/main">
+                <a14:hiddenFill xmlns:a14="http://schemas.microsoft.com/office/drawing/2010/main" xmlns="">
                   <a:solidFill>
                     <a:schemeClr val="accent1"/>
                   </a:solidFill>
                 </a14:hiddenFill>
               </a:ext>
               <a:ext uri="{91240B29-F687-4f45-9708-019B960494DF}">
-                <a14:hiddenLine xmlns="" xmlns:a14="http://schemas.microsoft.com/office/drawing/2010/main" w="9525">
+                <a14:hiddenLine xmlns:a14="http://schemas.microsoft.com/office/drawing/2010/main" xmlns="" w="9525">
                   <a:solidFill>
                     <a:schemeClr val="tx1"/>
                   </a:solidFill>
@@ -28792,7 +29172,7 @@
 </p:sld>
 </file>
 
-<file path=ppt/slides/slide27.xml><?xml version="1.0" encoding="utf-8"?>
+<file path=ppt/slides/slide28.xml><?xml version="1.0" encoding="utf-8"?>
 <p:sld xmlns:a="http://schemas.openxmlformats.org/drawingml/2006/main" xmlns:r="http://schemas.openxmlformats.org/officeDocument/2006/relationships" xmlns:p="http://schemas.openxmlformats.org/presentationml/2006/main" showMasterSp="0">
   <p:cSld>
     <p:spTree>
@@ -28952,14 +29332,14 @@
           </a:ln>
           <a:extLst>
             <a:ext uri="{909E8E84-426E-40dd-AFC4-6F175D3DCCD1}">
-              <a14:hiddenFill xmlns="" xmlns:a14="http://schemas.microsoft.com/office/drawing/2010/main">
+              <a14:hiddenFill xmlns:a14="http://schemas.microsoft.com/office/drawing/2010/main" xmlns="">
                 <a:solidFill>
                   <a:schemeClr val="accent1"/>
                 </a:solidFill>
               </a14:hiddenFill>
             </a:ext>
             <a:ext uri="{91240B29-F687-4f45-9708-019B960494DF}">
-              <a14:hiddenLine xmlns="" xmlns:a14="http://schemas.microsoft.com/office/drawing/2010/main" w="9525">
+              <a14:hiddenLine xmlns:a14="http://schemas.microsoft.com/office/drawing/2010/main" xmlns="" w="9525">
                 <a:solidFill>
                   <a:schemeClr val="tx1"/>
                 </a:solidFill>
@@ -29249,7 +29629,7 @@
 </p:sld>
 </file>
 
-<file path=ppt/slides/slide28.xml><?xml version="1.0" encoding="utf-8"?>
+<file path=ppt/slides/slide29.xml><?xml version="1.0" encoding="utf-8"?>
 <p:sld xmlns:a="http://schemas.openxmlformats.org/drawingml/2006/main" xmlns:r="http://schemas.openxmlformats.org/officeDocument/2006/relationships" xmlns:p="http://schemas.openxmlformats.org/presentationml/2006/main" showMasterSp="0">
   <p:cSld>
     <p:spTree>
@@ -29375,14 +29755,14 @@
             </a:ln>
             <a:extLst>
               <a:ext uri="{909E8E84-426E-40dd-AFC4-6F175D3DCCD1}">
-                <a14:hiddenFill xmlns="" xmlns:a14="http://schemas.microsoft.com/office/drawing/2010/main">
+                <a14:hiddenFill xmlns:a14="http://schemas.microsoft.com/office/drawing/2010/main" xmlns="">
                   <a:solidFill>
                     <a:schemeClr val="accent1"/>
                   </a:solidFill>
                 </a14:hiddenFill>
               </a:ext>
               <a:ext uri="{91240B29-F687-4f45-9708-019B960494DF}">
-                <a14:hiddenLine xmlns="" xmlns:a14="http://schemas.microsoft.com/office/drawing/2010/main" w="9525">
+                <a14:hiddenLine xmlns:a14="http://schemas.microsoft.com/office/drawing/2010/main" xmlns="" w="9525">
                   <a:solidFill>
                     <a:schemeClr val="tx1"/>
                   </a:solidFill>
@@ -29771,7 +30151,785 @@
 </p:sld>
 </file>
 
-<file path=ppt/slides/slide29.xml><?xml version="1.0" encoding="utf-8"?>
+<file path=ppt/slides/slide3.xml><?xml version="1.0" encoding="utf-8"?>
+<p:sld xmlns:a="http://schemas.openxmlformats.org/drawingml/2006/main" xmlns:r="http://schemas.openxmlformats.org/officeDocument/2006/relationships" xmlns:p="http://schemas.openxmlformats.org/presentationml/2006/main" showMasterSp="0">
+  <p:cSld>
+    <p:spTree>
+      <p:nvGrpSpPr>
+        <p:cNvPr id="1" name=""/>
+        <p:cNvGrpSpPr/>
+        <p:nvPr/>
+      </p:nvGrpSpPr>
+      <p:grpSpPr>
+        <a:xfrm>
+          <a:off x="0" y="0"/>
+          <a:ext cx="0" cy="0"/>
+          <a:chOff x="0" y="0"/>
+          <a:chExt cx="0" cy="0"/>
+        </a:xfrm>
+      </p:grpSpPr>
+      <p:sp>
+        <p:nvSpPr>
+          <p:cNvPr id="7" name="TextBox 6"/>
+          <p:cNvSpPr txBox="1"/>
+          <p:nvPr/>
+        </p:nvSpPr>
+        <p:spPr>
+          <a:xfrm>
+            <a:off x="5867400" y="2362200"/>
+            <a:ext cx="2125903" cy="769441"/>
+          </a:xfrm>
+          <a:prstGeom prst="rect">
+            <a:avLst/>
+          </a:prstGeom>
+          <a:solidFill>
+            <a:srgbClr val="FFFFFF"/>
+          </a:solidFill>
+          <a:ln w="25400">
+            <a:solidFill>
+              <a:schemeClr val="bg1">
+                <a:lumMod val="85000"/>
+              </a:schemeClr>
+            </a:solidFill>
+          </a:ln>
+          <a:effectLst>
+            <a:outerShdw blurRad="50800" dist="38100" dir="2700000" algn="tl" rotWithShape="0">
+              <a:prstClr val="black">
+                <a:alpha val="40000"/>
+              </a:prstClr>
+            </a:outerShdw>
+          </a:effectLst>
+        </p:spPr>
+        <p:txBody>
+          <a:bodyPr wrap="none" rtlCol="0">
+            <a:spAutoFit/>
+          </a:bodyPr>
+          <a:lstStyle/>
+          <a:p>
+            <a:r>
+              <a:rPr lang="en-US" sz="2400" dirty="0" smtClean="0">
+                <a:latin typeface="Calibri" panose="020F0502020204030204" pitchFamily="34" charset="0"/>
+              </a:rPr>
+              <a:t>Local files </a:t>
+            </a:r>
+          </a:p>
+          <a:p>
+            <a:r>
+              <a:rPr lang="en-US" sz="2000" dirty="0" smtClean="0">
+                <a:latin typeface="Calibri" panose="020F0502020204030204" pitchFamily="34" charset="0"/>
+              </a:rPr>
+              <a:t>(computer or LAN)</a:t>
+            </a:r>
+          </a:p>
+        </p:txBody>
+      </p:sp>
+      <p:sp>
+        <p:nvSpPr>
+          <p:cNvPr id="8" name="TextBox 7"/>
+          <p:cNvSpPr txBox="1"/>
+          <p:nvPr/>
+        </p:nvSpPr>
+        <p:spPr>
+          <a:xfrm>
+            <a:off x="1148420" y="3027639"/>
+            <a:ext cx="1977587" cy="830997"/>
+          </a:xfrm>
+          <a:prstGeom prst="rect">
+            <a:avLst/>
+          </a:prstGeom>
+          <a:solidFill>
+            <a:schemeClr val="bg1"/>
+          </a:solidFill>
+          <a:ln w="25400">
+            <a:solidFill>
+              <a:schemeClr val="bg1">
+                <a:lumMod val="85000"/>
+              </a:schemeClr>
+            </a:solidFill>
+          </a:ln>
+          <a:effectLst>
+            <a:outerShdw blurRad="50800" dist="38100" dir="2700000" algn="tl" rotWithShape="0">
+              <a:prstClr val="black">
+                <a:alpha val="40000"/>
+              </a:prstClr>
+            </a:outerShdw>
+          </a:effectLst>
+        </p:spPr>
+        <p:txBody>
+          <a:bodyPr wrap="square" rtlCol="0">
+            <a:spAutoFit/>
+          </a:bodyPr>
+          <a:lstStyle/>
+          <a:p>
+            <a:r>
+              <a:rPr lang="en-US" sz="2400" dirty="0" smtClean="0">
+                <a:latin typeface="Calibri" panose="020F0502020204030204" pitchFamily="34" charset="0"/>
+              </a:rPr>
+              <a:t>HTTP server (GenePattern)</a:t>
+            </a:r>
+            <a:endParaRPr lang="en-US" sz="2400" dirty="0">
+              <a:latin typeface="Calibri" panose="020F0502020204030204" pitchFamily="34" charset="0"/>
+            </a:endParaRPr>
+          </a:p>
+        </p:txBody>
+      </p:sp>
+      <p:sp>
+        <p:nvSpPr>
+          <p:cNvPr id="9" name="TextBox 8"/>
+          <p:cNvSpPr txBox="1"/>
+          <p:nvPr/>
+        </p:nvSpPr>
+        <p:spPr>
+          <a:xfrm>
+            <a:off x="1600200" y="4070350"/>
+            <a:ext cx="1486304" cy="461665"/>
+          </a:xfrm>
+          <a:prstGeom prst="rect">
+            <a:avLst/>
+          </a:prstGeom>
+          <a:solidFill>
+            <a:srgbClr val="FFFFFF"/>
+          </a:solidFill>
+          <a:ln w="25400">
+            <a:solidFill>
+              <a:schemeClr val="bg1">
+                <a:lumMod val="85000"/>
+              </a:schemeClr>
+            </a:solidFill>
+          </a:ln>
+          <a:effectLst>
+            <a:outerShdw blurRad="50800" dist="38100" dir="2700000" algn="tl" rotWithShape="0">
+              <a:prstClr val="black">
+                <a:alpha val="40000"/>
+              </a:prstClr>
+            </a:outerShdw>
+          </a:effectLst>
+        </p:spPr>
+        <p:txBody>
+          <a:bodyPr wrap="none" rtlCol="0">
+            <a:spAutoFit/>
+          </a:bodyPr>
+          <a:lstStyle/>
+          <a:p>
+            <a:r>
+              <a:rPr lang="en-US" sz="2400" dirty="0" smtClean="0">
+                <a:latin typeface="Calibri" panose="020F0502020204030204" pitchFamily="34" charset="0"/>
+              </a:rPr>
+              <a:t>FTP server</a:t>
+            </a:r>
+            <a:endParaRPr lang="en-US" sz="2400" dirty="0">
+              <a:latin typeface="Calibri" panose="020F0502020204030204" pitchFamily="34" charset="0"/>
+            </a:endParaRPr>
+          </a:p>
+        </p:txBody>
+      </p:sp>
+      <p:sp>
+        <p:nvSpPr>
+          <p:cNvPr id="10" name="TextBox 9"/>
+          <p:cNvSpPr txBox="1"/>
+          <p:nvPr/>
+        </p:nvSpPr>
+        <p:spPr>
+          <a:xfrm>
+            <a:off x="5715000" y="4038600"/>
+            <a:ext cx="1989647" cy="461665"/>
+          </a:xfrm>
+          <a:prstGeom prst="rect">
+            <a:avLst/>
+          </a:prstGeom>
+          <a:solidFill>
+            <a:srgbClr val="FFFFFF"/>
+          </a:solidFill>
+          <a:ln w="25400">
+            <a:solidFill>
+              <a:schemeClr val="bg1">
+                <a:lumMod val="85000"/>
+              </a:schemeClr>
+            </a:solidFill>
+          </a:ln>
+          <a:effectLst>
+            <a:outerShdw blurRad="50800" dist="38100" dir="2700000" algn="tl" rotWithShape="0">
+              <a:prstClr val="black">
+                <a:alpha val="40000"/>
+              </a:prstClr>
+            </a:outerShdw>
+          </a:effectLst>
+        </p:spPr>
+        <p:txBody>
+          <a:bodyPr wrap="none" rtlCol="0">
+            <a:spAutoFit/>
+          </a:bodyPr>
+          <a:lstStyle/>
+          <a:p>
+            <a:r>
+              <a:rPr lang="en-US" sz="2400" dirty="0" err="1" smtClean="0">
+                <a:latin typeface="Calibri" panose="020F0502020204030204" pitchFamily="34" charset="0"/>
+              </a:rPr>
+              <a:t>GenomeSpace</a:t>
+            </a:r>
+            <a:endParaRPr lang="en-US" sz="2400" dirty="0">
+              <a:latin typeface="Calibri" panose="020F0502020204030204" pitchFamily="34" charset="0"/>
+            </a:endParaRPr>
+          </a:p>
+        </p:txBody>
+      </p:sp>
+      <p:pic>
+        <p:nvPicPr>
+          <p:cNvPr id="2" name="Picture 1" descr="Screen Shot 2013-04-10 at 11.51.58 PM.png"/>
+          <p:cNvPicPr>
+            <a:picLocks noChangeAspect="1"/>
+          </p:cNvPicPr>
+          <p:nvPr/>
+        </p:nvPicPr>
+        <p:blipFill>
+          <a:blip r:embed="rId3">
+            <a:extLst>
+              <a:ext uri="{28A0092B-C50C-407E-A947-70E740481C1C}">
+                <a14:useLocalDpi xmlns:a14="http://schemas.microsoft.com/office/drawing/2010/main" val="0"/>
+              </a:ext>
+            </a:extLst>
+          </a:blip>
+          <a:stretch>
+            <a:fillRect/>
+          </a:stretch>
+        </p:blipFill>
+        <p:spPr>
+          <a:xfrm>
+            <a:off x="4191000" y="2933700"/>
+            <a:ext cx="762000" cy="723900"/>
+          </a:xfrm>
+          <a:prstGeom prst="rect">
+            <a:avLst/>
+          </a:prstGeom>
+          <a:ln w="12700">
+            <a:noFill/>
+          </a:ln>
+        </p:spPr>
+      </p:pic>
+      <p:cxnSp>
+        <p:nvCxnSpPr>
+          <p:cNvPr id="17" name="Straight Arrow Connector 16"/>
+          <p:cNvCxnSpPr/>
+          <p:nvPr/>
+        </p:nvCxnSpPr>
+        <p:spPr>
+          <a:xfrm flipH="1">
+            <a:off x="5105400" y="2667000"/>
+            <a:ext cx="685800" cy="304800"/>
+          </a:xfrm>
+          <a:prstGeom prst="straightConnector1">
+            <a:avLst/>
+          </a:prstGeom>
+          <a:ln w="63500">
+            <a:solidFill>
+              <a:schemeClr val="tx1">
+                <a:lumMod val="50000"/>
+                <a:lumOff val="50000"/>
+              </a:schemeClr>
+            </a:solidFill>
+            <a:tailEnd type="arrow"/>
+          </a:ln>
+        </p:spPr>
+        <p:style>
+          <a:lnRef idx="2">
+            <a:schemeClr val="accent1"/>
+          </a:lnRef>
+          <a:fillRef idx="0">
+            <a:schemeClr val="accent1"/>
+          </a:fillRef>
+          <a:effectRef idx="1">
+            <a:schemeClr val="accent1"/>
+          </a:effectRef>
+          <a:fontRef idx="minor">
+            <a:schemeClr val="tx1"/>
+          </a:fontRef>
+        </p:style>
+      </p:cxnSp>
+      <p:cxnSp>
+        <p:nvCxnSpPr>
+          <p:cNvPr id="23" name="Straight Arrow Connector 22"/>
+          <p:cNvCxnSpPr/>
+          <p:nvPr/>
+        </p:nvCxnSpPr>
+        <p:spPr>
+          <a:xfrm flipH="1" flipV="1">
+            <a:off x="4876800" y="3810000"/>
+            <a:ext cx="762000" cy="381000"/>
+          </a:xfrm>
+          <a:prstGeom prst="straightConnector1">
+            <a:avLst/>
+          </a:prstGeom>
+          <a:ln w="63500">
+            <a:solidFill>
+              <a:schemeClr val="tx1">
+                <a:lumMod val="50000"/>
+                <a:lumOff val="50000"/>
+              </a:schemeClr>
+            </a:solidFill>
+            <a:tailEnd type="arrow"/>
+          </a:ln>
+        </p:spPr>
+        <p:style>
+          <a:lnRef idx="2">
+            <a:schemeClr val="accent1"/>
+          </a:lnRef>
+          <a:fillRef idx="0">
+            <a:schemeClr val="accent1"/>
+          </a:fillRef>
+          <a:effectRef idx="1">
+            <a:schemeClr val="accent1"/>
+          </a:effectRef>
+          <a:fontRef idx="minor">
+            <a:schemeClr val="tx1"/>
+          </a:fontRef>
+        </p:style>
+      </p:cxnSp>
+      <p:cxnSp>
+        <p:nvCxnSpPr>
+          <p:cNvPr id="29" name="Straight Arrow Connector 28"/>
+          <p:cNvCxnSpPr/>
+          <p:nvPr/>
+        </p:nvCxnSpPr>
+        <p:spPr>
+          <a:xfrm flipV="1">
+            <a:off x="3429000" y="3733800"/>
+            <a:ext cx="609600" cy="488950"/>
+          </a:xfrm>
+          <a:prstGeom prst="straightConnector1">
+            <a:avLst/>
+          </a:prstGeom>
+          <a:ln w="63500">
+            <a:solidFill>
+              <a:schemeClr val="tx1">
+                <a:lumMod val="50000"/>
+                <a:lumOff val="50000"/>
+              </a:schemeClr>
+            </a:solidFill>
+            <a:tailEnd type="arrow"/>
+          </a:ln>
+        </p:spPr>
+        <p:style>
+          <a:lnRef idx="2">
+            <a:schemeClr val="accent1"/>
+          </a:lnRef>
+          <a:fillRef idx="0">
+            <a:schemeClr val="accent1"/>
+          </a:fillRef>
+          <a:effectRef idx="1">
+            <a:schemeClr val="accent1"/>
+          </a:effectRef>
+          <a:fontRef idx="minor">
+            <a:schemeClr val="tx1"/>
+          </a:fontRef>
+        </p:style>
+      </p:cxnSp>
+      <p:cxnSp>
+        <p:nvCxnSpPr>
+          <p:cNvPr id="32" name="Straight Arrow Connector 31"/>
+          <p:cNvCxnSpPr/>
+          <p:nvPr/>
+        </p:nvCxnSpPr>
+        <p:spPr>
+          <a:xfrm flipV="1">
+            <a:off x="3376533" y="3352800"/>
+            <a:ext cx="662067" cy="186383"/>
+          </a:xfrm>
+          <a:prstGeom prst="straightConnector1">
+            <a:avLst/>
+          </a:prstGeom>
+          <a:ln w="63500">
+            <a:solidFill>
+              <a:schemeClr val="tx1">
+                <a:lumMod val="50000"/>
+                <a:lumOff val="50000"/>
+              </a:schemeClr>
+            </a:solidFill>
+            <a:tailEnd type="arrow"/>
+          </a:ln>
+        </p:spPr>
+        <p:style>
+          <a:lnRef idx="2">
+            <a:schemeClr val="accent1"/>
+          </a:lnRef>
+          <a:fillRef idx="0">
+            <a:schemeClr val="accent1"/>
+          </a:fillRef>
+          <a:effectRef idx="1">
+            <a:schemeClr val="accent1"/>
+          </a:effectRef>
+          <a:fontRef idx="minor">
+            <a:schemeClr val="tx1"/>
+          </a:fontRef>
+        </p:style>
+      </p:cxnSp>
+      <p:sp>
+        <p:nvSpPr>
+          <p:cNvPr id="19" name="TextBox 3"/>
+          <p:cNvSpPr txBox="1">
+            <a:spLocks noChangeArrowheads="1"/>
+          </p:cNvSpPr>
+          <p:nvPr/>
+        </p:nvSpPr>
+        <p:spPr bwMode="auto">
+          <a:xfrm>
+            <a:off x="685800" y="5336580"/>
+            <a:ext cx="8382000" cy="959237"/>
+          </a:xfrm>
+          <a:prstGeom prst="rect">
+            <a:avLst/>
+          </a:prstGeom>
+          <a:noFill/>
+          <a:ln>
+            <a:noFill/>
+          </a:ln>
+          <a:extLst>
+            <a:ext uri="{909E8E84-426E-40dd-AFC4-6F175D3DCCD1}">
+              <a14:hiddenFill xmlns:a14="http://schemas.microsoft.com/office/drawing/2010/main" xmlns="">
+                <a:solidFill>
+                  <a:srgbClr val="FFFFFF"/>
+                </a:solidFill>
+              </a14:hiddenFill>
+            </a:ext>
+            <a:ext uri="{91240B29-F687-4f45-9708-019B960494DF}">
+              <a14:hiddenLine xmlns:a14="http://schemas.microsoft.com/office/drawing/2010/main" xmlns="" w="9525">
+                <a:solidFill>
+                  <a:srgbClr val="000000"/>
+                </a:solidFill>
+                <a:miter lim="800000"/>
+                <a:headEnd/>
+                <a:tailEnd/>
+              </a14:hiddenLine>
+            </a:ext>
+          </a:extLst>
+        </p:spPr>
+        <p:txBody>
+          <a:bodyPr wrap="square">
+            <a:spAutoFit/>
+          </a:bodyPr>
+          <a:lstStyle>
+            <a:lvl1pPr marL="24161750" indent="-24161750" eaLnBrk="0" hangingPunct="0">
+              <a:defRPr sz="2400">
+                <a:solidFill>
+                  <a:schemeClr val="tx1"/>
+                </a:solidFill>
+                <a:latin typeface="Arial" charset="0"/>
+                <a:ea typeface="ＭＳ Ｐゴシック" charset="0"/>
+                <a:cs typeface="ＭＳ Ｐゴシック" charset="0"/>
+              </a:defRPr>
+            </a:lvl1pPr>
+            <a:lvl2pPr marL="228600" indent="-228600" eaLnBrk="0" hangingPunct="0">
+              <a:defRPr sz="2400">
+                <a:solidFill>
+                  <a:schemeClr val="tx1"/>
+                </a:solidFill>
+                <a:latin typeface="Arial" charset="0"/>
+                <a:ea typeface="ＭＳ Ｐゴシック" charset="0"/>
+              </a:defRPr>
+            </a:lvl2pPr>
+            <a:lvl3pPr eaLnBrk="0" hangingPunct="0">
+              <a:defRPr sz="2400">
+                <a:solidFill>
+                  <a:schemeClr val="tx1"/>
+                </a:solidFill>
+                <a:latin typeface="Arial" charset="0"/>
+                <a:ea typeface="ＭＳ Ｐゴシック" charset="0"/>
+              </a:defRPr>
+            </a:lvl3pPr>
+            <a:lvl4pPr eaLnBrk="0" hangingPunct="0">
+              <a:defRPr sz="2400">
+                <a:solidFill>
+                  <a:schemeClr val="tx1"/>
+                </a:solidFill>
+                <a:latin typeface="Arial" charset="0"/>
+                <a:ea typeface="ＭＳ Ｐゴシック" charset="0"/>
+              </a:defRPr>
+            </a:lvl4pPr>
+            <a:lvl5pPr eaLnBrk="0" hangingPunct="0">
+              <a:defRPr sz="2400">
+                <a:solidFill>
+                  <a:schemeClr val="tx1"/>
+                </a:solidFill>
+                <a:latin typeface="Arial" charset="0"/>
+                <a:ea typeface="ＭＳ Ｐゴシック" charset="0"/>
+              </a:defRPr>
+            </a:lvl5pPr>
+            <a:lvl6pPr marL="457200" eaLnBrk="0" fontAlgn="base" hangingPunct="0">
+              <a:spcBef>
+                <a:spcPct val="0"/>
+              </a:spcBef>
+              <a:spcAft>
+                <a:spcPct val="0"/>
+              </a:spcAft>
+              <a:defRPr sz="2400">
+                <a:solidFill>
+                  <a:schemeClr val="tx1"/>
+                </a:solidFill>
+                <a:latin typeface="Arial" charset="0"/>
+                <a:ea typeface="ＭＳ Ｐゴシック" charset="0"/>
+              </a:defRPr>
+            </a:lvl6pPr>
+            <a:lvl7pPr marL="914400" eaLnBrk="0" fontAlgn="base" hangingPunct="0">
+              <a:spcBef>
+                <a:spcPct val="0"/>
+              </a:spcBef>
+              <a:spcAft>
+                <a:spcPct val="0"/>
+              </a:spcAft>
+              <a:defRPr sz="2400">
+                <a:solidFill>
+                  <a:schemeClr val="tx1"/>
+                </a:solidFill>
+                <a:latin typeface="Arial" charset="0"/>
+                <a:ea typeface="ＭＳ Ｐゴシック" charset="0"/>
+              </a:defRPr>
+            </a:lvl7pPr>
+            <a:lvl8pPr marL="1371600" eaLnBrk="0" fontAlgn="base" hangingPunct="0">
+              <a:spcBef>
+                <a:spcPct val="0"/>
+              </a:spcBef>
+              <a:spcAft>
+                <a:spcPct val="0"/>
+              </a:spcAft>
+              <a:defRPr sz="2400">
+                <a:solidFill>
+                  <a:schemeClr val="tx1"/>
+                </a:solidFill>
+                <a:latin typeface="Arial" charset="0"/>
+                <a:ea typeface="ＭＳ Ｐゴシック" charset="0"/>
+              </a:defRPr>
+            </a:lvl8pPr>
+            <a:lvl9pPr marL="1828800" eaLnBrk="0" fontAlgn="base" hangingPunct="0">
+              <a:spcBef>
+                <a:spcPct val="0"/>
+              </a:spcBef>
+              <a:spcAft>
+                <a:spcPct val="0"/>
+              </a:spcAft>
+              <a:defRPr sz="2400">
+                <a:solidFill>
+                  <a:schemeClr val="tx1"/>
+                </a:solidFill>
+                <a:latin typeface="Arial" charset="0"/>
+                <a:ea typeface="ＭＳ Ｐゴシック" charset="0"/>
+              </a:defRPr>
+            </a:lvl9pPr>
+          </a:lstStyle>
+          <a:p>
+            <a:pPr marL="342900" lvl="2" indent="-342900" eaLnBrk="1" hangingPunct="1">
+              <a:spcBef>
+                <a:spcPts val="1000"/>
+              </a:spcBef>
+              <a:buFont typeface="Arial"/>
+              <a:buChar char="•"/>
+            </a:pPr>
+            <a:r>
+              <a:rPr lang="en-US" dirty="0">
+                <a:latin typeface="Calibri" panose="020F0502020204030204" pitchFamily="34" charset="0"/>
+                <a:cs typeface="Arial" charset="0"/>
+              </a:rPr>
+              <a:t>View </a:t>
+            </a:r>
+            <a:r>
+              <a:rPr lang="en-US" b="1" dirty="0">
+                <a:latin typeface="Calibri" panose="020F0502020204030204" pitchFamily="34" charset="0"/>
+                <a:cs typeface="Arial" charset="0"/>
+              </a:rPr>
+              <a:t>local</a:t>
+            </a:r>
+            <a:r>
+              <a:rPr lang="en-US" dirty="0">
+                <a:latin typeface="Calibri" panose="020F0502020204030204" pitchFamily="34" charset="0"/>
+                <a:cs typeface="Arial" charset="0"/>
+              </a:rPr>
+              <a:t> files without uploading.</a:t>
+            </a:r>
+          </a:p>
+          <a:p>
+            <a:pPr marL="342900" lvl="2" indent="-342900" eaLnBrk="1" hangingPunct="1">
+              <a:spcBef>
+                <a:spcPts val="1000"/>
+              </a:spcBef>
+              <a:buFont typeface="Arial"/>
+              <a:buChar char="•"/>
+            </a:pPr>
+            <a:r>
+              <a:rPr lang="en-US" dirty="0" smtClean="0">
+                <a:latin typeface="Calibri" panose="020F0502020204030204" pitchFamily="34" charset="0"/>
+                <a:cs typeface="Arial" charset="0"/>
+              </a:rPr>
+              <a:t>View </a:t>
+            </a:r>
+            <a:r>
+              <a:rPr lang="en-US" b="1" dirty="0" smtClean="0">
+                <a:latin typeface="Calibri" panose="020F0502020204030204" pitchFamily="34" charset="0"/>
+                <a:cs typeface="Arial" charset="0"/>
+              </a:rPr>
+              <a:t>remote</a:t>
+            </a:r>
+            <a:r>
+              <a:rPr lang="en-US" dirty="0" smtClean="0">
+                <a:latin typeface="Calibri" panose="020F0502020204030204" pitchFamily="34" charset="0"/>
+                <a:cs typeface="Arial" charset="0"/>
+              </a:rPr>
+              <a:t> files without downloading the whole dataset.</a:t>
+            </a:r>
+            <a:endParaRPr lang="en-US" sz="2800" dirty="0" smtClean="0">
+              <a:latin typeface="Calibri" panose="020F0502020204030204" pitchFamily="34" charset="0"/>
+              <a:cs typeface="Arial" charset="0"/>
+            </a:endParaRPr>
+          </a:p>
+        </p:txBody>
+      </p:sp>
+      <p:pic>
+        <p:nvPicPr>
+          <p:cNvPr id="5" name="Picture 4"/>
+          <p:cNvPicPr>
+            <a:picLocks noChangeAspect="1"/>
+          </p:cNvPicPr>
+          <p:nvPr/>
+        </p:nvPicPr>
+        <p:blipFill>
+          <a:blip r:embed="rId4"/>
+          <a:stretch>
+            <a:fillRect/>
+          </a:stretch>
+        </p:blipFill>
+        <p:spPr>
+          <a:xfrm>
+            <a:off x="1828800" y="914400"/>
+            <a:ext cx="2273300" cy="1884639"/>
+          </a:xfrm>
+          <a:prstGeom prst="rect">
+            <a:avLst/>
+          </a:prstGeom>
+        </p:spPr>
+      </p:pic>
+      <p:cxnSp>
+        <p:nvCxnSpPr>
+          <p:cNvPr id="16" name="Straight Arrow Connector 15"/>
+          <p:cNvCxnSpPr/>
+          <p:nvPr/>
+        </p:nvCxnSpPr>
+        <p:spPr>
+          <a:xfrm>
+            <a:off x="3505200" y="2667000"/>
+            <a:ext cx="457200" cy="348218"/>
+          </a:xfrm>
+          <a:prstGeom prst="straightConnector1">
+            <a:avLst/>
+          </a:prstGeom>
+          <a:ln w="63500">
+            <a:solidFill>
+              <a:schemeClr val="tx1">
+                <a:lumMod val="50000"/>
+                <a:lumOff val="50000"/>
+              </a:schemeClr>
+            </a:solidFill>
+            <a:tailEnd type="arrow"/>
+          </a:ln>
+        </p:spPr>
+        <p:style>
+          <a:lnRef idx="2">
+            <a:schemeClr val="accent1"/>
+          </a:lnRef>
+          <a:fillRef idx="0">
+            <a:schemeClr val="accent1"/>
+          </a:fillRef>
+          <a:effectRef idx="1">
+            <a:schemeClr val="accent1"/>
+          </a:effectRef>
+          <a:fontRef idx="minor">
+            <a:schemeClr val="tx1"/>
+          </a:fontRef>
+        </p:style>
+      </p:cxnSp>
+      <p:sp>
+        <p:nvSpPr>
+          <p:cNvPr id="18" name="Rectangle 17"/>
+          <p:cNvSpPr/>
+          <p:nvPr/>
+        </p:nvSpPr>
+        <p:spPr>
+          <a:xfrm>
+            <a:off x="0" y="0"/>
+            <a:ext cx="9144000" cy="685800"/>
+          </a:xfrm>
+          <a:prstGeom prst="rect">
+            <a:avLst/>
+          </a:prstGeom>
+          <a:noFill/>
+          <a:ln>
+            <a:noFill/>
+          </a:ln>
+        </p:spPr>
+        <p:style>
+          <a:lnRef idx="2">
+            <a:schemeClr val="accent1">
+              <a:shade val="50000"/>
+            </a:schemeClr>
+          </a:lnRef>
+          <a:fillRef idx="1">
+            <a:schemeClr val="accent1"/>
+          </a:fillRef>
+          <a:effectRef idx="0">
+            <a:schemeClr val="accent1"/>
+          </a:effectRef>
+          <a:fontRef idx="minor">
+            <a:schemeClr val="lt1"/>
+          </a:fontRef>
+        </p:style>
+        <p:txBody>
+          <a:bodyPr rtlCol="0" anchor="ctr"/>
+          <a:lstStyle/>
+          <a:p>
+            <a:pPr algn="ctr"/>
+            <a:r>
+              <a:rPr lang="en-US" sz="3200" dirty="0" smtClean="0">
+                <a:solidFill>
+                  <a:schemeClr val="tx1"/>
+                </a:solidFill>
+                <a:latin typeface="Calibri" panose="020F0502020204030204" pitchFamily="34" charset="0"/>
+              </a:rPr>
+              <a:t>IGV Data Sources: How do I load data?</a:t>
+            </a:r>
+            <a:endParaRPr lang="en-US" sz="3200" dirty="0">
+              <a:solidFill>
+                <a:schemeClr val="tx1"/>
+              </a:solidFill>
+              <a:latin typeface="Calibri" panose="020F0502020204030204" pitchFamily="34" charset="0"/>
+            </a:endParaRPr>
+          </a:p>
+        </p:txBody>
+      </p:sp>
+    </p:spTree>
+    <p:extLst>
+      <p:ext uri="{BB962C8B-B14F-4D97-AF65-F5344CB8AC3E}">
+        <p14:creationId xmlns:p14="http://schemas.microsoft.com/office/powerpoint/2010/main" val="1894888543"/>
+      </p:ext>
+    </p:extLst>
+  </p:cSld>
+  <p:clrMapOvr>
+    <a:masterClrMapping/>
+  </p:clrMapOvr>
+  <mc:AlternateContent xmlns:mc="http://schemas.openxmlformats.org/markup-compatibility/2006" xmlns:p14="http://schemas.microsoft.com/office/powerpoint/2010/main">
+    <mc:Choice Requires="p14">
+      <p:transition spd="slow" p14:dur="2000"/>
+    </mc:Choice>
+    <mc:Fallback xmlns="">
+      <p:transition xmlns:p14="http://schemas.microsoft.com/office/powerpoint/2010/main" spd="slow"/>
+    </mc:Fallback>
+  </mc:AlternateContent>
+  <p:timing>
+    <p:tnLst>
+      <p:par>
+        <p:cTn id="1" dur="indefinite" restart="never" nodeType="tmRoot"/>
+      </p:par>
+    </p:tnLst>
+  </p:timing>
+</p:sld>
+</file>
+
+<file path=ppt/slides/slide30.xml><?xml version="1.0" encoding="utf-8"?>
 <p:sld xmlns:a="http://schemas.openxmlformats.org/drawingml/2006/main" xmlns:r="http://schemas.openxmlformats.org/officeDocument/2006/relationships" xmlns:p="http://schemas.openxmlformats.org/presentationml/2006/main" showMasterSp="0">
   <p:cSld>
     <p:spTree>
@@ -29797,7 +30955,7 @@
         <p:spPr>
           <a:xfrm>
             <a:off x="152400" y="868326"/>
-            <a:ext cx="8839200" cy="5262979"/>
+            <a:ext cx="8839200" cy="6001643"/>
           </a:xfrm>
           <a:prstGeom prst="rect">
             <a:avLst/>
@@ -29915,13 +31073,6 @@
               </a:rPr>
               <a:t>dex</a:t>
             </a:r>
-            <a:endParaRPr lang="en-US" sz="2400" i="1" dirty="0">
-              <a:latin typeface="Calibri" panose="020F0502020204030204" pitchFamily="34" charset="0"/>
-              <a:sym typeface="Wingdings"/>
-            </a:endParaRPr>
-          </a:p>
-          <a:p>
-            <a:pPr marL="0" lvl="1"/>
             <a:endParaRPr lang="en-US" sz="2400" dirty="0">
               <a:latin typeface="Calibri" panose="020F0502020204030204" pitchFamily="34" charset="0"/>
               <a:sym typeface="Wingdings"/>
@@ -29942,7 +31093,88 @@
               <a:buAutoNum type="arabicPeriod"/>
             </a:pPr>
             <a:r>
+              <a:rPr lang="en-US" sz="2400" dirty="0" smtClean="0">
+                <a:latin typeface="Calibri" panose="020F0502020204030204" pitchFamily="34" charset="0"/>
+                <a:sym typeface="Wingdings"/>
+              </a:rPr>
+              <a:t>Open a browser window to </a:t>
+            </a:r>
+            <a:r>
+              <a:rPr lang="en-US" sz="2400" b="1" dirty="0">
+                <a:latin typeface="Calibri" panose="020F0502020204030204" pitchFamily="34" charset="0"/>
+                <a:sym typeface="Wingdings"/>
+              </a:rPr>
+              <a:t>genepattern.datasets.org/?prefix=data/</a:t>
+            </a:r>
+            <a:r>
+              <a:rPr lang="en-US" sz="2400" b="1" dirty="0" err="1">
+                <a:latin typeface="Calibri" panose="020F0502020204030204" pitchFamily="34" charset="0"/>
+                <a:sym typeface="Wingdings"/>
+              </a:rPr>
+              <a:t>HASM_Asthma_RNA-seq_workshop_files</a:t>
+            </a:r>
+            <a:r>
+              <a:rPr lang="en-US" sz="2400" b="1" dirty="0">
+                <a:latin typeface="Calibri" panose="020F0502020204030204" pitchFamily="34" charset="0"/>
+                <a:sym typeface="Wingdings"/>
+              </a:rPr>
+              <a:t>/</a:t>
+            </a:r>
+            <a:r>
+              <a:rPr lang="en-US" sz="2400" b="1" dirty="0" err="1">
+                <a:latin typeface="Calibri" panose="020F0502020204030204" pitchFamily="34" charset="0"/>
+                <a:sym typeface="Wingdings"/>
+              </a:rPr>
+              <a:t>SortSam_Output</a:t>
+            </a:r>
+            <a:r>
+              <a:rPr lang="en-US" sz="2400" b="1" dirty="0" smtClean="0">
+                <a:latin typeface="Calibri" panose="020F0502020204030204" pitchFamily="34" charset="0"/>
+                <a:sym typeface="Wingdings"/>
+              </a:rPr>
+              <a:t>/</a:t>
+            </a:r>
+            <a:endParaRPr lang="en-US" sz="2400" dirty="0" smtClean="0">
+              <a:latin typeface="Calibri" panose="020F0502020204030204" pitchFamily="34" charset="0"/>
+              <a:sym typeface="Wingdings"/>
+            </a:endParaRPr>
+          </a:p>
+          <a:p>
+            <a:pPr marL="574675" lvl="1" indent="-457200">
+              <a:buAutoNum type="arabicPeriod"/>
+            </a:pPr>
+            <a:r>
+              <a:rPr lang="en-US" sz="2400" dirty="0" smtClean="0">
+                <a:latin typeface="Calibri" panose="020F0502020204030204" pitchFamily="34" charset="0"/>
+                <a:sym typeface="Wingdings"/>
+              </a:rPr>
+              <a:t>Copy the URL for </a:t>
+            </a:r>
+            <a:r>
+              <a:rPr lang="en-US" sz="2400" b="1" dirty="0">
+                <a:latin typeface="Calibri" panose="020F0502020204030204" pitchFamily="34" charset="0"/>
+                <a:sym typeface="Wingdings"/>
+              </a:rPr>
+              <a:t>SRR1039508</a:t>
+            </a:r>
+            <a:r>
               <a:rPr lang="en-US" sz="2400" dirty="0">
+                <a:latin typeface="Calibri" panose="020F0502020204030204" pitchFamily="34" charset="0"/>
+                <a:sym typeface="Wingdings"/>
+              </a:rPr>
+              <a:t>.accepted_hits.sorted.bam</a:t>
+            </a:r>
+            <a:endParaRPr lang="en-US" sz="2400" dirty="0" smtClean="0">
+              <a:latin typeface="Calibri" panose="020F0502020204030204" pitchFamily="34" charset="0"/>
+              <a:sym typeface="Wingdings"/>
+            </a:endParaRPr>
+          </a:p>
+          <a:p>
+            <a:pPr marL="574675" lvl="1" indent="-457200">
+              <a:buAutoNum type="arabicPeriod"/>
+            </a:pPr>
+            <a:r>
+              <a:rPr lang="en-US" sz="2400" dirty="0" smtClean="0">
                 <a:latin typeface="Calibri" panose="020F0502020204030204" pitchFamily="34" charset="0"/>
                 <a:sym typeface="Wingdings"/>
               </a:rPr>
@@ -29970,12 +31202,30 @@
               <a:t>navigate to: </a:t>
             </a:r>
             <a:r>
+              <a:rPr lang="en-US" sz="2400" b="1" dirty="0" smtClean="0">
+                <a:latin typeface="Calibri" panose="020F0502020204030204" pitchFamily="34" charset="0"/>
+                <a:sym typeface="Wingdings"/>
+              </a:rPr>
+              <a:t>File/Load </a:t>
+            </a:r>
+            <a:r>
               <a:rPr lang="en-US" sz="2400" b="1" dirty="0">
                 <a:latin typeface="Calibri" panose="020F0502020204030204" pitchFamily="34" charset="0"/>
                 <a:sym typeface="Wingdings"/>
               </a:rPr>
-              <a:t>GenomeSpace/Load from GenomeSpace…</a:t>
-            </a:r>
+              <a:t>from </a:t>
+            </a:r>
+            <a:r>
+              <a:rPr lang="en-US" sz="2400" b="1" dirty="0" smtClean="0">
+                <a:latin typeface="Calibri" panose="020F0502020204030204" pitchFamily="34" charset="0"/>
+                <a:sym typeface="Wingdings"/>
+              </a:rPr>
+              <a:t>URL</a:t>
+            </a:r>
+            <a:endParaRPr lang="en-US" sz="2400" b="1" dirty="0">
+              <a:latin typeface="Calibri" panose="020F0502020204030204" pitchFamily="34" charset="0"/>
+              <a:sym typeface="Wingdings"/>
+            </a:endParaRPr>
           </a:p>
           <a:p>
             <a:pPr marL="574675" lvl="1" indent="-457200">
@@ -29986,13 +31236,7 @@
                 <a:latin typeface="Calibri" panose="020F0502020204030204" pitchFamily="34" charset="0"/>
                 <a:sym typeface="Wingdings"/>
               </a:rPr>
-              <a:t>Navigate to the following directory: </a:t>
-            </a:r>
-            <a:r>
-              <a:rPr lang="en-US" sz="2400" b="1" dirty="0" smtClean="0">
-                <a:latin typeface="Calibri" panose="020F0502020204030204" pitchFamily="34" charset="0"/>
-              </a:rPr>
-              <a:t>Public/2017CEGS</a:t>
+              <a:t>Paste in the URL you just copied.</a:t>
             </a:r>
             <a:endParaRPr lang="en-US" sz="2400" b="1" dirty="0">
               <a:latin typeface="Calibri" panose="020F0502020204030204" pitchFamily="34" charset="0"/>
@@ -30003,30 +31247,7 @@
               <a:buAutoNum type="arabicPeriod"/>
             </a:pPr>
             <a:r>
-              <a:rPr lang="en-US" sz="2400" dirty="0">
-                <a:latin typeface="Calibri" panose="020F0502020204030204" pitchFamily="34" charset="0"/>
-              </a:rPr>
-              <a:t>Choose </a:t>
-            </a:r>
-            <a:r>
               <a:rPr lang="en-US" sz="2400" dirty="0" smtClean="0">
-                <a:latin typeface="Calibri" panose="020F0502020204030204" pitchFamily="34" charset="0"/>
-              </a:rPr>
-              <a:t>a file, </a:t>
-            </a:r>
-            <a:r>
-              <a:rPr lang="en-US" sz="2400" dirty="0">
-                <a:latin typeface="Calibri" panose="020F0502020204030204" pitchFamily="34" charset="0"/>
-              </a:rPr>
-              <a:t>e.g. SRR1039508.accepted_hits.sorted.bam</a:t>
-            </a:r>
-          </a:p>
-          <a:p>
-            <a:pPr marL="574675" lvl="1" indent="-457200">
-              <a:buAutoNum type="arabicPeriod"/>
-            </a:pPr>
-            <a:r>
-              <a:rPr lang="en-US" sz="2400" dirty="0">
                 <a:latin typeface="Calibri" panose="020F0502020204030204" pitchFamily="34" charset="0"/>
               </a:rPr>
               <a:t>Click </a:t>
@@ -30258,785 +31479,7 @@
 </p:sld>
 </file>
 
-<file path=ppt/slides/slide3.xml><?xml version="1.0" encoding="utf-8"?>
-<p:sld xmlns:a="http://schemas.openxmlformats.org/drawingml/2006/main" xmlns:r="http://schemas.openxmlformats.org/officeDocument/2006/relationships" xmlns:p="http://schemas.openxmlformats.org/presentationml/2006/main" showMasterSp="0">
-  <p:cSld>
-    <p:spTree>
-      <p:nvGrpSpPr>
-        <p:cNvPr id="1" name=""/>
-        <p:cNvGrpSpPr/>
-        <p:nvPr/>
-      </p:nvGrpSpPr>
-      <p:grpSpPr>
-        <a:xfrm>
-          <a:off x="0" y="0"/>
-          <a:ext cx="0" cy="0"/>
-          <a:chOff x="0" y="0"/>
-          <a:chExt cx="0" cy="0"/>
-        </a:xfrm>
-      </p:grpSpPr>
-      <p:sp>
-        <p:nvSpPr>
-          <p:cNvPr id="7" name="TextBox 6"/>
-          <p:cNvSpPr txBox="1"/>
-          <p:nvPr/>
-        </p:nvSpPr>
-        <p:spPr>
-          <a:xfrm>
-            <a:off x="5867400" y="2362200"/>
-            <a:ext cx="2125903" cy="769441"/>
-          </a:xfrm>
-          <a:prstGeom prst="rect">
-            <a:avLst/>
-          </a:prstGeom>
-          <a:solidFill>
-            <a:srgbClr val="FFFFFF"/>
-          </a:solidFill>
-          <a:ln w="25400">
-            <a:solidFill>
-              <a:schemeClr val="bg1">
-                <a:lumMod val="85000"/>
-              </a:schemeClr>
-            </a:solidFill>
-          </a:ln>
-          <a:effectLst>
-            <a:outerShdw blurRad="50800" dist="38100" dir="2700000" algn="tl" rotWithShape="0">
-              <a:prstClr val="black">
-                <a:alpha val="40000"/>
-              </a:prstClr>
-            </a:outerShdw>
-          </a:effectLst>
-        </p:spPr>
-        <p:txBody>
-          <a:bodyPr wrap="none" rtlCol="0">
-            <a:spAutoFit/>
-          </a:bodyPr>
-          <a:lstStyle/>
-          <a:p>
-            <a:r>
-              <a:rPr lang="en-US" sz="2400" dirty="0" smtClean="0">
-                <a:latin typeface="Calibri" panose="020F0502020204030204" pitchFamily="34" charset="0"/>
-              </a:rPr>
-              <a:t>Local files </a:t>
-            </a:r>
-          </a:p>
-          <a:p>
-            <a:r>
-              <a:rPr lang="en-US" sz="2000" dirty="0" smtClean="0">
-                <a:latin typeface="Calibri" panose="020F0502020204030204" pitchFamily="34" charset="0"/>
-              </a:rPr>
-              <a:t>(computer or LAN)</a:t>
-            </a:r>
-          </a:p>
-        </p:txBody>
-      </p:sp>
-      <p:sp>
-        <p:nvSpPr>
-          <p:cNvPr id="8" name="TextBox 7"/>
-          <p:cNvSpPr txBox="1"/>
-          <p:nvPr/>
-        </p:nvSpPr>
-        <p:spPr>
-          <a:xfrm>
-            <a:off x="1148420" y="3027639"/>
-            <a:ext cx="1977587" cy="830997"/>
-          </a:xfrm>
-          <a:prstGeom prst="rect">
-            <a:avLst/>
-          </a:prstGeom>
-          <a:solidFill>
-            <a:schemeClr val="bg1"/>
-          </a:solidFill>
-          <a:ln w="25400">
-            <a:solidFill>
-              <a:schemeClr val="bg1">
-                <a:lumMod val="85000"/>
-              </a:schemeClr>
-            </a:solidFill>
-          </a:ln>
-          <a:effectLst>
-            <a:outerShdw blurRad="50800" dist="38100" dir="2700000" algn="tl" rotWithShape="0">
-              <a:prstClr val="black">
-                <a:alpha val="40000"/>
-              </a:prstClr>
-            </a:outerShdw>
-          </a:effectLst>
-        </p:spPr>
-        <p:txBody>
-          <a:bodyPr wrap="square" rtlCol="0">
-            <a:spAutoFit/>
-          </a:bodyPr>
-          <a:lstStyle/>
-          <a:p>
-            <a:r>
-              <a:rPr lang="en-US" sz="2400" dirty="0" smtClean="0">
-                <a:latin typeface="Calibri" panose="020F0502020204030204" pitchFamily="34" charset="0"/>
-              </a:rPr>
-              <a:t>HTTP server (GenePattern)</a:t>
-            </a:r>
-            <a:endParaRPr lang="en-US" sz="2400" dirty="0">
-              <a:latin typeface="Calibri" panose="020F0502020204030204" pitchFamily="34" charset="0"/>
-            </a:endParaRPr>
-          </a:p>
-        </p:txBody>
-      </p:sp>
-      <p:sp>
-        <p:nvSpPr>
-          <p:cNvPr id="9" name="TextBox 8"/>
-          <p:cNvSpPr txBox="1"/>
-          <p:nvPr/>
-        </p:nvSpPr>
-        <p:spPr>
-          <a:xfrm>
-            <a:off x="1600200" y="4070350"/>
-            <a:ext cx="1486304" cy="461665"/>
-          </a:xfrm>
-          <a:prstGeom prst="rect">
-            <a:avLst/>
-          </a:prstGeom>
-          <a:solidFill>
-            <a:srgbClr val="FFFFFF"/>
-          </a:solidFill>
-          <a:ln w="25400">
-            <a:solidFill>
-              <a:schemeClr val="bg1">
-                <a:lumMod val="85000"/>
-              </a:schemeClr>
-            </a:solidFill>
-          </a:ln>
-          <a:effectLst>
-            <a:outerShdw blurRad="50800" dist="38100" dir="2700000" algn="tl" rotWithShape="0">
-              <a:prstClr val="black">
-                <a:alpha val="40000"/>
-              </a:prstClr>
-            </a:outerShdw>
-          </a:effectLst>
-        </p:spPr>
-        <p:txBody>
-          <a:bodyPr wrap="none" rtlCol="0">
-            <a:spAutoFit/>
-          </a:bodyPr>
-          <a:lstStyle/>
-          <a:p>
-            <a:r>
-              <a:rPr lang="en-US" sz="2400" dirty="0" smtClean="0">
-                <a:latin typeface="Calibri" panose="020F0502020204030204" pitchFamily="34" charset="0"/>
-              </a:rPr>
-              <a:t>FTP server</a:t>
-            </a:r>
-            <a:endParaRPr lang="en-US" sz="2400" dirty="0">
-              <a:latin typeface="Calibri" panose="020F0502020204030204" pitchFamily="34" charset="0"/>
-            </a:endParaRPr>
-          </a:p>
-        </p:txBody>
-      </p:sp>
-      <p:sp>
-        <p:nvSpPr>
-          <p:cNvPr id="10" name="TextBox 9"/>
-          <p:cNvSpPr txBox="1"/>
-          <p:nvPr/>
-        </p:nvSpPr>
-        <p:spPr>
-          <a:xfrm>
-            <a:off x="5715000" y="4038600"/>
-            <a:ext cx="1989647" cy="461665"/>
-          </a:xfrm>
-          <a:prstGeom prst="rect">
-            <a:avLst/>
-          </a:prstGeom>
-          <a:solidFill>
-            <a:srgbClr val="FFFFFF"/>
-          </a:solidFill>
-          <a:ln w="25400">
-            <a:solidFill>
-              <a:schemeClr val="bg1">
-                <a:lumMod val="85000"/>
-              </a:schemeClr>
-            </a:solidFill>
-          </a:ln>
-          <a:effectLst>
-            <a:outerShdw blurRad="50800" dist="38100" dir="2700000" algn="tl" rotWithShape="0">
-              <a:prstClr val="black">
-                <a:alpha val="40000"/>
-              </a:prstClr>
-            </a:outerShdw>
-          </a:effectLst>
-        </p:spPr>
-        <p:txBody>
-          <a:bodyPr wrap="none" rtlCol="0">
-            <a:spAutoFit/>
-          </a:bodyPr>
-          <a:lstStyle/>
-          <a:p>
-            <a:r>
-              <a:rPr lang="en-US" sz="2400" dirty="0" err="1" smtClean="0">
-                <a:latin typeface="Calibri" panose="020F0502020204030204" pitchFamily="34" charset="0"/>
-              </a:rPr>
-              <a:t>GenomeSpace</a:t>
-            </a:r>
-            <a:endParaRPr lang="en-US" sz="2400" dirty="0">
-              <a:latin typeface="Calibri" panose="020F0502020204030204" pitchFamily="34" charset="0"/>
-            </a:endParaRPr>
-          </a:p>
-        </p:txBody>
-      </p:sp>
-      <p:pic>
-        <p:nvPicPr>
-          <p:cNvPr id="2" name="Picture 1" descr="Screen Shot 2013-04-10 at 11.51.58 PM.png"/>
-          <p:cNvPicPr>
-            <a:picLocks noChangeAspect="1"/>
-          </p:cNvPicPr>
-          <p:nvPr/>
-        </p:nvPicPr>
-        <p:blipFill>
-          <a:blip r:embed="rId3">
-            <a:extLst>
-              <a:ext uri="{28A0092B-C50C-407E-A947-70E740481C1C}">
-                <a14:useLocalDpi xmlns:a14="http://schemas.microsoft.com/office/drawing/2010/main" val="0"/>
-              </a:ext>
-            </a:extLst>
-          </a:blip>
-          <a:stretch>
-            <a:fillRect/>
-          </a:stretch>
-        </p:blipFill>
-        <p:spPr>
-          <a:xfrm>
-            <a:off x="4191000" y="2933700"/>
-            <a:ext cx="762000" cy="723900"/>
-          </a:xfrm>
-          <a:prstGeom prst="rect">
-            <a:avLst/>
-          </a:prstGeom>
-          <a:ln w="12700">
-            <a:noFill/>
-          </a:ln>
-        </p:spPr>
-      </p:pic>
-      <p:cxnSp>
-        <p:nvCxnSpPr>
-          <p:cNvPr id="17" name="Straight Arrow Connector 16"/>
-          <p:cNvCxnSpPr/>
-          <p:nvPr/>
-        </p:nvCxnSpPr>
-        <p:spPr>
-          <a:xfrm flipH="1">
-            <a:off x="5105400" y="2667000"/>
-            <a:ext cx="685800" cy="304800"/>
-          </a:xfrm>
-          <a:prstGeom prst="straightConnector1">
-            <a:avLst/>
-          </a:prstGeom>
-          <a:ln w="63500">
-            <a:solidFill>
-              <a:schemeClr val="tx1">
-                <a:lumMod val="50000"/>
-                <a:lumOff val="50000"/>
-              </a:schemeClr>
-            </a:solidFill>
-            <a:tailEnd type="arrow"/>
-          </a:ln>
-        </p:spPr>
-        <p:style>
-          <a:lnRef idx="2">
-            <a:schemeClr val="accent1"/>
-          </a:lnRef>
-          <a:fillRef idx="0">
-            <a:schemeClr val="accent1"/>
-          </a:fillRef>
-          <a:effectRef idx="1">
-            <a:schemeClr val="accent1"/>
-          </a:effectRef>
-          <a:fontRef idx="minor">
-            <a:schemeClr val="tx1"/>
-          </a:fontRef>
-        </p:style>
-      </p:cxnSp>
-      <p:cxnSp>
-        <p:nvCxnSpPr>
-          <p:cNvPr id="23" name="Straight Arrow Connector 22"/>
-          <p:cNvCxnSpPr/>
-          <p:nvPr/>
-        </p:nvCxnSpPr>
-        <p:spPr>
-          <a:xfrm flipH="1" flipV="1">
-            <a:off x="4876800" y="3810000"/>
-            <a:ext cx="762000" cy="381000"/>
-          </a:xfrm>
-          <a:prstGeom prst="straightConnector1">
-            <a:avLst/>
-          </a:prstGeom>
-          <a:ln w="63500">
-            <a:solidFill>
-              <a:schemeClr val="tx1">
-                <a:lumMod val="50000"/>
-                <a:lumOff val="50000"/>
-              </a:schemeClr>
-            </a:solidFill>
-            <a:tailEnd type="arrow"/>
-          </a:ln>
-        </p:spPr>
-        <p:style>
-          <a:lnRef idx="2">
-            <a:schemeClr val="accent1"/>
-          </a:lnRef>
-          <a:fillRef idx="0">
-            <a:schemeClr val="accent1"/>
-          </a:fillRef>
-          <a:effectRef idx="1">
-            <a:schemeClr val="accent1"/>
-          </a:effectRef>
-          <a:fontRef idx="minor">
-            <a:schemeClr val="tx1"/>
-          </a:fontRef>
-        </p:style>
-      </p:cxnSp>
-      <p:cxnSp>
-        <p:nvCxnSpPr>
-          <p:cNvPr id="29" name="Straight Arrow Connector 28"/>
-          <p:cNvCxnSpPr/>
-          <p:nvPr/>
-        </p:nvCxnSpPr>
-        <p:spPr>
-          <a:xfrm flipV="1">
-            <a:off x="3429000" y="3733800"/>
-            <a:ext cx="609600" cy="488950"/>
-          </a:xfrm>
-          <a:prstGeom prst="straightConnector1">
-            <a:avLst/>
-          </a:prstGeom>
-          <a:ln w="63500">
-            <a:solidFill>
-              <a:schemeClr val="tx1">
-                <a:lumMod val="50000"/>
-                <a:lumOff val="50000"/>
-              </a:schemeClr>
-            </a:solidFill>
-            <a:tailEnd type="arrow"/>
-          </a:ln>
-        </p:spPr>
-        <p:style>
-          <a:lnRef idx="2">
-            <a:schemeClr val="accent1"/>
-          </a:lnRef>
-          <a:fillRef idx="0">
-            <a:schemeClr val="accent1"/>
-          </a:fillRef>
-          <a:effectRef idx="1">
-            <a:schemeClr val="accent1"/>
-          </a:effectRef>
-          <a:fontRef idx="minor">
-            <a:schemeClr val="tx1"/>
-          </a:fontRef>
-        </p:style>
-      </p:cxnSp>
-      <p:cxnSp>
-        <p:nvCxnSpPr>
-          <p:cNvPr id="32" name="Straight Arrow Connector 31"/>
-          <p:cNvCxnSpPr/>
-          <p:nvPr/>
-        </p:nvCxnSpPr>
-        <p:spPr>
-          <a:xfrm flipV="1">
-            <a:off x="3376533" y="3352800"/>
-            <a:ext cx="662067" cy="186383"/>
-          </a:xfrm>
-          <a:prstGeom prst="straightConnector1">
-            <a:avLst/>
-          </a:prstGeom>
-          <a:ln w="63500">
-            <a:solidFill>
-              <a:schemeClr val="tx1">
-                <a:lumMod val="50000"/>
-                <a:lumOff val="50000"/>
-              </a:schemeClr>
-            </a:solidFill>
-            <a:tailEnd type="arrow"/>
-          </a:ln>
-        </p:spPr>
-        <p:style>
-          <a:lnRef idx="2">
-            <a:schemeClr val="accent1"/>
-          </a:lnRef>
-          <a:fillRef idx="0">
-            <a:schemeClr val="accent1"/>
-          </a:fillRef>
-          <a:effectRef idx="1">
-            <a:schemeClr val="accent1"/>
-          </a:effectRef>
-          <a:fontRef idx="minor">
-            <a:schemeClr val="tx1"/>
-          </a:fontRef>
-        </p:style>
-      </p:cxnSp>
-      <p:sp>
-        <p:nvSpPr>
-          <p:cNvPr id="19" name="TextBox 3"/>
-          <p:cNvSpPr txBox="1">
-            <a:spLocks noChangeArrowheads="1"/>
-          </p:cNvSpPr>
-          <p:nvPr/>
-        </p:nvSpPr>
-        <p:spPr bwMode="auto">
-          <a:xfrm>
-            <a:off x="685800" y="5336580"/>
-            <a:ext cx="8382000" cy="959237"/>
-          </a:xfrm>
-          <a:prstGeom prst="rect">
-            <a:avLst/>
-          </a:prstGeom>
-          <a:noFill/>
-          <a:ln>
-            <a:noFill/>
-          </a:ln>
-          <a:extLst>
-            <a:ext uri="{909E8E84-426E-40dd-AFC4-6F175D3DCCD1}">
-              <a14:hiddenFill xmlns="" xmlns:a14="http://schemas.microsoft.com/office/drawing/2010/main">
-                <a:solidFill>
-                  <a:srgbClr val="FFFFFF"/>
-                </a:solidFill>
-              </a14:hiddenFill>
-            </a:ext>
-            <a:ext uri="{91240B29-F687-4f45-9708-019B960494DF}">
-              <a14:hiddenLine xmlns="" xmlns:a14="http://schemas.microsoft.com/office/drawing/2010/main" w="9525">
-                <a:solidFill>
-                  <a:srgbClr val="000000"/>
-                </a:solidFill>
-                <a:miter lim="800000"/>
-                <a:headEnd/>
-                <a:tailEnd/>
-              </a14:hiddenLine>
-            </a:ext>
-          </a:extLst>
-        </p:spPr>
-        <p:txBody>
-          <a:bodyPr wrap="square">
-            <a:spAutoFit/>
-          </a:bodyPr>
-          <a:lstStyle>
-            <a:lvl1pPr marL="24161750" indent="-24161750" eaLnBrk="0" hangingPunct="0">
-              <a:defRPr sz="2400">
-                <a:solidFill>
-                  <a:schemeClr val="tx1"/>
-                </a:solidFill>
-                <a:latin typeface="Arial" charset="0"/>
-                <a:ea typeface="ＭＳ Ｐゴシック" charset="0"/>
-                <a:cs typeface="ＭＳ Ｐゴシック" charset="0"/>
-              </a:defRPr>
-            </a:lvl1pPr>
-            <a:lvl2pPr marL="228600" indent="-228600" eaLnBrk="0" hangingPunct="0">
-              <a:defRPr sz="2400">
-                <a:solidFill>
-                  <a:schemeClr val="tx1"/>
-                </a:solidFill>
-                <a:latin typeface="Arial" charset="0"/>
-                <a:ea typeface="ＭＳ Ｐゴシック" charset="0"/>
-              </a:defRPr>
-            </a:lvl2pPr>
-            <a:lvl3pPr eaLnBrk="0" hangingPunct="0">
-              <a:defRPr sz="2400">
-                <a:solidFill>
-                  <a:schemeClr val="tx1"/>
-                </a:solidFill>
-                <a:latin typeface="Arial" charset="0"/>
-                <a:ea typeface="ＭＳ Ｐゴシック" charset="0"/>
-              </a:defRPr>
-            </a:lvl3pPr>
-            <a:lvl4pPr eaLnBrk="0" hangingPunct="0">
-              <a:defRPr sz="2400">
-                <a:solidFill>
-                  <a:schemeClr val="tx1"/>
-                </a:solidFill>
-                <a:latin typeface="Arial" charset="0"/>
-                <a:ea typeface="ＭＳ Ｐゴシック" charset="0"/>
-              </a:defRPr>
-            </a:lvl4pPr>
-            <a:lvl5pPr eaLnBrk="0" hangingPunct="0">
-              <a:defRPr sz="2400">
-                <a:solidFill>
-                  <a:schemeClr val="tx1"/>
-                </a:solidFill>
-                <a:latin typeface="Arial" charset="0"/>
-                <a:ea typeface="ＭＳ Ｐゴシック" charset="0"/>
-              </a:defRPr>
-            </a:lvl5pPr>
-            <a:lvl6pPr marL="457200" eaLnBrk="0" fontAlgn="base" hangingPunct="0">
-              <a:spcBef>
-                <a:spcPct val="0"/>
-              </a:spcBef>
-              <a:spcAft>
-                <a:spcPct val="0"/>
-              </a:spcAft>
-              <a:defRPr sz="2400">
-                <a:solidFill>
-                  <a:schemeClr val="tx1"/>
-                </a:solidFill>
-                <a:latin typeface="Arial" charset="0"/>
-                <a:ea typeface="ＭＳ Ｐゴシック" charset="0"/>
-              </a:defRPr>
-            </a:lvl6pPr>
-            <a:lvl7pPr marL="914400" eaLnBrk="0" fontAlgn="base" hangingPunct="0">
-              <a:spcBef>
-                <a:spcPct val="0"/>
-              </a:spcBef>
-              <a:spcAft>
-                <a:spcPct val="0"/>
-              </a:spcAft>
-              <a:defRPr sz="2400">
-                <a:solidFill>
-                  <a:schemeClr val="tx1"/>
-                </a:solidFill>
-                <a:latin typeface="Arial" charset="0"/>
-                <a:ea typeface="ＭＳ Ｐゴシック" charset="0"/>
-              </a:defRPr>
-            </a:lvl7pPr>
-            <a:lvl8pPr marL="1371600" eaLnBrk="0" fontAlgn="base" hangingPunct="0">
-              <a:spcBef>
-                <a:spcPct val="0"/>
-              </a:spcBef>
-              <a:spcAft>
-                <a:spcPct val="0"/>
-              </a:spcAft>
-              <a:defRPr sz="2400">
-                <a:solidFill>
-                  <a:schemeClr val="tx1"/>
-                </a:solidFill>
-                <a:latin typeface="Arial" charset="0"/>
-                <a:ea typeface="ＭＳ Ｐゴシック" charset="0"/>
-              </a:defRPr>
-            </a:lvl8pPr>
-            <a:lvl9pPr marL="1828800" eaLnBrk="0" fontAlgn="base" hangingPunct="0">
-              <a:spcBef>
-                <a:spcPct val="0"/>
-              </a:spcBef>
-              <a:spcAft>
-                <a:spcPct val="0"/>
-              </a:spcAft>
-              <a:defRPr sz="2400">
-                <a:solidFill>
-                  <a:schemeClr val="tx1"/>
-                </a:solidFill>
-                <a:latin typeface="Arial" charset="0"/>
-                <a:ea typeface="ＭＳ Ｐゴシック" charset="0"/>
-              </a:defRPr>
-            </a:lvl9pPr>
-          </a:lstStyle>
-          <a:p>
-            <a:pPr marL="342900" lvl="2" indent="-342900" eaLnBrk="1" hangingPunct="1">
-              <a:spcBef>
-                <a:spcPts val="1000"/>
-              </a:spcBef>
-              <a:buFont typeface="Arial"/>
-              <a:buChar char="•"/>
-            </a:pPr>
-            <a:r>
-              <a:rPr lang="en-US" dirty="0">
-                <a:latin typeface="Calibri" panose="020F0502020204030204" pitchFamily="34" charset="0"/>
-                <a:cs typeface="Arial" charset="0"/>
-              </a:rPr>
-              <a:t>View </a:t>
-            </a:r>
-            <a:r>
-              <a:rPr lang="en-US" b="1" dirty="0">
-                <a:latin typeface="Calibri" panose="020F0502020204030204" pitchFamily="34" charset="0"/>
-                <a:cs typeface="Arial" charset="0"/>
-              </a:rPr>
-              <a:t>local</a:t>
-            </a:r>
-            <a:r>
-              <a:rPr lang="en-US" dirty="0">
-                <a:latin typeface="Calibri" panose="020F0502020204030204" pitchFamily="34" charset="0"/>
-                <a:cs typeface="Arial" charset="0"/>
-              </a:rPr>
-              <a:t> files without uploading.</a:t>
-            </a:r>
-          </a:p>
-          <a:p>
-            <a:pPr marL="342900" lvl="2" indent="-342900" eaLnBrk="1" hangingPunct="1">
-              <a:spcBef>
-                <a:spcPts val="1000"/>
-              </a:spcBef>
-              <a:buFont typeface="Arial"/>
-              <a:buChar char="•"/>
-            </a:pPr>
-            <a:r>
-              <a:rPr lang="en-US" dirty="0" smtClean="0">
-                <a:latin typeface="Calibri" panose="020F0502020204030204" pitchFamily="34" charset="0"/>
-                <a:cs typeface="Arial" charset="0"/>
-              </a:rPr>
-              <a:t>View </a:t>
-            </a:r>
-            <a:r>
-              <a:rPr lang="en-US" b="1" dirty="0" smtClean="0">
-                <a:latin typeface="Calibri" panose="020F0502020204030204" pitchFamily="34" charset="0"/>
-                <a:cs typeface="Arial" charset="0"/>
-              </a:rPr>
-              <a:t>remote</a:t>
-            </a:r>
-            <a:r>
-              <a:rPr lang="en-US" dirty="0" smtClean="0">
-                <a:latin typeface="Calibri" panose="020F0502020204030204" pitchFamily="34" charset="0"/>
-                <a:cs typeface="Arial" charset="0"/>
-              </a:rPr>
-              <a:t> files without downloading the whole dataset.</a:t>
-            </a:r>
-            <a:endParaRPr lang="en-US" sz="2800" dirty="0" smtClean="0">
-              <a:latin typeface="Calibri" panose="020F0502020204030204" pitchFamily="34" charset="0"/>
-              <a:cs typeface="Arial" charset="0"/>
-            </a:endParaRPr>
-          </a:p>
-        </p:txBody>
-      </p:sp>
-      <p:pic>
-        <p:nvPicPr>
-          <p:cNvPr id="5" name="Picture 4"/>
-          <p:cNvPicPr>
-            <a:picLocks noChangeAspect="1"/>
-          </p:cNvPicPr>
-          <p:nvPr/>
-        </p:nvPicPr>
-        <p:blipFill>
-          <a:blip r:embed="rId4"/>
-          <a:stretch>
-            <a:fillRect/>
-          </a:stretch>
-        </p:blipFill>
-        <p:spPr>
-          <a:xfrm>
-            <a:off x="1828800" y="914400"/>
-            <a:ext cx="2273300" cy="1884639"/>
-          </a:xfrm>
-          <a:prstGeom prst="rect">
-            <a:avLst/>
-          </a:prstGeom>
-        </p:spPr>
-      </p:pic>
-      <p:cxnSp>
-        <p:nvCxnSpPr>
-          <p:cNvPr id="16" name="Straight Arrow Connector 15"/>
-          <p:cNvCxnSpPr/>
-          <p:nvPr/>
-        </p:nvCxnSpPr>
-        <p:spPr>
-          <a:xfrm>
-            <a:off x="3505200" y="2667000"/>
-            <a:ext cx="457200" cy="348218"/>
-          </a:xfrm>
-          <a:prstGeom prst="straightConnector1">
-            <a:avLst/>
-          </a:prstGeom>
-          <a:ln w="63500">
-            <a:solidFill>
-              <a:schemeClr val="tx1">
-                <a:lumMod val="50000"/>
-                <a:lumOff val="50000"/>
-              </a:schemeClr>
-            </a:solidFill>
-            <a:tailEnd type="arrow"/>
-          </a:ln>
-        </p:spPr>
-        <p:style>
-          <a:lnRef idx="2">
-            <a:schemeClr val="accent1"/>
-          </a:lnRef>
-          <a:fillRef idx="0">
-            <a:schemeClr val="accent1"/>
-          </a:fillRef>
-          <a:effectRef idx="1">
-            <a:schemeClr val="accent1"/>
-          </a:effectRef>
-          <a:fontRef idx="minor">
-            <a:schemeClr val="tx1"/>
-          </a:fontRef>
-        </p:style>
-      </p:cxnSp>
-      <p:sp>
-        <p:nvSpPr>
-          <p:cNvPr id="18" name="Rectangle 17"/>
-          <p:cNvSpPr/>
-          <p:nvPr/>
-        </p:nvSpPr>
-        <p:spPr>
-          <a:xfrm>
-            <a:off x="0" y="0"/>
-            <a:ext cx="9144000" cy="685800"/>
-          </a:xfrm>
-          <a:prstGeom prst="rect">
-            <a:avLst/>
-          </a:prstGeom>
-          <a:noFill/>
-          <a:ln>
-            <a:noFill/>
-          </a:ln>
-        </p:spPr>
-        <p:style>
-          <a:lnRef idx="2">
-            <a:schemeClr val="accent1">
-              <a:shade val="50000"/>
-            </a:schemeClr>
-          </a:lnRef>
-          <a:fillRef idx="1">
-            <a:schemeClr val="accent1"/>
-          </a:fillRef>
-          <a:effectRef idx="0">
-            <a:schemeClr val="accent1"/>
-          </a:effectRef>
-          <a:fontRef idx="minor">
-            <a:schemeClr val="lt1"/>
-          </a:fontRef>
-        </p:style>
-        <p:txBody>
-          <a:bodyPr rtlCol="0" anchor="ctr"/>
-          <a:lstStyle/>
-          <a:p>
-            <a:pPr algn="ctr"/>
-            <a:r>
-              <a:rPr lang="en-US" sz="3200" dirty="0" smtClean="0">
-                <a:solidFill>
-                  <a:schemeClr val="tx1"/>
-                </a:solidFill>
-                <a:latin typeface="Calibri" panose="020F0502020204030204" pitchFamily="34" charset="0"/>
-              </a:rPr>
-              <a:t>IGV Data Sources: How do I load data?</a:t>
-            </a:r>
-            <a:endParaRPr lang="en-US" sz="3200" dirty="0">
-              <a:solidFill>
-                <a:schemeClr val="tx1"/>
-              </a:solidFill>
-              <a:latin typeface="Calibri" panose="020F0502020204030204" pitchFamily="34" charset="0"/>
-            </a:endParaRPr>
-          </a:p>
-        </p:txBody>
-      </p:sp>
-    </p:spTree>
-    <p:extLst>
-      <p:ext uri="{BB962C8B-B14F-4D97-AF65-F5344CB8AC3E}">
-        <p14:creationId xmlns:p14="http://schemas.microsoft.com/office/powerpoint/2010/main" val="1894888543"/>
-      </p:ext>
-    </p:extLst>
-  </p:cSld>
-  <p:clrMapOvr>
-    <a:masterClrMapping/>
-  </p:clrMapOvr>
-  <mc:AlternateContent xmlns:mc="http://schemas.openxmlformats.org/markup-compatibility/2006" xmlns:p14="http://schemas.microsoft.com/office/powerpoint/2010/main">
-    <mc:Choice Requires="p14">
-      <p:transition spd="slow" p14:dur="2000"/>
-    </mc:Choice>
-    <mc:Fallback xmlns="">
-      <p:transition xmlns:p14="http://schemas.microsoft.com/office/powerpoint/2010/main" spd="slow"/>
-    </mc:Fallback>
-  </mc:AlternateContent>
-  <p:timing>
-    <p:tnLst>
-      <p:par>
-        <p:cTn id="1" dur="indefinite" restart="never" nodeType="tmRoot"/>
-      </p:par>
-    </p:tnLst>
-  </p:timing>
-</p:sld>
-</file>
-
-<file path=ppt/slides/slide30.xml><?xml version="1.0" encoding="utf-8"?>
+<file path=ppt/slides/slide31.xml><?xml version="1.0" encoding="utf-8"?>
 <p:sld xmlns:a="http://schemas.openxmlformats.org/drawingml/2006/main" xmlns:r="http://schemas.openxmlformats.org/officeDocument/2006/relationships" xmlns:p="http://schemas.openxmlformats.org/presentationml/2006/main" showMasterSp="0">
   <p:cSld>
     <p:spTree>
@@ -31088,14 +31531,14 @@
           </a:ln>
           <a:extLst>
             <a:ext uri="{909E8E84-426E-40dd-AFC4-6F175D3DCCD1}">
-              <a14:hiddenFill xmlns="" xmlns:a14="http://schemas.microsoft.com/office/drawing/2010/main">
+              <a14:hiddenFill xmlns:a14="http://schemas.microsoft.com/office/drawing/2010/main" xmlns="">
                 <a:solidFill>
                   <a:schemeClr val="accent1"/>
                 </a:solidFill>
               </a14:hiddenFill>
             </a:ext>
             <a:ext uri="{91240B29-F687-4f45-9708-019B960494DF}">
-              <a14:hiddenLine xmlns="" xmlns:a14="http://schemas.microsoft.com/office/drawing/2010/main" w="9525">
+              <a14:hiddenLine xmlns:a14="http://schemas.microsoft.com/office/drawing/2010/main" xmlns="" w="9525">
                 <a:solidFill>
                   <a:schemeClr val="tx1"/>
                 </a:solidFill>
@@ -31197,14 +31640,14 @@
           </a:ln>
           <a:extLst>
             <a:ext uri="{909E8E84-426E-40dd-AFC4-6F175D3DCCD1}">
-              <a14:hiddenFill xmlns="" xmlns:a14="http://schemas.microsoft.com/office/drawing/2010/main">
+              <a14:hiddenFill xmlns:a14="http://schemas.microsoft.com/office/drawing/2010/main" xmlns="">
                 <a:solidFill>
                   <a:srgbClr val="FFFFFF"/>
                 </a:solidFill>
               </a14:hiddenFill>
             </a:ext>
             <a:ext uri="{91240B29-F687-4f45-9708-019B960494DF}">
-              <a14:hiddenLine xmlns="" xmlns:a14="http://schemas.microsoft.com/office/drawing/2010/main" w="9525">
+              <a14:hiddenLine xmlns:a14="http://schemas.microsoft.com/office/drawing/2010/main" xmlns="" w="9525">
                 <a:solidFill>
                   <a:srgbClr val="000000"/>
                 </a:solidFill>

</xml_diff>